<commit_message>
submit v1.0 to app store
</commit_message>
<xml_diff>
--- a/assets/sprites/farm_land_design.pptx
+++ b/assets/sprites/farm_land_design.pptx
@@ -260,7 +260,7 @@
           <a:p>
             <a:fld id="{D55169DB-DC37-0147-99EF-2AFC2A26E125}" type="datetimeFigureOut">
               <a:rPr lang="en-US" smtClean="0"/>
-              <a:t>6/13/24</a:t>
+              <a:t>6/14/24</a:t>
             </a:fld>
             <a:endParaRPr lang="en-US"/>
           </a:p>
@@ -458,7 +458,7 @@
           <a:p>
             <a:fld id="{D55169DB-DC37-0147-99EF-2AFC2A26E125}" type="datetimeFigureOut">
               <a:rPr lang="en-US" smtClean="0"/>
-              <a:t>6/13/24</a:t>
+              <a:t>6/14/24</a:t>
             </a:fld>
             <a:endParaRPr lang="en-US"/>
           </a:p>
@@ -666,7 +666,7 @@
           <a:p>
             <a:fld id="{D55169DB-DC37-0147-99EF-2AFC2A26E125}" type="datetimeFigureOut">
               <a:rPr lang="en-US" smtClean="0"/>
-              <a:t>6/13/24</a:t>
+              <a:t>6/14/24</a:t>
             </a:fld>
             <a:endParaRPr lang="en-US"/>
           </a:p>
@@ -864,7 +864,7 @@
           <a:p>
             <a:fld id="{D55169DB-DC37-0147-99EF-2AFC2A26E125}" type="datetimeFigureOut">
               <a:rPr lang="en-US" smtClean="0"/>
-              <a:t>6/13/24</a:t>
+              <a:t>6/14/24</a:t>
             </a:fld>
             <a:endParaRPr lang="en-US"/>
           </a:p>
@@ -1139,7 +1139,7 @@
           <a:p>
             <a:fld id="{D55169DB-DC37-0147-99EF-2AFC2A26E125}" type="datetimeFigureOut">
               <a:rPr lang="en-US" smtClean="0"/>
-              <a:t>6/13/24</a:t>
+              <a:t>6/14/24</a:t>
             </a:fld>
             <a:endParaRPr lang="en-US"/>
           </a:p>
@@ -1404,7 +1404,7 @@
           <a:p>
             <a:fld id="{D55169DB-DC37-0147-99EF-2AFC2A26E125}" type="datetimeFigureOut">
               <a:rPr lang="en-US" smtClean="0"/>
-              <a:t>6/13/24</a:t>
+              <a:t>6/14/24</a:t>
             </a:fld>
             <a:endParaRPr lang="en-US"/>
           </a:p>
@@ -1816,7 +1816,7 @@
           <a:p>
             <a:fld id="{D55169DB-DC37-0147-99EF-2AFC2A26E125}" type="datetimeFigureOut">
               <a:rPr lang="en-US" smtClean="0"/>
-              <a:t>6/13/24</a:t>
+              <a:t>6/14/24</a:t>
             </a:fld>
             <a:endParaRPr lang="en-US"/>
           </a:p>
@@ -1957,7 +1957,7 @@
           <a:p>
             <a:fld id="{D55169DB-DC37-0147-99EF-2AFC2A26E125}" type="datetimeFigureOut">
               <a:rPr lang="en-US" smtClean="0"/>
-              <a:t>6/13/24</a:t>
+              <a:t>6/14/24</a:t>
             </a:fld>
             <a:endParaRPr lang="en-US"/>
           </a:p>
@@ -2070,7 +2070,7 @@
           <a:p>
             <a:fld id="{D55169DB-DC37-0147-99EF-2AFC2A26E125}" type="datetimeFigureOut">
               <a:rPr lang="en-US" smtClean="0"/>
-              <a:t>6/13/24</a:t>
+              <a:t>6/14/24</a:t>
             </a:fld>
             <a:endParaRPr lang="en-US"/>
           </a:p>
@@ -2381,7 +2381,7 @@
           <a:p>
             <a:fld id="{D55169DB-DC37-0147-99EF-2AFC2A26E125}" type="datetimeFigureOut">
               <a:rPr lang="en-US" smtClean="0"/>
-              <a:t>6/13/24</a:t>
+              <a:t>6/14/24</a:t>
             </a:fld>
             <a:endParaRPr lang="en-US"/>
           </a:p>
@@ -2669,7 +2669,7 @@
           <a:p>
             <a:fld id="{D55169DB-DC37-0147-99EF-2AFC2A26E125}" type="datetimeFigureOut">
               <a:rPr lang="en-US" smtClean="0"/>
-              <a:t>6/13/24</a:t>
+              <a:t>6/14/24</a:t>
             </a:fld>
             <a:endParaRPr lang="en-US"/>
           </a:p>
@@ -2910,7 +2910,7 @@
           <a:p>
             <a:fld id="{D55169DB-DC37-0147-99EF-2AFC2A26E125}" type="datetimeFigureOut">
               <a:rPr lang="en-US" smtClean="0"/>
-              <a:t>6/13/24</a:t>
+              <a:t>6/14/24</a:t>
             </a:fld>
             <a:endParaRPr lang="en-US"/>
           </a:p>
@@ -4643,7 +4643,7 @@
         </p:blipFill>
         <p:spPr>
           <a:xfrm>
-            <a:off x="1744290" y="2056276"/>
+            <a:off x="1766578" y="2011942"/>
             <a:ext cx="415177" cy="408587"/>
           </a:xfrm>
           <a:prstGeom prst="rect">
@@ -5113,13 +5113,18 @@
           <a:lstStyle/>
           <a:p>
             <a:r>
-              <a:rPr lang="en-US" dirty="0">
+              <a:rPr lang="en-US" altLang="zh-CN" dirty="0">
                 <a:solidFill>
                   <a:schemeClr val="bg1"/>
                 </a:solidFill>
               </a:rPr>
-              <a:t>0</a:t>
-            </a:r>
+              <a:t>1</a:t>
+            </a:r>
+            <a:endParaRPr lang="en-US" dirty="0">
+              <a:solidFill>
+                <a:schemeClr val="bg1"/>
+              </a:solidFill>
+            </a:endParaRPr>
           </a:p>
         </p:txBody>
       </p:sp>
@@ -5152,13 +5157,18 @@
           <a:lstStyle/>
           <a:p>
             <a:r>
-              <a:rPr lang="en-US" dirty="0">
+              <a:rPr lang="en-US" altLang="zh-CN" dirty="0">
                 <a:solidFill>
                   <a:schemeClr val="bg1"/>
                 </a:solidFill>
               </a:rPr>
-              <a:t>0</a:t>
-            </a:r>
+              <a:t>1</a:t>
+            </a:r>
+            <a:endParaRPr lang="en-US" dirty="0">
+              <a:solidFill>
+                <a:schemeClr val="bg1"/>
+              </a:solidFill>
+            </a:endParaRPr>
           </a:p>
         </p:txBody>
       </p:sp>
@@ -5212,8 +5222,8 @@
         </p:blipFill>
         <p:spPr>
           <a:xfrm>
-            <a:off x="7652248" y="2504538"/>
-            <a:ext cx="479695" cy="515855"/>
+            <a:off x="2503278" y="2027777"/>
+            <a:ext cx="418364" cy="449901"/>
           </a:xfrm>
           <a:prstGeom prst="rect">
             <a:avLst/>
@@ -5241,8 +5251,8 @@
         </p:blipFill>
         <p:spPr>
           <a:xfrm>
-            <a:off x="8312004" y="2499887"/>
-            <a:ext cx="486329" cy="495682"/>
+            <a:off x="3142627" y="2004942"/>
+            <a:ext cx="415177" cy="423162"/>
           </a:xfrm>
           <a:prstGeom prst="rect">
             <a:avLst/>
@@ -6386,1193 +6396,12 @@
           </a:prstGeom>
         </p:spPr>
       </p:pic>
-      <p:grpSp>
-        <p:nvGrpSpPr>
-          <p:cNvPr id="47" name="Group 46">
-            <a:extLst>
-              <a:ext uri="{FF2B5EF4-FFF2-40B4-BE49-F238E27FC236}">
-                <a16:creationId xmlns:a16="http://schemas.microsoft.com/office/drawing/2014/main" id="{0F32CEAE-7213-164F-AD8A-0626EEE44204}"/>
-              </a:ext>
-            </a:extLst>
-          </p:cNvPr>
-          <p:cNvGrpSpPr/>
-          <p:nvPr/>
-        </p:nvGrpSpPr>
-        <p:grpSpPr>
-          <a:xfrm>
-            <a:off x="1147094" y="721238"/>
-            <a:ext cx="3437481" cy="5489082"/>
-            <a:chOff x="1147094" y="721238"/>
-            <a:chExt cx="3437481" cy="5489082"/>
-          </a:xfrm>
-        </p:grpSpPr>
-        <p:pic>
-          <p:nvPicPr>
-            <p:cNvPr id="4" name="Picture 3" descr="A screenshot of a video game&#10;&#10;Description automatically generated">
-              <a:extLst>
-                <a:ext uri="{FF2B5EF4-FFF2-40B4-BE49-F238E27FC236}">
-                  <a16:creationId xmlns:a16="http://schemas.microsoft.com/office/drawing/2014/main" id="{C522CBA5-39A6-0C65-39C6-4E76DC18BC0D}"/>
-                </a:ext>
-              </a:extLst>
-            </p:cNvPr>
-            <p:cNvPicPr>
-              <a:picLocks noChangeAspect="1"/>
-            </p:cNvPicPr>
-            <p:nvPr/>
-          </p:nvPicPr>
-          <p:blipFill rotWithShape="1">
-            <a:blip r:embed="rId3"/>
-            <a:srcRect t="73704" r="82834"/>
-            <a:stretch/>
-          </p:blipFill>
-          <p:spPr>
-            <a:xfrm>
-              <a:off x="1147094" y="721238"/>
-              <a:ext cx="706283" cy="688482"/>
-            </a:xfrm>
-            <a:prstGeom prst="rect">
-              <a:avLst/>
-            </a:prstGeom>
-          </p:spPr>
-        </p:pic>
-        <p:pic>
-          <p:nvPicPr>
-            <p:cNvPr id="5" name="Picture 4" descr="A screenshot of a video game&#10;&#10;Description automatically generated">
-              <a:extLst>
-                <a:ext uri="{FF2B5EF4-FFF2-40B4-BE49-F238E27FC236}">
-                  <a16:creationId xmlns:a16="http://schemas.microsoft.com/office/drawing/2014/main" id="{45755768-3FE7-75B7-045F-A78A8719FB52}"/>
-                </a:ext>
-              </a:extLst>
-            </p:cNvPr>
-            <p:cNvPicPr>
-              <a:picLocks noChangeAspect="1"/>
-            </p:cNvPicPr>
-            <p:nvPr/>
-          </p:nvPicPr>
-          <p:blipFill rotWithShape="1">
-            <a:blip r:embed="rId3"/>
-            <a:srcRect t="73704" r="82834"/>
-            <a:stretch/>
-          </p:blipFill>
-          <p:spPr>
-            <a:xfrm>
-              <a:off x="1850279" y="721238"/>
-              <a:ext cx="706283" cy="688482"/>
-            </a:xfrm>
-            <a:prstGeom prst="rect">
-              <a:avLst/>
-            </a:prstGeom>
-          </p:spPr>
-        </p:pic>
-        <p:pic>
-          <p:nvPicPr>
-            <p:cNvPr id="6" name="Picture 5" descr="A screenshot of a video game&#10;&#10;Description automatically generated">
-              <a:extLst>
-                <a:ext uri="{FF2B5EF4-FFF2-40B4-BE49-F238E27FC236}">
-                  <a16:creationId xmlns:a16="http://schemas.microsoft.com/office/drawing/2014/main" id="{76185A53-CEFA-2C62-4536-06CDD9516B59}"/>
-                </a:ext>
-              </a:extLst>
-            </p:cNvPr>
-            <p:cNvPicPr>
-              <a:picLocks noChangeAspect="1"/>
-            </p:cNvPicPr>
-            <p:nvPr/>
-          </p:nvPicPr>
-          <p:blipFill rotWithShape="1">
-            <a:blip r:embed="rId3"/>
-            <a:srcRect t="73704" r="82834"/>
-            <a:stretch/>
-          </p:blipFill>
-          <p:spPr>
-            <a:xfrm>
-              <a:off x="2550366" y="721238"/>
-              <a:ext cx="706283" cy="688482"/>
-            </a:xfrm>
-            <a:prstGeom prst="rect">
-              <a:avLst/>
-            </a:prstGeom>
-          </p:spPr>
-        </p:pic>
-        <p:pic>
-          <p:nvPicPr>
-            <p:cNvPr id="7" name="Picture 6" descr="A screenshot of a video game&#10;&#10;Description automatically generated">
-              <a:extLst>
-                <a:ext uri="{FF2B5EF4-FFF2-40B4-BE49-F238E27FC236}">
-                  <a16:creationId xmlns:a16="http://schemas.microsoft.com/office/drawing/2014/main" id="{24B84925-0F66-F2C5-D642-B62359E83D12}"/>
-                </a:ext>
-              </a:extLst>
-            </p:cNvPr>
-            <p:cNvPicPr>
-              <a:picLocks noChangeAspect="1"/>
-            </p:cNvPicPr>
-            <p:nvPr/>
-          </p:nvPicPr>
-          <p:blipFill rotWithShape="1">
-            <a:blip r:embed="rId3"/>
-            <a:srcRect t="73704" r="82834"/>
-            <a:stretch/>
-          </p:blipFill>
-          <p:spPr>
-            <a:xfrm>
-              <a:off x="3247355" y="721238"/>
-              <a:ext cx="706283" cy="688482"/>
-            </a:xfrm>
-            <a:prstGeom prst="rect">
-              <a:avLst/>
-            </a:prstGeom>
-          </p:spPr>
-        </p:pic>
-        <p:pic>
-          <p:nvPicPr>
-            <p:cNvPr id="8" name="Picture 7" descr="A screenshot of a video game&#10;&#10;Description automatically generated">
-              <a:extLst>
-                <a:ext uri="{FF2B5EF4-FFF2-40B4-BE49-F238E27FC236}">
-                  <a16:creationId xmlns:a16="http://schemas.microsoft.com/office/drawing/2014/main" id="{9B1F4885-D873-2B25-E3A7-40A96E11B9A9}"/>
-                </a:ext>
-              </a:extLst>
-            </p:cNvPr>
-            <p:cNvPicPr>
-              <a:picLocks noChangeAspect="1"/>
-            </p:cNvPicPr>
-            <p:nvPr/>
-          </p:nvPicPr>
-          <p:blipFill rotWithShape="1">
-            <a:blip r:embed="rId3"/>
-            <a:srcRect t="73704" r="82834"/>
-            <a:stretch/>
-          </p:blipFill>
-          <p:spPr>
-            <a:xfrm>
-              <a:off x="3878292" y="721238"/>
-              <a:ext cx="706283" cy="688482"/>
-            </a:xfrm>
-            <a:prstGeom prst="rect">
-              <a:avLst/>
-            </a:prstGeom>
-          </p:spPr>
-        </p:pic>
-        <p:pic>
-          <p:nvPicPr>
-            <p:cNvPr id="11" name="Picture 10" descr="A screenshot of a video game&#10;&#10;Description automatically generated">
-              <a:extLst>
-                <a:ext uri="{FF2B5EF4-FFF2-40B4-BE49-F238E27FC236}">
-                  <a16:creationId xmlns:a16="http://schemas.microsoft.com/office/drawing/2014/main" id="{6559954B-B8E9-3241-DFB2-01588F8C907E}"/>
-                </a:ext>
-              </a:extLst>
-            </p:cNvPr>
-            <p:cNvPicPr>
-              <a:picLocks noChangeAspect="1"/>
-            </p:cNvPicPr>
-            <p:nvPr/>
-          </p:nvPicPr>
-          <p:blipFill rotWithShape="1">
-            <a:blip r:embed="rId3"/>
-            <a:srcRect t="73704" r="82834"/>
-            <a:stretch/>
-          </p:blipFill>
-          <p:spPr>
-            <a:xfrm>
-              <a:off x="1147094" y="1407038"/>
-              <a:ext cx="706283" cy="688482"/>
-            </a:xfrm>
-            <a:prstGeom prst="rect">
-              <a:avLst/>
-            </a:prstGeom>
-          </p:spPr>
-        </p:pic>
-        <p:pic>
-          <p:nvPicPr>
-            <p:cNvPr id="12" name="Picture 11" descr="A screenshot of a video game&#10;&#10;Description automatically generated">
-              <a:extLst>
-                <a:ext uri="{FF2B5EF4-FFF2-40B4-BE49-F238E27FC236}">
-                  <a16:creationId xmlns:a16="http://schemas.microsoft.com/office/drawing/2014/main" id="{A587E2B7-C05E-AA14-39A8-C4E328FCBAF2}"/>
-                </a:ext>
-              </a:extLst>
-            </p:cNvPr>
-            <p:cNvPicPr>
-              <a:picLocks noChangeAspect="1"/>
-            </p:cNvPicPr>
-            <p:nvPr/>
-          </p:nvPicPr>
-          <p:blipFill rotWithShape="1">
-            <a:blip r:embed="rId3"/>
-            <a:srcRect t="73704" r="82834"/>
-            <a:stretch/>
-          </p:blipFill>
-          <p:spPr>
-            <a:xfrm>
-              <a:off x="1850279" y="1407038"/>
-              <a:ext cx="706283" cy="688482"/>
-            </a:xfrm>
-            <a:prstGeom prst="rect">
-              <a:avLst/>
-            </a:prstGeom>
-          </p:spPr>
-        </p:pic>
-        <p:pic>
-          <p:nvPicPr>
-            <p:cNvPr id="13" name="Picture 12" descr="A screenshot of a video game&#10;&#10;Description automatically generated">
-              <a:extLst>
-                <a:ext uri="{FF2B5EF4-FFF2-40B4-BE49-F238E27FC236}">
-                  <a16:creationId xmlns:a16="http://schemas.microsoft.com/office/drawing/2014/main" id="{D51D1FE4-4A84-296E-1A5D-D268274669B8}"/>
-                </a:ext>
-              </a:extLst>
-            </p:cNvPr>
-            <p:cNvPicPr>
-              <a:picLocks noChangeAspect="1"/>
-            </p:cNvPicPr>
-            <p:nvPr/>
-          </p:nvPicPr>
-          <p:blipFill rotWithShape="1">
-            <a:blip r:embed="rId3"/>
-            <a:srcRect t="73704" r="82834"/>
-            <a:stretch/>
-          </p:blipFill>
-          <p:spPr>
-            <a:xfrm>
-              <a:off x="2550366" y="1407038"/>
-              <a:ext cx="706283" cy="688482"/>
-            </a:xfrm>
-            <a:prstGeom prst="rect">
-              <a:avLst/>
-            </a:prstGeom>
-          </p:spPr>
-        </p:pic>
-        <p:pic>
-          <p:nvPicPr>
-            <p:cNvPr id="14" name="Picture 13" descr="A screenshot of a video game&#10;&#10;Description automatically generated">
-              <a:extLst>
-                <a:ext uri="{FF2B5EF4-FFF2-40B4-BE49-F238E27FC236}">
-                  <a16:creationId xmlns:a16="http://schemas.microsoft.com/office/drawing/2014/main" id="{72E22802-5190-4961-3EBC-9C8C6B1E6C8F}"/>
-                </a:ext>
-              </a:extLst>
-            </p:cNvPr>
-            <p:cNvPicPr>
-              <a:picLocks noChangeAspect="1"/>
-            </p:cNvPicPr>
-            <p:nvPr/>
-          </p:nvPicPr>
-          <p:blipFill rotWithShape="1">
-            <a:blip r:embed="rId3"/>
-            <a:srcRect t="73704" r="82834"/>
-            <a:stretch/>
-          </p:blipFill>
-          <p:spPr>
-            <a:xfrm>
-              <a:off x="3247355" y="1407038"/>
-              <a:ext cx="706283" cy="688482"/>
-            </a:xfrm>
-            <a:prstGeom prst="rect">
-              <a:avLst/>
-            </a:prstGeom>
-          </p:spPr>
-        </p:pic>
-        <p:pic>
-          <p:nvPicPr>
-            <p:cNvPr id="15" name="Picture 14" descr="A screenshot of a video game&#10;&#10;Description automatically generated">
-              <a:extLst>
-                <a:ext uri="{FF2B5EF4-FFF2-40B4-BE49-F238E27FC236}">
-                  <a16:creationId xmlns:a16="http://schemas.microsoft.com/office/drawing/2014/main" id="{73F62EF2-08EA-A51C-E1C2-E3393B09FDA2}"/>
-                </a:ext>
-              </a:extLst>
-            </p:cNvPr>
-            <p:cNvPicPr>
-              <a:picLocks noChangeAspect="1"/>
-            </p:cNvPicPr>
-            <p:nvPr/>
-          </p:nvPicPr>
-          <p:blipFill rotWithShape="1">
-            <a:blip r:embed="rId3"/>
-            <a:srcRect t="73704" r="82834"/>
-            <a:stretch/>
-          </p:blipFill>
-          <p:spPr>
-            <a:xfrm>
-              <a:off x="3878292" y="1407038"/>
-              <a:ext cx="706283" cy="688482"/>
-            </a:xfrm>
-            <a:prstGeom prst="rect">
-              <a:avLst/>
-            </a:prstGeom>
-          </p:spPr>
-        </p:pic>
-        <p:pic>
-          <p:nvPicPr>
-            <p:cNvPr id="16" name="Picture 15" descr="A screenshot of a video game&#10;&#10;Description automatically generated">
-              <a:extLst>
-                <a:ext uri="{FF2B5EF4-FFF2-40B4-BE49-F238E27FC236}">
-                  <a16:creationId xmlns:a16="http://schemas.microsoft.com/office/drawing/2014/main" id="{A71058FF-C2B0-EF26-4046-C6C314436646}"/>
-                </a:ext>
-              </a:extLst>
-            </p:cNvPr>
-            <p:cNvPicPr>
-              <a:picLocks noChangeAspect="1"/>
-            </p:cNvPicPr>
-            <p:nvPr/>
-          </p:nvPicPr>
-          <p:blipFill rotWithShape="1">
-            <a:blip r:embed="rId3"/>
-            <a:srcRect t="73704" r="82834"/>
-            <a:stretch/>
-          </p:blipFill>
-          <p:spPr>
-            <a:xfrm>
-              <a:off x="1147094" y="2092838"/>
-              <a:ext cx="706283" cy="688482"/>
-            </a:xfrm>
-            <a:prstGeom prst="rect">
-              <a:avLst/>
-            </a:prstGeom>
-          </p:spPr>
-        </p:pic>
-        <p:pic>
-          <p:nvPicPr>
-            <p:cNvPr id="17" name="Picture 16" descr="A screenshot of a video game&#10;&#10;Description automatically generated">
-              <a:extLst>
-                <a:ext uri="{FF2B5EF4-FFF2-40B4-BE49-F238E27FC236}">
-                  <a16:creationId xmlns:a16="http://schemas.microsoft.com/office/drawing/2014/main" id="{899CEAAC-0705-F568-A9D1-D4A598BCB862}"/>
-                </a:ext>
-              </a:extLst>
-            </p:cNvPr>
-            <p:cNvPicPr>
-              <a:picLocks noChangeAspect="1"/>
-            </p:cNvPicPr>
-            <p:nvPr/>
-          </p:nvPicPr>
-          <p:blipFill rotWithShape="1">
-            <a:blip r:embed="rId3"/>
-            <a:srcRect t="73704" r="82834"/>
-            <a:stretch/>
-          </p:blipFill>
-          <p:spPr>
-            <a:xfrm>
-              <a:off x="1850279" y="2092838"/>
-              <a:ext cx="706283" cy="688482"/>
-            </a:xfrm>
-            <a:prstGeom prst="rect">
-              <a:avLst/>
-            </a:prstGeom>
-          </p:spPr>
-        </p:pic>
-        <p:pic>
-          <p:nvPicPr>
-            <p:cNvPr id="18" name="Picture 17" descr="A screenshot of a video game&#10;&#10;Description automatically generated">
-              <a:extLst>
-                <a:ext uri="{FF2B5EF4-FFF2-40B4-BE49-F238E27FC236}">
-                  <a16:creationId xmlns:a16="http://schemas.microsoft.com/office/drawing/2014/main" id="{1399A53A-4835-6DB7-49C5-21CF2D3CB40A}"/>
-                </a:ext>
-              </a:extLst>
-            </p:cNvPr>
-            <p:cNvPicPr>
-              <a:picLocks noChangeAspect="1"/>
-            </p:cNvPicPr>
-            <p:nvPr/>
-          </p:nvPicPr>
-          <p:blipFill rotWithShape="1">
-            <a:blip r:embed="rId3"/>
-            <a:srcRect t="73704" r="82834"/>
-            <a:stretch/>
-          </p:blipFill>
-          <p:spPr>
-            <a:xfrm>
-              <a:off x="2550366" y="2092838"/>
-              <a:ext cx="706283" cy="688482"/>
-            </a:xfrm>
-            <a:prstGeom prst="rect">
-              <a:avLst/>
-            </a:prstGeom>
-          </p:spPr>
-        </p:pic>
-        <p:pic>
-          <p:nvPicPr>
-            <p:cNvPr id="19" name="Picture 18" descr="A screenshot of a video game&#10;&#10;Description automatically generated">
-              <a:extLst>
-                <a:ext uri="{FF2B5EF4-FFF2-40B4-BE49-F238E27FC236}">
-                  <a16:creationId xmlns:a16="http://schemas.microsoft.com/office/drawing/2014/main" id="{2C49DC7F-17E4-171F-F5BF-6381ED9ACFD3}"/>
-                </a:ext>
-              </a:extLst>
-            </p:cNvPr>
-            <p:cNvPicPr>
-              <a:picLocks noChangeAspect="1"/>
-            </p:cNvPicPr>
-            <p:nvPr/>
-          </p:nvPicPr>
-          <p:blipFill rotWithShape="1">
-            <a:blip r:embed="rId3"/>
-            <a:srcRect t="73704" r="82834"/>
-            <a:stretch/>
-          </p:blipFill>
-          <p:spPr>
-            <a:xfrm>
-              <a:off x="3247355" y="2092838"/>
-              <a:ext cx="706283" cy="688482"/>
-            </a:xfrm>
-            <a:prstGeom prst="rect">
-              <a:avLst/>
-            </a:prstGeom>
-          </p:spPr>
-        </p:pic>
-        <p:pic>
-          <p:nvPicPr>
-            <p:cNvPr id="20" name="Picture 19" descr="A screenshot of a video game&#10;&#10;Description automatically generated">
-              <a:extLst>
-                <a:ext uri="{FF2B5EF4-FFF2-40B4-BE49-F238E27FC236}">
-                  <a16:creationId xmlns:a16="http://schemas.microsoft.com/office/drawing/2014/main" id="{455651A8-F0E9-2618-D54A-C7B69777F424}"/>
-                </a:ext>
-              </a:extLst>
-            </p:cNvPr>
-            <p:cNvPicPr>
-              <a:picLocks noChangeAspect="1"/>
-            </p:cNvPicPr>
-            <p:nvPr/>
-          </p:nvPicPr>
-          <p:blipFill rotWithShape="1">
-            <a:blip r:embed="rId3"/>
-            <a:srcRect t="73704" r="82834"/>
-            <a:stretch/>
-          </p:blipFill>
-          <p:spPr>
-            <a:xfrm>
-              <a:off x="3878292" y="2092838"/>
-              <a:ext cx="706283" cy="688482"/>
-            </a:xfrm>
-            <a:prstGeom prst="rect">
-              <a:avLst/>
-            </a:prstGeom>
-          </p:spPr>
-        </p:pic>
-        <p:pic>
-          <p:nvPicPr>
-            <p:cNvPr id="21" name="Picture 20" descr="A screenshot of a video game&#10;&#10;Description automatically generated">
-              <a:extLst>
-                <a:ext uri="{FF2B5EF4-FFF2-40B4-BE49-F238E27FC236}">
-                  <a16:creationId xmlns:a16="http://schemas.microsoft.com/office/drawing/2014/main" id="{AC3B16CB-56BA-7808-F888-90E0F71FC1BD}"/>
-                </a:ext>
-              </a:extLst>
-            </p:cNvPr>
-            <p:cNvPicPr>
-              <a:picLocks noChangeAspect="1"/>
-            </p:cNvPicPr>
-            <p:nvPr/>
-          </p:nvPicPr>
-          <p:blipFill rotWithShape="1">
-            <a:blip r:embed="rId3"/>
-            <a:srcRect t="73704" r="82834"/>
-            <a:stretch/>
-          </p:blipFill>
-          <p:spPr>
-            <a:xfrm>
-              <a:off x="1147094" y="2778638"/>
-              <a:ext cx="706283" cy="688482"/>
-            </a:xfrm>
-            <a:prstGeom prst="rect">
-              <a:avLst/>
-            </a:prstGeom>
-          </p:spPr>
-        </p:pic>
-        <p:pic>
-          <p:nvPicPr>
-            <p:cNvPr id="22" name="Picture 21" descr="A screenshot of a video game&#10;&#10;Description automatically generated">
-              <a:extLst>
-                <a:ext uri="{FF2B5EF4-FFF2-40B4-BE49-F238E27FC236}">
-                  <a16:creationId xmlns:a16="http://schemas.microsoft.com/office/drawing/2014/main" id="{2403C8AF-D156-4B72-5018-783EFC6091B9}"/>
-                </a:ext>
-              </a:extLst>
-            </p:cNvPr>
-            <p:cNvPicPr>
-              <a:picLocks noChangeAspect="1"/>
-            </p:cNvPicPr>
-            <p:nvPr/>
-          </p:nvPicPr>
-          <p:blipFill rotWithShape="1">
-            <a:blip r:embed="rId3"/>
-            <a:srcRect t="73704" r="82834"/>
-            <a:stretch/>
-          </p:blipFill>
-          <p:spPr>
-            <a:xfrm>
-              <a:off x="1850279" y="2778638"/>
-              <a:ext cx="706283" cy="688482"/>
-            </a:xfrm>
-            <a:prstGeom prst="rect">
-              <a:avLst/>
-            </a:prstGeom>
-          </p:spPr>
-        </p:pic>
-        <p:pic>
-          <p:nvPicPr>
-            <p:cNvPr id="23" name="Picture 22" descr="A screenshot of a video game&#10;&#10;Description automatically generated">
-              <a:extLst>
-                <a:ext uri="{FF2B5EF4-FFF2-40B4-BE49-F238E27FC236}">
-                  <a16:creationId xmlns:a16="http://schemas.microsoft.com/office/drawing/2014/main" id="{5AB576C3-616F-5CAC-9B17-0BBB1DE27017}"/>
-                </a:ext>
-              </a:extLst>
-            </p:cNvPr>
-            <p:cNvPicPr>
-              <a:picLocks noChangeAspect="1"/>
-            </p:cNvPicPr>
-            <p:nvPr/>
-          </p:nvPicPr>
-          <p:blipFill rotWithShape="1">
-            <a:blip r:embed="rId3"/>
-            <a:srcRect t="73704" r="82834"/>
-            <a:stretch/>
-          </p:blipFill>
-          <p:spPr>
-            <a:xfrm>
-              <a:off x="2550366" y="2778638"/>
-              <a:ext cx="706283" cy="688482"/>
-            </a:xfrm>
-            <a:prstGeom prst="rect">
-              <a:avLst/>
-            </a:prstGeom>
-          </p:spPr>
-        </p:pic>
-        <p:pic>
-          <p:nvPicPr>
-            <p:cNvPr id="24" name="Picture 23" descr="A screenshot of a video game&#10;&#10;Description automatically generated">
-              <a:extLst>
-                <a:ext uri="{FF2B5EF4-FFF2-40B4-BE49-F238E27FC236}">
-                  <a16:creationId xmlns:a16="http://schemas.microsoft.com/office/drawing/2014/main" id="{386601A3-8509-163B-1E91-B96EBB044E5C}"/>
-                </a:ext>
-              </a:extLst>
-            </p:cNvPr>
-            <p:cNvPicPr>
-              <a:picLocks noChangeAspect="1"/>
-            </p:cNvPicPr>
-            <p:nvPr/>
-          </p:nvPicPr>
-          <p:blipFill rotWithShape="1">
-            <a:blip r:embed="rId3"/>
-            <a:srcRect t="73704" r="82834"/>
-            <a:stretch/>
-          </p:blipFill>
-          <p:spPr>
-            <a:xfrm>
-              <a:off x="3247355" y="2778638"/>
-              <a:ext cx="706283" cy="688482"/>
-            </a:xfrm>
-            <a:prstGeom prst="rect">
-              <a:avLst/>
-            </a:prstGeom>
-          </p:spPr>
-        </p:pic>
-        <p:pic>
-          <p:nvPicPr>
-            <p:cNvPr id="25" name="Picture 24" descr="A screenshot of a video game&#10;&#10;Description automatically generated">
-              <a:extLst>
-                <a:ext uri="{FF2B5EF4-FFF2-40B4-BE49-F238E27FC236}">
-                  <a16:creationId xmlns:a16="http://schemas.microsoft.com/office/drawing/2014/main" id="{D9638742-8F93-1F2A-AF37-012AC57A5DC4}"/>
-                </a:ext>
-              </a:extLst>
-            </p:cNvPr>
-            <p:cNvPicPr>
-              <a:picLocks noChangeAspect="1"/>
-            </p:cNvPicPr>
-            <p:nvPr/>
-          </p:nvPicPr>
-          <p:blipFill rotWithShape="1">
-            <a:blip r:embed="rId3"/>
-            <a:srcRect t="73704" r="82834"/>
-            <a:stretch/>
-          </p:blipFill>
-          <p:spPr>
-            <a:xfrm>
-              <a:off x="3878292" y="2778638"/>
-              <a:ext cx="706283" cy="688482"/>
-            </a:xfrm>
-            <a:prstGeom prst="rect">
-              <a:avLst/>
-            </a:prstGeom>
-          </p:spPr>
-        </p:pic>
-        <p:pic>
-          <p:nvPicPr>
-            <p:cNvPr id="26" name="Picture 25" descr="A screenshot of a video game&#10;&#10;Description automatically generated">
-              <a:extLst>
-                <a:ext uri="{FF2B5EF4-FFF2-40B4-BE49-F238E27FC236}">
-                  <a16:creationId xmlns:a16="http://schemas.microsoft.com/office/drawing/2014/main" id="{0B55BB6C-0E62-1D2F-C9A3-9D70B6965C22}"/>
-                </a:ext>
-              </a:extLst>
-            </p:cNvPr>
-            <p:cNvPicPr>
-              <a:picLocks noChangeAspect="1"/>
-            </p:cNvPicPr>
-            <p:nvPr/>
-          </p:nvPicPr>
-          <p:blipFill rotWithShape="1">
-            <a:blip r:embed="rId3"/>
-            <a:srcRect t="73704" r="82834"/>
-            <a:stretch/>
-          </p:blipFill>
-          <p:spPr>
-            <a:xfrm>
-              <a:off x="1147094" y="3464438"/>
-              <a:ext cx="706283" cy="688482"/>
-            </a:xfrm>
-            <a:prstGeom prst="rect">
-              <a:avLst/>
-            </a:prstGeom>
-          </p:spPr>
-        </p:pic>
-        <p:pic>
-          <p:nvPicPr>
-            <p:cNvPr id="27" name="Picture 26" descr="A screenshot of a video game&#10;&#10;Description automatically generated">
-              <a:extLst>
-                <a:ext uri="{FF2B5EF4-FFF2-40B4-BE49-F238E27FC236}">
-                  <a16:creationId xmlns:a16="http://schemas.microsoft.com/office/drawing/2014/main" id="{CDF5F9C2-895D-A5BB-6FBA-F3920BF94731}"/>
-                </a:ext>
-              </a:extLst>
-            </p:cNvPr>
-            <p:cNvPicPr>
-              <a:picLocks noChangeAspect="1"/>
-            </p:cNvPicPr>
-            <p:nvPr/>
-          </p:nvPicPr>
-          <p:blipFill rotWithShape="1">
-            <a:blip r:embed="rId3"/>
-            <a:srcRect t="73704" r="82834"/>
-            <a:stretch/>
-          </p:blipFill>
-          <p:spPr>
-            <a:xfrm>
-              <a:off x="1850279" y="3464438"/>
-              <a:ext cx="706283" cy="688482"/>
-            </a:xfrm>
-            <a:prstGeom prst="rect">
-              <a:avLst/>
-            </a:prstGeom>
-          </p:spPr>
-        </p:pic>
-        <p:pic>
-          <p:nvPicPr>
-            <p:cNvPr id="28" name="Picture 27" descr="A screenshot of a video game&#10;&#10;Description automatically generated">
-              <a:extLst>
-                <a:ext uri="{FF2B5EF4-FFF2-40B4-BE49-F238E27FC236}">
-                  <a16:creationId xmlns:a16="http://schemas.microsoft.com/office/drawing/2014/main" id="{A1C56F36-C98F-9A8E-8B36-EFFBA901135A}"/>
-                </a:ext>
-              </a:extLst>
-            </p:cNvPr>
-            <p:cNvPicPr>
-              <a:picLocks noChangeAspect="1"/>
-            </p:cNvPicPr>
-            <p:nvPr/>
-          </p:nvPicPr>
-          <p:blipFill rotWithShape="1">
-            <a:blip r:embed="rId3"/>
-            <a:srcRect t="73704" r="82834"/>
-            <a:stretch/>
-          </p:blipFill>
-          <p:spPr>
-            <a:xfrm>
-              <a:off x="2550366" y="3464438"/>
-              <a:ext cx="706283" cy="688482"/>
-            </a:xfrm>
-            <a:prstGeom prst="rect">
-              <a:avLst/>
-            </a:prstGeom>
-          </p:spPr>
-        </p:pic>
-        <p:pic>
-          <p:nvPicPr>
-            <p:cNvPr id="29" name="Picture 28" descr="A screenshot of a video game&#10;&#10;Description automatically generated">
-              <a:extLst>
-                <a:ext uri="{FF2B5EF4-FFF2-40B4-BE49-F238E27FC236}">
-                  <a16:creationId xmlns:a16="http://schemas.microsoft.com/office/drawing/2014/main" id="{CD1C4958-85B3-AE35-10D8-8F0DE4A4EE79}"/>
-                </a:ext>
-              </a:extLst>
-            </p:cNvPr>
-            <p:cNvPicPr>
-              <a:picLocks noChangeAspect="1"/>
-            </p:cNvPicPr>
-            <p:nvPr/>
-          </p:nvPicPr>
-          <p:blipFill rotWithShape="1">
-            <a:blip r:embed="rId3"/>
-            <a:srcRect t="73704" r="82834"/>
-            <a:stretch/>
-          </p:blipFill>
-          <p:spPr>
-            <a:xfrm>
-              <a:off x="3247355" y="3464438"/>
-              <a:ext cx="706283" cy="688482"/>
-            </a:xfrm>
-            <a:prstGeom prst="rect">
-              <a:avLst/>
-            </a:prstGeom>
-          </p:spPr>
-        </p:pic>
-        <p:pic>
-          <p:nvPicPr>
-            <p:cNvPr id="30" name="Picture 29" descr="A screenshot of a video game&#10;&#10;Description automatically generated">
-              <a:extLst>
-                <a:ext uri="{FF2B5EF4-FFF2-40B4-BE49-F238E27FC236}">
-                  <a16:creationId xmlns:a16="http://schemas.microsoft.com/office/drawing/2014/main" id="{B2988A3F-1CB0-6893-58F8-2D80307E3C05}"/>
-                </a:ext>
-              </a:extLst>
-            </p:cNvPr>
-            <p:cNvPicPr>
-              <a:picLocks noChangeAspect="1"/>
-            </p:cNvPicPr>
-            <p:nvPr/>
-          </p:nvPicPr>
-          <p:blipFill rotWithShape="1">
-            <a:blip r:embed="rId3"/>
-            <a:srcRect t="73704" r="82834"/>
-            <a:stretch/>
-          </p:blipFill>
-          <p:spPr>
-            <a:xfrm>
-              <a:off x="3878292" y="3464438"/>
-              <a:ext cx="706283" cy="688482"/>
-            </a:xfrm>
-            <a:prstGeom prst="rect">
-              <a:avLst/>
-            </a:prstGeom>
-          </p:spPr>
-        </p:pic>
-        <p:pic>
-          <p:nvPicPr>
-            <p:cNvPr id="31" name="Picture 30" descr="A screenshot of a video game&#10;&#10;Description automatically generated">
-              <a:extLst>
-                <a:ext uri="{FF2B5EF4-FFF2-40B4-BE49-F238E27FC236}">
-                  <a16:creationId xmlns:a16="http://schemas.microsoft.com/office/drawing/2014/main" id="{F278828E-C250-7118-0B21-E4C174D74459}"/>
-                </a:ext>
-              </a:extLst>
-            </p:cNvPr>
-            <p:cNvPicPr>
-              <a:picLocks noChangeAspect="1"/>
-            </p:cNvPicPr>
-            <p:nvPr/>
-          </p:nvPicPr>
-          <p:blipFill rotWithShape="1">
-            <a:blip r:embed="rId3"/>
-            <a:srcRect t="73704" r="82834"/>
-            <a:stretch/>
-          </p:blipFill>
-          <p:spPr>
-            <a:xfrm>
-              <a:off x="1147094" y="4150238"/>
-              <a:ext cx="706283" cy="688482"/>
-            </a:xfrm>
-            <a:prstGeom prst="rect">
-              <a:avLst/>
-            </a:prstGeom>
-          </p:spPr>
-        </p:pic>
-        <p:pic>
-          <p:nvPicPr>
-            <p:cNvPr id="32" name="Picture 31" descr="A screenshot of a video game&#10;&#10;Description automatically generated">
-              <a:extLst>
-                <a:ext uri="{FF2B5EF4-FFF2-40B4-BE49-F238E27FC236}">
-                  <a16:creationId xmlns:a16="http://schemas.microsoft.com/office/drawing/2014/main" id="{6D5AEC12-038D-1062-9829-8870E1AF4D8A}"/>
-                </a:ext>
-              </a:extLst>
-            </p:cNvPr>
-            <p:cNvPicPr>
-              <a:picLocks noChangeAspect="1"/>
-            </p:cNvPicPr>
-            <p:nvPr/>
-          </p:nvPicPr>
-          <p:blipFill rotWithShape="1">
-            <a:blip r:embed="rId3"/>
-            <a:srcRect t="73704" r="82834"/>
-            <a:stretch/>
-          </p:blipFill>
-          <p:spPr>
-            <a:xfrm>
-              <a:off x="1850279" y="4150238"/>
-              <a:ext cx="706283" cy="688482"/>
-            </a:xfrm>
-            <a:prstGeom prst="rect">
-              <a:avLst/>
-            </a:prstGeom>
-          </p:spPr>
-        </p:pic>
-        <p:pic>
-          <p:nvPicPr>
-            <p:cNvPr id="33" name="Picture 32" descr="A screenshot of a video game&#10;&#10;Description automatically generated">
-              <a:extLst>
-                <a:ext uri="{FF2B5EF4-FFF2-40B4-BE49-F238E27FC236}">
-                  <a16:creationId xmlns:a16="http://schemas.microsoft.com/office/drawing/2014/main" id="{EE43C3A5-7EA3-9E31-612C-6E4DF5D4953D}"/>
-                </a:ext>
-              </a:extLst>
-            </p:cNvPr>
-            <p:cNvPicPr>
-              <a:picLocks noChangeAspect="1"/>
-            </p:cNvPicPr>
-            <p:nvPr/>
-          </p:nvPicPr>
-          <p:blipFill rotWithShape="1">
-            <a:blip r:embed="rId3"/>
-            <a:srcRect t="73704" r="82834"/>
-            <a:stretch/>
-          </p:blipFill>
-          <p:spPr>
-            <a:xfrm>
-              <a:off x="2550366" y="4150238"/>
-              <a:ext cx="706283" cy="688482"/>
-            </a:xfrm>
-            <a:prstGeom prst="rect">
-              <a:avLst/>
-            </a:prstGeom>
-          </p:spPr>
-        </p:pic>
-        <p:pic>
-          <p:nvPicPr>
-            <p:cNvPr id="34" name="Picture 33" descr="A screenshot of a video game&#10;&#10;Description automatically generated">
-              <a:extLst>
-                <a:ext uri="{FF2B5EF4-FFF2-40B4-BE49-F238E27FC236}">
-                  <a16:creationId xmlns:a16="http://schemas.microsoft.com/office/drawing/2014/main" id="{C8CE9D5E-C089-4F53-A31B-0D969A436CBE}"/>
-                </a:ext>
-              </a:extLst>
-            </p:cNvPr>
-            <p:cNvPicPr>
-              <a:picLocks noChangeAspect="1"/>
-            </p:cNvPicPr>
-            <p:nvPr/>
-          </p:nvPicPr>
-          <p:blipFill rotWithShape="1">
-            <a:blip r:embed="rId3"/>
-            <a:srcRect t="73704" r="82834"/>
-            <a:stretch/>
-          </p:blipFill>
-          <p:spPr>
-            <a:xfrm>
-              <a:off x="3247355" y="4150238"/>
-              <a:ext cx="706283" cy="688482"/>
-            </a:xfrm>
-            <a:prstGeom prst="rect">
-              <a:avLst/>
-            </a:prstGeom>
-          </p:spPr>
-        </p:pic>
-        <p:pic>
-          <p:nvPicPr>
-            <p:cNvPr id="35" name="Picture 34" descr="A screenshot of a video game&#10;&#10;Description automatically generated">
-              <a:extLst>
-                <a:ext uri="{FF2B5EF4-FFF2-40B4-BE49-F238E27FC236}">
-                  <a16:creationId xmlns:a16="http://schemas.microsoft.com/office/drawing/2014/main" id="{161F5E24-C71C-ADB0-852E-C9E2B085A54F}"/>
-                </a:ext>
-              </a:extLst>
-            </p:cNvPr>
-            <p:cNvPicPr>
-              <a:picLocks noChangeAspect="1"/>
-            </p:cNvPicPr>
-            <p:nvPr/>
-          </p:nvPicPr>
-          <p:blipFill rotWithShape="1">
-            <a:blip r:embed="rId3"/>
-            <a:srcRect t="73704" r="82834"/>
-            <a:stretch/>
-          </p:blipFill>
-          <p:spPr>
-            <a:xfrm>
-              <a:off x="3878292" y="4150238"/>
-              <a:ext cx="706283" cy="688482"/>
-            </a:xfrm>
-            <a:prstGeom prst="rect">
-              <a:avLst/>
-            </a:prstGeom>
-          </p:spPr>
-        </p:pic>
-        <p:pic>
-          <p:nvPicPr>
-            <p:cNvPr id="36" name="Picture 35" descr="A screenshot of a video game&#10;&#10;Description automatically generated">
-              <a:extLst>
-                <a:ext uri="{FF2B5EF4-FFF2-40B4-BE49-F238E27FC236}">
-                  <a16:creationId xmlns:a16="http://schemas.microsoft.com/office/drawing/2014/main" id="{11073E5A-9D94-E1ED-951F-2A642C3DF213}"/>
-                </a:ext>
-              </a:extLst>
-            </p:cNvPr>
-            <p:cNvPicPr>
-              <a:picLocks noChangeAspect="1"/>
-            </p:cNvPicPr>
-            <p:nvPr/>
-          </p:nvPicPr>
-          <p:blipFill rotWithShape="1">
-            <a:blip r:embed="rId3"/>
-            <a:srcRect t="73704" r="82834"/>
-            <a:stretch/>
-          </p:blipFill>
-          <p:spPr>
-            <a:xfrm>
-              <a:off x="1147094" y="4836038"/>
-              <a:ext cx="706283" cy="688482"/>
-            </a:xfrm>
-            <a:prstGeom prst="rect">
-              <a:avLst/>
-            </a:prstGeom>
-          </p:spPr>
-        </p:pic>
-        <p:pic>
-          <p:nvPicPr>
-            <p:cNvPr id="37" name="Picture 36" descr="A screenshot of a video game&#10;&#10;Description automatically generated">
-              <a:extLst>
-                <a:ext uri="{FF2B5EF4-FFF2-40B4-BE49-F238E27FC236}">
-                  <a16:creationId xmlns:a16="http://schemas.microsoft.com/office/drawing/2014/main" id="{FF297943-00B3-E05A-24E2-36B4F7FFFB57}"/>
-                </a:ext>
-              </a:extLst>
-            </p:cNvPr>
-            <p:cNvPicPr>
-              <a:picLocks noChangeAspect="1"/>
-            </p:cNvPicPr>
-            <p:nvPr/>
-          </p:nvPicPr>
-          <p:blipFill rotWithShape="1">
-            <a:blip r:embed="rId3"/>
-            <a:srcRect t="73704" r="82834"/>
-            <a:stretch/>
-          </p:blipFill>
-          <p:spPr>
-            <a:xfrm>
-              <a:off x="1850279" y="4836038"/>
-              <a:ext cx="706283" cy="688482"/>
-            </a:xfrm>
-            <a:prstGeom prst="rect">
-              <a:avLst/>
-            </a:prstGeom>
-          </p:spPr>
-        </p:pic>
-        <p:pic>
-          <p:nvPicPr>
-            <p:cNvPr id="38" name="Picture 37" descr="A screenshot of a video game&#10;&#10;Description automatically generated">
-              <a:extLst>
-                <a:ext uri="{FF2B5EF4-FFF2-40B4-BE49-F238E27FC236}">
-                  <a16:creationId xmlns:a16="http://schemas.microsoft.com/office/drawing/2014/main" id="{0135A7CC-6623-0B58-7541-B14B11E1E5F9}"/>
-                </a:ext>
-              </a:extLst>
-            </p:cNvPr>
-            <p:cNvPicPr>
-              <a:picLocks noChangeAspect="1"/>
-            </p:cNvPicPr>
-            <p:nvPr/>
-          </p:nvPicPr>
-          <p:blipFill rotWithShape="1">
-            <a:blip r:embed="rId3"/>
-            <a:srcRect t="73704" r="82834"/>
-            <a:stretch/>
-          </p:blipFill>
-          <p:spPr>
-            <a:xfrm>
-              <a:off x="2550366" y="4836038"/>
-              <a:ext cx="706283" cy="688482"/>
-            </a:xfrm>
-            <a:prstGeom prst="rect">
-              <a:avLst/>
-            </a:prstGeom>
-          </p:spPr>
-        </p:pic>
-        <p:pic>
-          <p:nvPicPr>
-            <p:cNvPr id="39" name="Picture 38" descr="A screenshot of a video game&#10;&#10;Description automatically generated">
-              <a:extLst>
-                <a:ext uri="{FF2B5EF4-FFF2-40B4-BE49-F238E27FC236}">
-                  <a16:creationId xmlns:a16="http://schemas.microsoft.com/office/drawing/2014/main" id="{E11BDB87-8703-A954-7878-704902395AC3}"/>
-                </a:ext>
-              </a:extLst>
-            </p:cNvPr>
-            <p:cNvPicPr>
-              <a:picLocks noChangeAspect="1"/>
-            </p:cNvPicPr>
-            <p:nvPr/>
-          </p:nvPicPr>
-          <p:blipFill rotWithShape="1">
-            <a:blip r:embed="rId3"/>
-            <a:srcRect t="73704" r="82834"/>
-            <a:stretch/>
-          </p:blipFill>
-          <p:spPr>
-            <a:xfrm>
-              <a:off x="3247355" y="4836038"/>
-              <a:ext cx="706283" cy="688482"/>
-            </a:xfrm>
-            <a:prstGeom prst="rect">
-              <a:avLst/>
-            </a:prstGeom>
-          </p:spPr>
-        </p:pic>
-        <p:pic>
-          <p:nvPicPr>
-            <p:cNvPr id="40" name="Picture 39" descr="A screenshot of a video game&#10;&#10;Description automatically generated">
-              <a:extLst>
-                <a:ext uri="{FF2B5EF4-FFF2-40B4-BE49-F238E27FC236}">
-                  <a16:creationId xmlns:a16="http://schemas.microsoft.com/office/drawing/2014/main" id="{E43228D9-0B19-4FBF-23F5-5E2ABDE0E004}"/>
-                </a:ext>
-              </a:extLst>
-            </p:cNvPr>
-            <p:cNvPicPr>
-              <a:picLocks noChangeAspect="1"/>
-            </p:cNvPicPr>
-            <p:nvPr/>
-          </p:nvPicPr>
-          <p:blipFill rotWithShape="1">
-            <a:blip r:embed="rId3"/>
-            <a:srcRect t="73704" r="82834"/>
-            <a:stretch/>
-          </p:blipFill>
-          <p:spPr>
-            <a:xfrm>
-              <a:off x="3878292" y="4836038"/>
-              <a:ext cx="706283" cy="688482"/>
-            </a:xfrm>
-            <a:prstGeom prst="rect">
-              <a:avLst/>
-            </a:prstGeom>
-          </p:spPr>
-        </p:pic>
-        <p:pic>
-          <p:nvPicPr>
-            <p:cNvPr id="41" name="Picture 40" descr="A screenshot of a video game&#10;&#10;Description automatically generated">
-              <a:extLst>
-                <a:ext uri="{FF2B5EF4-FFF2-40B4-BE49-F238E27FC236}">
-                  <a16:creationId xmlns:a16="http://schemas.microsoft.com/office/drawing/2014/main" id="{EC6F1377-877E-B7C8-7AB0-8FFB3C67AD4E}"/>
-                </a:ext>
-              </a:extLst>
-            </p:cNvPr>
-            <p:cNvPicPr>
-              <a:picLocks noChangeAspect="1"/>
-            </p:cNvPicPr>
-            <p:nvPr/>
-          </p:nvPicPr>
-          <p:blipFill rotWithShape="1">
-            <a:blip r:embed="rId3"/>
-            <a:srcRect t="73704" r="82834"/>
-            <a:stretch/>
-          </p:blipFill>
-          <p:spPr>
-            <a:xfrm>
-              <a:off x="1147094" y="5521838"/>
-              <a:ext cx="706283" cy="688482"/>
-            </a:xfrm>
-            <a:prstGeom prst="rect">
-              <a:avLst/>
-            </a:prstGeom>
-          </p:spPr>
-        </p:pic>
-        <p:pic>
-          <p:nvPicPr>
-            <p:cNvPr id="42" name="Picture 41" descr="A screenshot of a video game&#10;&#10;Description automatically generated">
-              <a:extLst>
-                <a:ext uri="{FF2B5EF4-FFF2-40B4-BE49-F238E27FC236}">
-                  <a16:creationId xmlns:a16="http://schemas.microsoft.com/office/drawing/2014/main" id="{134C2CDE-6799-F51E-601E-049FB0E2847E}"/>
-                </a:ext>
-              </a:extLst>
-            </p:cNvPr>
-            <p:cNvPicPr>
-              <a:picLocks noChangeAspect="1"/>
-            </p:cNvPicPr>
-            <p:nvPr/>
-          </p:nvPicPr>
-          <p:blipFill rotWithShape="1">
-            <a:blip r:embed="rId3"/>
-            <a:srcRect t="73704" r="82834"/>
-            <a:stretch/>
-          </p:blipFill>
-          <p:spPr>
-            <a:xfrm>
-              <a:off x="1850279" y="5521838"/>
-              <a:ext cx="706283" cy="688482"/>
-            </a:xfrm>
-            <a:prstGeom prst="rect">
-              <a:avLst/>
-            </a:prstGeom>
-          </p:spPr>
-        </p:pic>
-        <p:pic>
-          <p:nvPicPr>
-            <p:cNvPr id="43" name="Picture 42" descr="A screenshot of a video game&#10;&#10;Description automatically generated">
-              <a:extLst>
-                <a:ext uri="{FF2B5EF4-FFF2-40B4-BE49-F238E27FC236}">
-                  <a16:creationId xmlns:a16="http://schemas.microsoft.com/office/drawing/2014/main" id="{D2AE8903-2260-0537-3F56-2B25CADF8F37}"/>
-                </a:ext>
-              </a:extLst>
-            </p:cNvPr>
-            <p:cNvPicPr>
-              <a:picLocks noChangeAspect="1"/>
-            </p:cNvPicPr>
-            <p:nvPr/>
-          </p:nvPicPr>
-          <p:blipFill rotWithShape="1">
-            <a:blip r:embed="rId3"/>
-            <a:srcRect t="73704" r="82834"/>
-            <a:stretch/>
-          </p:blipFill>
-          <p:spPr>
-            <a:xfrm>
-              <a:off x="2550366" y="5521838"/>
-              <a:ext cx="706283" cy="688482"/>
-            </a:xfrm>
-            <a:prstGeom prst="rect">
-              <a:avLst/>
-            </a:prstGeom>
-          </p:spPr>
-        </p:pic>
-        <p:pic>
-          <p:nvPicPr>
-            <p:cNvPr id="44" name="Picture 43" descr="A screenshot of a video game&#10;&#10;Description automatically generated">
-              <a:extLst>
-                <a:ext uri="{FF2B5EF4-FFF2-40B4-BE49-F238E27FC236}">
-                  <a16:creationId xmlns:a16="http://schemas.microsoft.com/office/drawing/2014/main" id="{C92FB757-CC2A-66D7-746C-EB61AC32B3F3}"/>
-                </a:ext>
-              </a:extLst>
-            </p:cNvPr>
-            <p:cNvPicPr>
-              <a:picLocks noChangeAspect="1"/>
-            </p:cNvPicPr>
-            <p:nvPr/>
-          </p:nvPicPr>
-          <p:blipFill rotWithShape="1">
-            <a:blip r:embed="rId3"/>
-            <a:srcRect t="73704" r="82834"/>
-            <a:stretch/>
-          </p:blipFill>
-          <p:spPr>
-            <a:xfrm>
-              <a:off x="3247355" y="5521838"/>
-              <a:ext cx="706283" cy="688482"/>
-            </a:xfrm>
-            <a:prstGeom prst="rect">
-              <a:avLst/>
-            </a:prstGeom>
-          </p:spPr>
-        </p:pic>
-        <p:pic>
-          <p:nvPicPr>
-            <p:cNvPr id="45" name="Picture 44" descr="A screenshot of a video game&#10;&#10;Description automatically generated">
-              <a:extLst>
-                <a:ext uri="{FF2B5EF4-FFF2-40B4-BE49-F238E27FC236}">
-                  <a16:creationId xmlns:a16="http://schemas.microsoft.com/office/drawing/2014/main" id="{61B0BF68-C905-D402-EF80-EC2DD5D93271}"/>
-                </a:ext>
-              </a:extLst>
-            </p:cNvPr>
-            <p:cNvPicPr>
-              <a:picLocks noChangeAspect="1"/>
-            </p:cNvPicPr>
-            <p:nvPr/>
-          </p:nvPicPr>
-          <p:blipFill rotWithShape="1">
-            <a:blip r:embed="rId3"/>
-            <a:srcRect t="73704" r="82834"/>
-            <a:stretch/>
-          </p:blipFill>
-          <p:spPr>
-            <a:xfrm>
-              <a:off x="3878292" y="5521838"/>
-              <a:ext cx="706283" cy="688482"/>
-            </a:xfrm>
-            <a:prstGeom prst="rect">
-              <a:avLst/>
-            </a:prstGeom>
-          </p:spPr>
-        </p:pic>
-      </p:grpSp>
       <p:pic>
         <p:nvPicPr>
-          <p:cNvPr id="46" name="Picture 45" descr="A screenshot of a video game&#10;&#10;Description automatically generated">
-            <a:extLst>
-              <a:ext uri="{FF2B5EF4-FFF2-40B4-BE49-F238E27FC236}">
-                <a16:creationId xmlns:a16="http://schemas.microsoft.com/office/drawing/2014/main" id="{71E60502-6938-478D-8CA2-727D9BE33279}"/>
+          <p:cNvPr id="3" name="Picture 2">
+            <a:extLst>
+              <a:ext uri="{FF2B5EF4-FFF2-40B4-BE49-F238E27FC236}">
+                <a16:creationId xmlns:a16="http://schemas.microsoft.com/office/drawing/2014/main" id="{FEE02064-7E97-1E73-95C2-9763F77092C3}"/>
               </a:ext>
             </a:extLst>
           </p:cNvPr>
@@ -7582,36 +6411,7 @@
           <p:nvPr/>
         </p:nvPicPr>
         <p:blipFill rotWithShape="1">
-          <a:blip r:embed="rId4"/>
-          <a:srcRect t="50679" r="36435"/>
-          <a:stretch/>
-        </p:blipFill>
-        <p:spPr>
-          <a:xfrm>
-            <a:off x="6987931" y="784150"/>
-            <a:ext cx="1219315" cy="1248315"/>
-          </a:xfrm>
-          <a:prstGeom prst="rect">
-            <a:avLst/>
-          </a:prstGeom>
-        </p:spPr>
-      </p:pic>
-      <p:pic>
-        <p:nvPicPr>
-          <p:cNvPr id="3" name="Picture 2">
-            <a:extLst>
-              <a:ext uri="{FF2B5EF4-FFF2-40B4-BE49-F238E27FC236}">
-                <a16:creationId xmlns:a16="http://schemas.microsoft.com/office/drawing/2014/main" id="{FEE02064-7E97-1E73-95C2-9763F77092C3}"/>
-              </a:ext>
-            </a:extLst>
-          </p:cNvPr>
-          <p:cNvPicPr>
-            <a:picLocks noChangeAspect="1"/>
-          </p:cNvPicPr>
-          <p:nvPr/>
-        </p:nvPicPr>
-        <p:blipFill rotWithShape="1">
-          <a:blip r:embed="rId5"/>
+          <a:blip r:embed="rId3"/>
           <a:srcRect l="40935" r="39058" b="64143"/>
           <a:stretch/>
         </p:blipFill>
@@ -7679,6 +6479,239 @@
           <a:xfrm>
             <a:off x="7851907" y="2976215"/>
             <a:ext cx="2489814" cy="3285171"/>
+          </a:xfrm>
+          <a:prstGeom prst="rect">
+            <a:avLst/>
+          </a:prstGeom>
+        </p:spPr>
+      </p:pic>
+      <p:pic>
+        <p:nvPicPr>
+          <p:cNvPr id="2" name="Picture 1" descr="A yellow and orange background&#10;&#10;Description automatically generated">
+            <a:extLst>
+              <a:ext uri="{FF2B5EF4-FFF2-40B4-BE49-F238E27FC236}">
+                <a16:creationId xmlns:a16="http://schemas.microsoft.com/office/drawing/2014/main" id="{E0DAC836-1EE6-73C5-EE2B-D1EB5EAA75CC}"/>
+              </a:ext>
+            </a:extLst>
+          </p:cNvPr>
+          <p:cNvPicPr>
+            <a:picLocks noChangeAspect="1"/>
+          </p:cNvPicPr>
+          <p:nvPr/>
+        </p:nvPicPr>
+        <p:blipFill>
+          <a:blip r:embed="rId5"/>
+          <a:stretch>
+            <a:fillRect/>
+          </a:stretch>
+        </p:blipFill>
+        <p:spPr>
+          <a:xfrm>
+            <a:off x="536887" y="171450"/>
+            <a:ext cx="4088716" cy="6686550"/>
+          </a:xfrm>
+          <a:prstGeom prst="rect">
+            <a:avLst/>
+          </a:prstGeom>
+        </p:spPr>
+      </p:pic>
+      <p:pic>
+        <p:nvPicPr>
+          <p:cNvPr id="49" name="Picture 48" descr="A screenshot of a video game&#10;&#10;Description automatically generated">
+            <a:extLst>
+              <a:ext uri="{FF2B5EF4-FFF2-40B4-BE49-F238E27FC236}">
+                <a16:creationId xmlns:a16="http://schemas.microsoft.com/office/drawing/2014/main" id="{0D7E0268-17B0-9BFF-F7E9-637473E601BA}"/>
+              </a:ext>
+            </a:extLst>
+          </p:cNvPr>
+          <p:cNvPicPr>
+            <a:picLocks noChangeAspect="1"/>
+          </p:cNvPicPr>
+          <p:nvPr/>
+        </p:nvPicPr>
+        <p:blipFill rotWithShape="1">
+          <a:blip r:embed="rId4"/>
+          <a:srcRect t="50679" r="36435"/>
+          <a:stretch/>
+        </p:blipFill>
+        <p:spPr>
+          <a:xfrm>
+            <a:off x="536887" y="309690"/>
+            <a:ext cx="1419255" cy="1453010"/>
+          </a:xfrm>
+          <a:prstGeom prst="rect">
+            <a:avLst/>
+          </a:prstGeom>
+        </p:spPr>
+      </p:pic>
+      <p:pic>
+        <p:nvPicPr>
+          <p:cNvPr id="50" name="Picture 49" descr="A screenshot of a video game&#10;&#10;Description automatically generated">
+            <a:extLst>
+              <a:ext uri="{FF2B5EF4-FFF2-40B4-BE49-F238E27FC236}">
+                <a16:creationId xmlns:a16="http://schemas.microsoft.com/office/drawing/2014/main" id="{5121B4A4-965E-EF0B-B026-FBA1846EF1EE}"/>
+              </a:ext>
+            </a:extLst>
+          </p:cNvPr>
+          <p:cNvPicPr>
+            <a:picLocks noChangeAspect="1"/>
+          </p:cNvPicPr>
+          <p:nvPr/>
+        </p:nvPicPr>
+        <p:blipFill rotWithShape="1">
+          <a:blip r:embed="rId4"/>
+          <a:srcRect l="1" t="17816" r="67208" b="74721"/>
+          <a:stretch/>
+        </p:blipFill>
+        <p:spPr>
+          <a:xfrm>
+            <a:off x="3490735" y="5981283"/>
+            <a:ext cx="816431" cy="245130"/>
+          </a:xfrm>
+          <a:prstGeom prst="rect">
+            <a:avLst/>
+          </a:prstGeom>
+        </p:spPr>
+      </p:pic>
+      <p:pic>
+        <p:nvPicPr>
+          <p:cNvPr id="51" name="Picture 50" descr="A screenshot of a video game&#10;&#10;Description automatically generated">
+            <a:extLst>
+              <a:ext uri="{FF2B5EF4-FFF2-40B4-BE49-F238E27FC236}">
+                <a16:creationId xmlns:a16="http://schemas.microsoft.com/office/drawing/2014/main" id="{428BB0DC-E268-995A-B108-A729428902FC}"/>
+              </a:ext>
+            </a:extLst>
+          </p:cNvPr>
+          <p:cNvPicPr>
+            <a:picLocks noChangeAspect="1"/>
+          </p:cNvPicPr>
+          <p:nvPr/>
+        </p:nvPicPr>
+        <p:blipFill rotWithShape="1">
+          <a:blip r:embed="rId4"/>
+          <a:srcRect l="26855" t="6960" r="67208" b="74722"/>
+          <a:stretch/>
+        </p:blipFill>
+        <p:spPr>
+          <a:xfrm>
+            <a:off x="4159349" y="5624741"/>
+            <a:ext cx="147817" cy="601672"/>
+          </a:xfrm>
+          <a:prstGeom prst="rect">
+            <a:avLst/>
+          </a:prstGeom>
+        </p:spPr>
+      </p:pic>
+      <p:pic>
+        <p:nvPicPr>
+          <p:cNvPr id="52" name="Picture 51" descr="A screenshot of a video game&#10;&#10;Description automatically generated">
+            <a:extLst>
+              <a:ext uri="{FF2B5EF4-FFF2-40B4-BE49-F238E27FC236}">
+                <a16:creationId xmlns:a16="http://schemas.microsoft.com/office/drawing/2014/main" id="{C4C31D3E-8271-6889-CC12-A9BC2F40609E}"/>
+              </a:ext>
+            </a:extLst>
+          </p:cNvPr>
+          <p:cNvPicPr>
+            <a:picLocks noChangeAspect="1"/>
+          </p:cNvPicPr>
+          <p:nvPr/>
+        </p:nvPicPr>
+        <p:blipFill rotWithShape="1">
+          <a:blip r:embed="rId4"/>
+          <a:srcRect l="26855" t="6960" r="67208" b="74722"/>
+          <a:stretch/>
+        </p:blipFill>
+        <p:spPr>
+          <a:xfrm>
+            <a:off x="795697" y="2049566"/>
+            <a:ext cx="147817" cy="601672"/>
+          </a:xfrm>
+          <a:prstGeom prst="rect">
+            <a:avLst/>
+          </a:prstGeom>
+        </p:spPr>
+      </p:pic>
+      <p:pic>
+        <p:nvPicPr>
+          <p:cNvPr id="53" name="Picture 52" descr="A screenshot of a video game&#10;&#10;Description automatically generated">
+            <a:extLst>
+              <a:ext uri="{FF2B5EF4-FFF2-40B4-BE49-F238E27FC236}">
+                <a16:creationId xmlns:a16="http://schemas.microsoft.com/office/drawing/2014/main" id="{2550F10A-3C46-18BC-EACB-62B15B431CFB}"/>
+              </a:ext>
+            </a:extLst>
+          </p:cNvPr>
+          <p:cNvPicPr>
+            <a:picLocks noChangeAspect="1"/>
+          </p:cNvPicPr>
+          <p:nvPr/>
+        </p:nvPicPr>
+        <p:blipFill rotWithShape="1">
+          <a:blip r:embed="rId4"/>
+          <a:srcRect l="-205" t="-344" r="88228" b="91610"/>
+          <a:stretch/>
+        </p:blipFill>
+        <p:spPr>
+          <a:xfrm>
+            <a:off x="816827" y="1762700"/>
+            <a:ext cx="298208" cy="286866"/>
+          </a:xfrm>
+          <a:prstGeom prst="rect">
+            <a:avLst/>
+          </a:prstGeom>
+        </p:spPr>
+      </p:pic>
+      <p:pic>
+        <p:nvPicPr>
+          <p:cNvPr id="54" name="Picture 53" descr="A screenshot of a video game&#10;&#10;Description automatically generated">
+            <a:extLst>
+              <a:ext uri="{FF2B5EF4-FFF2-40B4-BE49-F238E27FC236}">
+                <a16:creationId xmlns:a16="http://schemas.microsoft.com/office/drawing/2014/main" id="{F50CB122-8E8D-5B0E-08AD-A1A1EBA8A8E0}"/>
+              </a:ext>
+            </a:extLst>
+          </p:cNvPr>
+          <p:cNvPicPr>
+            <a:picLocks noChangeAspect="1"/>
+          </p:cNvPicPr>
+          <p:nvPr/>
+        </p:nvPicPr>
+        <p:blipFill rotWithShape="1">
+          <a:blip r:embed="rId4"/>
+          <a:srcRect l="26855" t="6960" r="67208" b="74722"/>
+          <a:stretch/>
+        </p:blipFill>
+        <p:spPr>
+          <a:xfrm>
+            <a:off x="4159349" y="5179935"/>
+            <a:ext cx="147817" cy="601672"/>
+          </a:xfrm>
+          <a:prstGeom prst="rect">
+            <a:avLst/>
+          </a:prstGeom>
+        </p:spPr>
+      </p:pic>
+      <p:pic>
+        <p:nvPicPr>
+          <p:cNvPr id="55" name="Picture 54" descr="A screenshot of a video game&#10;&#10;Description automatically generated">
+            <a:extLst>
+              <a:ext uri="{FF2B5EF4-FFF2-40B4-BE49-F238E27FC236}">
+                <a16:creationId xmlns:a16="http://schemas.microsoft.com/office/drawing/2014/main" id="{35382508-1010-2FD1-09C8-F016A01F4B30}"/>
+              </a:ext>
+            </a:extLst>
+          </p:cNvPr>
+          <p:cNvPicPr>
+            <a:picLocks noChangeAspect="1"/>
+          </p:cNvPicPr>
+          <p:nvPr/>
+        </p:nvPicPr>
+        <p:blipFill rotWithShape="1">
+          <a:blip r:embed="rId4"/>
+          <a:srcRect l="26855" t="6960" r="67208" b="74722"/>
+          <a:stretch/>
+        </p:blipFill>
+        <p:spPr>
+          <a:xfrm>
+            <a:off x="4159349" y="4908473"/>
+            <a:ext cx="147817" cy="601672"/>
           </a:xfrm>
           <a:prstGeom prst="rect">
             <a:avLst/>

</xml_diff>

<commit_message>
add green and gold garden bg
</commit_message>
<xml_diff>
--- a/assets/sprites/farm_land_design.pptx
+++ b/assets/sprites/farm_land_design.pptx
@@ -7,6 +7,7 @@
   <p:sldIdLst>
     <p:sldId id="256" r:id="rId2"/>
     <p:sldId id="257" r:id="rId3"/>
+    <p:sldId id="258" r:id="rId4"/>
   </p:sldIdLst>
   <p:sldSz cx="12192000" cy="6858000"/>
   <p:notesSz cx="6858000" cy="9144000"/>
@@ -260,7 +261,7 @@
           <a:p>
             <a:fld id="{D55169DB-DC37-0147-99EF-2AFC2A26E125}" type="datetimeFigureOut">
               <a:rPr lang="en-US" smtClean="0"/>
-              <a:t>6/14/24</a:t>
+              <a:t>6/15/24</a:t>
             </a:fld>
             <a:endParaRPr lang="en-US"/>
           </a:p>
@@ -458,7 +459,7 @@
           <a:p>
             <a:fld id="{D55169DB-DC37-0147-99EF-2AFC2A26E125}" type="datetimeFigureOut">
               <a:rPr lang="en-US" smtClean="0"/>
-              <a:t>6/14/24</a:t>
+              <a:t>6/15/24</a:t>
             </a:fld>
             <a:endParaRPr lang="en-US"/>
           </a:p>
@@ -666,7 +667,7 @@
           <a:p>
             <a:fld id="{D55169DB-DC37-0147-99EF-2AFC2A26E125}" type="datetimeFigureOut">
               <a:rPr lang="en-US" smtClean="0"/>
-              <a:t>6/14/24</a:t>
+              <a:t>6/15/24</a:t>
             </a:fld>
             <a:endParaRPr lang="en-US"/>
           </a:p>
@@ -864,7 +865,7 @@
           <a:p>
             <a:fld id="{D55169DB-DC37-0147-99EF-2AFC2A26E125}" type="datetimeFigureOut">
               <a:rPr lang="en-US" smtClean="0"/>
-              <a:t>6/14/24</a:t>
+              <a:t>6/15/24</a:t>
             </a:fld>
             <a:endParaRPr lang="en-US"/>
           </a:p>
@@ -1139,7 +1140,7 @@
           <a:p>
             <a:fld id="{D55169DB-DC37-0147-99EF-2AFC2A26E125}" type="datetimeFigureOut">
               <a:rPr lang="en-US" smtClean="0"/>
-              <a:t>6/14/24</a:t>
+              <a:t>6/15/24</a:t>
             </a:fld>
             <a:endParaRPr lang="en-US"/>
           </a:p>
@@ -1404,7 +1405,7 @@
           <a:p>
             <a:fld id="{D55169DB-DC37-0147-99EF-2AFC2A26E125}" type="datetimeFigureOut">
               <a:rPr lang="en-US" smtClean="0"/>
-              <a:t>6/14/24</a:t>
+              <a:t>6/15/24</a:t>
             </a:fld>
             <a:endParaRPr lang="en-US"/>
           </a:p>
@@ -1816,7 +1817,7 @@
           <a:p>
             <a:fld id="{D55169DB-DC37-0147-99EF-2AFC2A26E125}" type="datetimeFigureOut">
               <a:rPr lang="en-US" smtClean="0"/>
-              <a:t>6/14/24</a:t>
+              <a:t>6/15/24</a:t>
             </a:fld>
             <a:endParaRPr lang="en-US"/>
           </a:p>
@@ -1957,7 +1958,7 @@
           <a:p>
             <a:fld id="{D55169DB-DC37-0147-99EF-2AFC2A26E125}" type="datetimeFigureOut">
               <a:rPr lang="en-US" smtClean="0"/>
-              <a:t>6/14/24</a:t>
+              <a:t>6/15/24</a:t>
             </a:fld>
             <a:endParaRPr lang="en-US"/>
           </a:p>
@@ -2070,7 +2071,7 @@
           <a:p>
             <a:fld id="{D55169DB-DC37-0147-99EF-2AFC2A26E125}" type="datetimeFigureOut">
               <a:rPr lang="en-US" smtClean="0"/>
-              <a:t>6/14/24</a:t>
+              <a:t>6/15/24</a:t>
             </a:fld>
             <a:endParaRPr lang="en-US"/>
           </a:p>
@@ -2381,7 +2382,7 @@
           <a:p>
             <a:fld id="{D55169DB-DC37-0147-99EF-2AFC2A26E125}" type="datetimeFigureOut">
               <a:rPr lang="en-US" smtClean="0"/>
-              <a:t>6/14/24</a:t>
+              <a:t>6/15/24</a:t>
             </a:fld>
             <a:endParaRPr lang="en-US"/>
           </a:p>
@@ -2669,7 +2670,7 @@
           <a:p>
             <a:fld id="{D55169DB-DC37-0147-99EF-2AFC2A26E125}" type="datetimeFigureOut">
               <a:rPr lang="en-US" smtClean="0"/>
-              <a:t>6/14/24</a:t>
+              <a:t>6/15/24</a:t>
             </a:fld>
             <a:endParaRPr lang="en-US"/>
           </a:p>
@@ -2910,7 +2911,7 @@
           <a:p>
             <a:fld id="{D55169DB-DC37-0147-99EF-2AFC2A26E125}" type="datetimeFigureOut">
               <a:rPr lang="en-US" smtClean="0"/>
-              <a:t>6/14/24</a:t>
+              <a:t>6/15/24</a:t>
             </a:fld>
             <a:endParaRPr lang="en-US"/>
           </a:p>
@@ -6337,6 +6338,36 @@
           </p:spPr>
         </p:pic>
       </p:grpSp>
+      <p:pic>
+        <p:nvPicPr>
+          <p:cNvPr id="12" name="Picture 11" descr="A screenshot of a video game&#10;&#10;Description automatically generated">
+            <a:extLst>
+              <a:ext uri="{FF2B5EF4-FFF2-40B4-BE49-F238E27FC236}">
+                <a16:creationId xmlns:a16="http://schemas.microsoft.com/office/drawing/2014/main" id="{4B35A253-3875-3419-AD0A-256469220859}"/>
+              </a:ext>
+            </a:extLst>
+          </p:cNvPr>
+          <p:cNvPicPr>
+            <a:picLocks noChangeAspect="1"/>
+          </p:cNvPicPr>
+          <p:nvPr/>
+        </p:nvPicPr>
+        <p:blipFill>
+          <a:blip r:embed="rId11"/>
+          <a:stretch>
+            <a:fillRect/>
+          </a:stretch>
+        </p:blipFill>
+        <p:spPr>
+          <a:xfrm>
+            <a:off x="8285177" y="312594"/>
+            <a:ext cx="3606800" cy="6045200"/>
+          </a:xfrm>
+          <a:prstGeom prst="rect">
+            <a:avLst/>
+          </a:prstGeom>
+        </p:spPr>
+      </p:pic>
     </p:spTree>
     <p:extLst>
       <p:ext uri="{BB962C8B-B14F-4D97-AF65-F5344CB8AC3E}">
@@ -6477,7 +6508,7 @@
         </p:blipFill>
         <p:spPr>
           <a:xfrm>
-            <a:off x="7851907" y="2976215"/>
+            <a:off x="9165299" y="2941242"/>
             <a:ext cx="2489814" cy="3285171"/>
           </a:xfrm>
           <a:prstGeom prst="rect">
@@ -6500,7 +6531,19 @@
           <p:nvPr/>
         </p:nvPicPr>
         <p:blipFill>
-          <a:blip r:embed="rId5"/>
+          <a:blip r:embed="rId5">
+            <a:extLst>
+              <a:ext uri="{BEBA8EAE-BF5A-486C-A8C5-ECC9F3942E4B}">
+                <a14:imgProps xmlns:a14="http://schemas.microsoft.com/office/drawing/2010/main">
+                  <a14:imgLayer r:embed="rId6">
+                    <a14:imgEffect>
+                      <a14:saturation sat="86000"/>
+                    </a14:imgEffect>
+                  </a14:imgLayer>
+                </a14:imgProps>
+              </a:ext>
+            </a:extLst>
+          </a:blip>
           <a:stretch>
             <a:fillRect/>
           </a:stretch>
@@ -6536,7 +6579,7 @@
         </p:blipFill>
         <p:spPr>
           <a:xfrm>
-            <a:off x="536887" y="309690"/>
+            <a:off x="536887" y="240570"/>
             <a:ext cx="1419255" cy="1453010"/>
           </a:xfrm>
           <a:prstGeom prst="rect">
@@ -6718,10 +6761,1787 @@
           </a:prstGeom>
         </p:spPr>
       </p:pic>
+      <p:pic>
+        <p:nvPicPr>
+          <p:cNvPr id="4" name="Picture 3" descr="A screenshot of a video game&#10;&#10;Description automatically generated">
+            <a:extLst>
+              <a:ext uri="{FF2B5EF4-FFF2-40B4-BE49-F238E27FC236}">
+                <a16:creationId xmlns:a16="http://schemas.microsoft.com/office/drawing/2014/main" id="{7818D1E0-2D55-B9CF-D834-CF47073AE2DE}"/>
+              </a:ext>
+            </a:extLst>
+          </p:cNvPr>
+          <p:cNvPicPr>
+            <a:picLocks noChangeAspect="1"/>
+          </p:cNvPicPr>
+          <p:nvPr/>
+        </p:nvPicPr>
+        <p:blipFill>
+          <a:blip r:embed="rId2"/>
+          <a:stretch>
+            <a:fillRect/>
+          </a:stretch>
+        </p:blipFill>
+        <p:spPr>
+          <a:xfrm>
+            <a:off x="8025632" y="883630"/>
+            <a:ext cx="1873879" cy="4164174"/>
+          </a:xfrm>
+          <a:prstGeom prst="rect">
+            <a:avLst/>
+          </a:prstGeom>
+        </p:spPr>
+      </p:pic>
     </p:spTree>
     <p:extLst>
       <p:ext uri="{BB962C8B-B14F-4D97-AF65-F5344CB8AC3E}">
         <p14:creationId xmlns:p14="http://schemas.microsoft.com/office/powerpoint/2010/main" val="846923436"/>
+      </p:ext>
+    </p:extLst>
+  </p:cSld>
+  <p:clrMapOvr>
+    <a:masterClrMapping/>
+  </p:clrMapOvr>
+</p:sld>
+</file>
+
+<file path=ppt/slides/slide3.xml><?xml version="1.0" encoding="utf-8"?>
+<p:sld xmlns:a="http://schemas.openxmlformats.org/drawingml/2006/main" xmlns:r="http://schemas.openxmlformats.org/officeDocument/2006/relationships" xmlns:p="http://schemas.openxmlformats.org/presentationml/2006/main">
+  <p:cSld>
+    <p:spTree>
+      <p:nvGrpSpPr>
+        <p:cNvPr id="1" name=""/>
+        <p:cNvGrpSpPr/>
+        <p:nvPr/>
+      </p:nvGrpSpPr>
+      <p:grpSpPr>
+        <a:xfrm>
+          <a:off x="0" y="0"/>
+          <a:ext cx="0" cy="0"/>
+          <a:chOff x="0" y="0"/>
+          <a:chExt cx="0" cy="0"/>
+        </a:xfrm>
+      </p:grpSpPr>
+      <p:pic>
+        <p:nvPicPr>
+          <p:cNvPr id="2" name="Picture 1" descr="A yellow and orange background&#10;&#10;Description automatically generated">
+            <a:extLst>
+              <a:ext uri="{FF2B5EF4-FFF2-40B4-BE49-F238E27FC236}">
+                <a16:creationId xmlns:a16="http://schemas.microsoft.com/office/drawing/2014/main" id="{E0DAC836-1EE6-73C5-EE2B-D1EB5EAA75CC}"/>
+              </a:ext>
+            </a:extLst>
+          </p:cNvPr>
+          <p:cNvPicPr>
+            <a:picLocks noChangeAspect="1"/>
+          </p:cNvPicPr>
+          <p:nvPr/>
+        </p:nvPicPr>
+        <p:blipFill>
+          <a:blip r:embed="rId2">
+            <a:extLst>
+              <a:ext uri="{BEBA8EAE-BF5A-486C-A8C5-ECC9F3942E4B}">
+                <a14:imgProps xmlns:a14="http://schemas.microsoft.com/office/drawing/2010/main">
+                  <a14:imgLayer r:embed="rId3">
+                    <a14:imgEffect>
+                      <a14:saturation sat="86000"/>
+                    </a14:imgEffect>
+                  </a14:imgLayer>
+                </a14:imgProps>
+              </a:ext>
+            </a:extLst>
+          </a:blip>
+          <a:stretch>
+            <a:fillRect/>
+          </a:stretch>
+        </p:blipFill>
+        <p:spPr>
+          <a:xfrm>
+            <a:off x="536887" y="171450"/>
+            <a:ext cx="4088716" cy="6686550"/>
+          </a:xfrm>
+          <a:prstGeom prst="rect">
+            <a:avLst/>
+          </a:prstGeom>
+        </p:spPr>
+      </p:pic>
+      <p:pic>
+        <p:nvPicPr>
+          <p:cNvPr id="50" name="Picture 49" descr="A screenshot of a video game&#10;&#10;Description automatically generated">
+            <a:extLst>
+              <a:ext uri="{FF2B5EF4-FFF2-40B4-BE49-F238E27FC236}">
+                <a16:creationId xmlns:a16="http://schemas.microsoft.com/office/drawing/2014/main" id="{5121B4A4-965E-EF0B-B026-FBA1846EF1EE}"/>
+              </a:ext>
+            </a:extLst>
+          </p:cNvPr>
+          <p:cNvPicPr>
+            <a:picLocks noChangeAspect="1"/>
+          </p:cNvPicPr>
+          <p:nvPr/>
+        </p:nvPicPr>
+        <p:blipFill rotWithShape="1">
+          <a:blip r:embed="rId4"/>
+          <a:srcRect l="1" t="17816" r="67208" b="74721"/>
+          <a:stretch/>
+        </p:blipFill>
+        <p:spPr>
+          <a:xfrm>
+            <a:off x="3490735" y="5981283"/>
+            <a:ext cx="816431" cy="245130"/>
+          </a:xfrm>
+          <a:prstGeom prst="rect">
+            <a:avLst/>
+          </a:prstGeom>
+        </p:spPr>
+      </p:pic>
+      <p:pic>
+        <p:nvPicPr>
+          <p:cNvPr id="51" name="Picture 50" descr="A screenshot of a video game&#10;&#10;Description automatically generated">
+            <a:extLst>
+              <a:ext uri="{FF2B5EF4-FFF2-40B4-BE49-F238E27FC236}">
+                <a16:creationId xmlns:a16="http://schemas.microsoft.com/office/drawing/2014/main" id="{428BB0DC-E268-995A-B108-A729428902FC}"/>
+              </a:ext>
+            </a:extLst>
+          </p:cNvPr>
+          <p:cNvPicPr>
+            <a:picLocks noChangeAspect="1"/>
+          </p:cNvPicPr>
+          <p:nvPr/>
+        </p:nvPicPr>
+        <p:blipFill rotWithShape="1">
+          <a:blip r:embed="rId4"/>
+          <a:srcRect l="26855" t="6960" r="67208" b="74722"/>
+          <a:stretch/>
+        </p:blipFill>
+        <p:spPr>
+          <a:xfrm>
+            <a:off x="4159349" y="5624741"/>
+            <a:ext cx="147817" cy="601672"/>
+          </a:xfrm>
+          <a:prstGeom prst="rect">
+            <a:avLst/>
+          </a:prstGeom>
+        </p:spPr>
+      </p:pic>
+      <p:pic>
+        <p:nvPicPr>
+          <p:cNvPr id="52" name="Picture 51" descr="A screenshot of a video game&#10;&#10;Description automatically generated">
+            <a:extLst>
+              <a:ext uri="{FF2B5EF4-FFF2-40B4-BE49-F238E27FC236}">
+                <a16:creationId xmlns:a16="http://schemas.microsoft.com/office/drawing/2014/main" id="{C4C31D3E-8271-6889-CC12-A9BC2F40609E}"/>
+              </a:ext>
+            </a:extLst>
+          </p:cNvPr>
+          <p:cNvPicPr>
+            <a:picLocks noChangeAspect="1"/>
+          </p:cNvPicPr>
+          <p:nvPr/>
+        </p:nvPicPr>
+        <p:blipFill rotWithShape="1">
+          <a:blip r:embed="rId4"/>
+          <a:srcRect l="26855" t="6960" r="67208" b="74722"/>
+          <a:stretch/>
+        </p:blipFill>
+        <p:spPr>
+          <a:xfrm>
+            <a:off x="795697" y="1978126"/>
+            <a:ext cx="147817" cy="601672"/>
+          </a:xfrm>
+          <a:prstGeom prst="rect">
+            <a:avLst/>
+          </a:prstGeom>
+        </p:spPr>
+      </p:pic>
+      <p:pic>
+        <p:nvPicPr>
+          <p:cNvPr id="53" name="Picture 52" descr="A screenshot of a video game&#10;&#10;Description automatically generated">
+            <a:extLst>
+              <a:ext uri="{FF2B5EF4-FFF2-40B4-BE49-F238E27FC236}">
+                <a16:creationId xmlns:a16="http://schemas.microsoft.com/office/drawing/2014/main" id="{2550F10A-3C46-18BC-EACB-62B15B431CFB}"/>
+              </a:ext>
+            </a:extLst>
+          </p:cNvPr>
+          <p:cNvPicPr>
+            <a:picLocks noChangeAspect="1"/>
+          </p:cNvPicPr>
+          <p:nvPr/>
+        </p:nvPicPr>
+        <p:blipFill rotWithShape="1">
+          <a:blip r:embed="rId4"/>
+          <a:srcRect l="-205" t="-344" r="88228" b="91610"/>
+          <a:stretch/>
+        </p:blipFill>
+        <p:spPr>
+          <a:xfrm>
+            <a:off x="816827" y="1705548"/>
+            <a:ext cx="298208" cy="286866"/>
+          </a:xfrm>
+          <a:prstGeom prst="rect">
+            <a:avLst/>
+          </a:prstGeom>
+        </p:spPr>
+      </p:pic>
+      <p:pic>
+        <p:nvPicPr>
+          <p:cNvPr id="54" name="Picture 53" descr="A screenshot of a video game&#10;&#10;Description automatically generated">
+            <a:extLst>
+              <a:ext uri="{FF2B5EF4-FFF2-40B4-BE49-F238E27FC236}">
+                <a16:creationId xmlns:a16="http://schemas.microsoft.com/office/drawing/2014/main" id="{F50CB122-8E8D-5B0E-08AD-A1A1EBA8A8E0}"/>
+              </a:ext>
+            </a:extLst>
+          </p:cNvPr>
+          <p:cNvPicPr>
+            <a:picLocks noChangeAspect="1"/>
+          </p:cNvPicPr>
+          <p:nvPr/>
+        </p:nvPicPr>
+        <p:blipFill rotWithShape="1">
+          <a:blip r:embed="rId4"/>
+          <a:srcRect l="26855" t="6960" r="67208" b="74722"/>
+          <a:stretch/>
+        </p:blipFill>
+        <p:spPr>
+          <a:xfrm>
+            <a:off x="4159349" y="5179935"/>
+            <a:ext cx="147817" cy="601672"/>
+          </a:xfrm>
+          <a:prstGeom prst="rect">
+            <a:avLst/>
+          </a:prstGeom>
+        </p:spPr>
+      </p:pic>
+      <p:pic>
+        <p:nvPicPr>
+          <p:cNvPr id="55" name="Picture 54" descr="A screenshot of a video game&#10;&#10;Description automatically generated">
+            <a:extLst>
+              <a:ext uri="{FF2B5EF4-FFF2-40B4-BE49-F238E27FC236}">
+                <a16:creationId xmlns:a16="http://schemas.microsoft.com/office/drawing/2014/main" id="{35382508-1010-2FD1-09C8-F016A01F4B30}"/>
+              </a:ext>
+            </a:extLst>
+          </p:cNvPr>
+          <p:cNvPicPr>
+            <a:picLocks noChangeAspect="1"/>
+          </p:cNvPicPr>
+          <p:nvPr/>
+        </p:nvPicPr>
+        <p:blipFill rotWithShape="1">
+          <a:blip r:embed="rId4"/>
+          <a:srcRect l="26855" t="6960" r="67208" b="74722"/>
+          <a:stretch/>
+        </p:blipFill>
+        <p:spPr>
+          <a:xfrm>
+            <a:off x="4159349" y="4908473"/>
+            <a:ext cx="147817" cy="601672"/>
+          </a:xfrm>
+          <a:prstGeom prst="rect">
+            <a:avLst/>
+          </a:prstGeom>
+        </p:spPr>
+      </p:pic>
+      <p:grpSp>
+        <p:nvGrpSpPr>
+          <p:cNvPr id="4" name="Group 3">
+            <a:extLst>
+              <a:ext uri="{FF2B5EF4-FFF2-40B4-BE49-F238E27FC236}">
+                <a16:creationId xmlns:a16="http://schemas.microsoft.com/office/drawing/2014/main" id="{A1DEC685-7E74-BE51-C44B-B71B7220D041}"/>
+              </a:ext>
+            </a:extLst>
+          </p:cNvPr>
+          <p:cNvGrpSpPr/>
+          <p:nvPr/>
+        </p:nvGrpSpPr>
+        <p:grpSpPr>
+          <a:xfrm>
+            <a:off x="4905543" y="171450"/>
+            <a:ext cx="4093720" cy="6686550"/>
+            <a:chOff x="1147094" y="721238"/>
+            <a:chExt cx="3437481" cy="5489082"/>
+          </a:xfrm>
+        </p:grpSpPr>
+        <p:pic>
+          <p:nvPicPr>
+            <p:cNvPr id="5" name="Picture 4" descr="A screenshot of a video game&#10;&#10;Description automatically generated">
+              <a:extLst>
+                <a:ext uri="{FF2B5EF4-FFF2-40B4-BE49-F238E27FC236}">
+                  <a16:creationId xmlns:a16="http://schemas.microsoft.com/office/drawing/2014/main" id="{D8A1303B-CC21-D232-C64C-E6FB73BC5745}"/>
+                </a:ext>
+              </a:extLst>
+            </p:cNvPr>
+            <p:cNvPicPr>
+              <a:picLocks noChangeAspect="1"/>
+            </p:cNvPicPr>
+            <p:nvPr/>
+          </p:nvPicPr>
+          <p:blipFill rotWithShape="1">
+            <a:blip r:embed="rId5"/>
+            <a:srcRect t="73704" r="82834"/>
+            <a:stretch/>
+          </p:blipFill>
+          <p:spPr>
+            <a:xfrm>
+              <a:off x="1147094" y="721238"/>
+              <a:ext cx="706283" cy="688482"/>
+            </a:xfrm>
+            <a:prstGeom prst="rect">
+              <a:avLst/>
+            </a:prstGeom>
+          </p:spPr>
+        </p:pic>
+        <p:pic>
+          <p:nvPicPr>
+            <p:cNvPr id="6" name="Picture 5" descr="A screenshot of a video game&#10;&#10;Description automatically generated">
+              <a:extLst>
+                <a:ext uri="{FF2B5EF4-FFF2-40B4-BE49-F238E27FC236}">
+                  <a16:creationId xmlns:a16="http://schemas.microsoft.com/office/drawing/2014/main" id="{681E7016-9B7B-8874-D0EF-437F53F1BF82}"/>
+                </a:ext>
+              </a:extLst>
+            </p:cNvPr>
+            <p:cNvPicPr>
+              <a:picLocks noChangeAspect="1"/>
+            </p:cNvPicPr>
+            <p:nvPr/>
+          </p:nvPicPr>
+          <p:blipFill rotWithShape="1">
+            <a:blip r:embed="rId5"/>
+            <a:srcRect t="73704" r="82834"/>
+            <a:stretch/>
+          </p:blipFill>
+          <p:spPr>
+            <a:xfrm>
+              <a:off x="1850279" y="721238"/>
+              <a:ext cx="706283" cy="688482"/>
+            </a:xfrm>
+            <a:prstGeom prst="rect">
+              <a:avLst/>
+            </a:prstGeom>
+          </p:spPr>
+        </p:pic>
+        <p:pic>
+          <p:nvPicPr>
+            <p:cNvPr id="7" name="Picture 6" descr="A screenshot of a video game&#10;&#10;Description automatically generated">
+              <a:extLst>
+                <a:ext uri="{FF2B5EF4-FFF2-40B4-BE49-F238E27FC236}">
+                  <a16:creationId xmlns:a16="http://schemas.microsoft.com/office/drawing/2014/main" id="{ED78C9E2-0693-02FD-107A-6F87F890D188}"/>
+                </a:ext>
+              </a:extLst>
+            </p:cNvPr>
+            <p:cNvPicPr>
+              <a:picLocks noChangeAspect="1"/>
+            </p:cNvPicPr>
+            <p:nvPr/>
+          </p:nvPicPr>
+          <p:blipFill rotWithShape="1">
+            <a:blip r:embed="rId5"/>
+            <a:srcRect t="73704" r="82834"/>
+            <a:stretch/>
+          </p:blipFill>
+          <p:spPr>
+            <a:xfrm>
+              <a:off x="2550366" y="721238"/>
+              <a:ext cx="706283" cy="688482"/>
+            </a:xfrm>
+            <a:prstGeom prst="rect">
+              <a:avLst/>
+            </a:prstGeom>
+          </p:spPr>
+        </p:pic>
+        <p:pic>
+          <p:nvPicPr>
+            <p:cNvPr id="8" name="Picture 7" descr="A screenshot of a video game&#10;&#10;Description automatically generated">
+              <a:extLst>
+                <a:ext uri="{FF2B5EF4-FFF2-40B4-BE49-F238E27FC236}">
+                  <a16:creationId xmlns:a16="http://schemas.microsoft.com/office/drawing/2014/main" id="{BABE3E09-A4E0-8252-C9E9-50A3BC483D58}"/>
+                </a:ext>
+              </a:extLst>
+            </p:cNvPr>
+            <p:cNvPicPr>
+              <a:picLocks noChangeAspect="1"/>
+            </p:cNvPicPr>
+            <p:nvPr/>
+          </p:nvPicPr>
+          <p:blipFill rotWithShape="1">
+            <a:blip r:embed="rId5"/>
+            <a:srcRect t="73704" r="82834"/>
+            <a:stretch/>
+          </p:blipFill>
+          <p:spPr>
+            <a:xfrm>
+              <a:off x="3247355" y="721238"/>
+              <a:ext cx="706283" cy="688482"/>
+            </a:xfrm>
+            <a:prstGeom prst="rect">
+              <a:avLst/>
+            </a:prstGeom>
+          </p:spPr>
+        </p:pic>
+        <p:pic>
+          <p:nvPicPr>
+            <p:cNvPr id="11" name="Picture 10" descr="A screenshot of a video game&#10;&#10;Description automatically generated">
+              <a:extLst>
+                <a:ext uri="{FF2B5EF4-FFF2-40B4-BE49-F238E27FC236}">
+                  <a16:creationId xmlns:a16="http://schemas.microsoft.com/office/drawing/2014/main" id="{3A046AB2-ED9C-05D0-ACC3-32DB3ACC5F88}"/>
+                </a:ext>
+              </a:extLst>
+            </p:cNvPr>
+            <p:cNvPicPr>
+              <a:picLocks noChangeAspect="1"/>
+            </p:cNvPicPr>
+            <p:nvPr/>
+          </p:nvPicPr>
+          <p:blipFill rotWithShape="1">
+            <a:blip r:embed="rId5"/>
+            <a:srcRect t="73704" r="82834"/>
+            <a:stretch/>
+          </p:blipFill>
+          <p:spPr>
+            <a:xfrm>
+              <a:off x="3878292" y="721238"/>
+              <a:ext cx="706283" cy="688482"/>
+            </a:xfrm>
+            <a:prstGeom prst="rect">
+              <a:avLst/>
+            </a:prstGeom>
+          </p:spPr>
+        </p:pic>
+        <p:pic>
+          <p:nvPicPr>
+            <p:cNvPr id="12" name="Picture 11" descr="A screenshot of a video game&#10;&#10;Description automatically generated">
+              <a:extLst>
+                <a:ext uri="{FF2B5EF4-FFF2-40B4-BE49-F238E27FC236}">
+                  <a16:creationId xmlns:a16="http://schemas.microsoft.com/office/drawing/2014/main" id="{D31D18BC-84B3-A07F-AA65-5D0128238B37}"/>
+                </a:ext>
+              </a:extLst>
+            </p:cNvPr>
+            <p:cNvPicPr>
+              <a:picLocks noChangeAspect="1"/>
+            </p:cNvPicPr>
+            <p:nvPr/>
+          </p:nvPicPr>
+          <p:blipFill rotWithShape="1">
+            <a:blip r:embed="rId5"/>
+            <a:srcRect t="73704" r="82834"/>
+            <a:stretch/>
+          </p:blipFill>
+          <p:spPr>
+            <a:xfrm>
+              <a:off x="1147094" y="1407038"/>
+              <a:ext cx="706283" cy="688482"/>
+            </a:xfrm>
+            <a:prstGeom prst="rect">
+              <a:avLst/>
+            </a:prstGeom>
+          </p:spPr>
+        </p:pic>
+        <p:pic>
+          <p:nvPicPr>
+            <p:cNvPr id="13" name="Picture 12" descr="A screenshot of a video game&#10;&#10;Description automatically generated">
+              <a:extLst>
+                <a:ext uri="{FF2B5EF4-FFF2-40B4-BE49-F238E27FC236}">
+                  <a16:creationId xmlns:a16="http://schemas.microsoft.com/office/drawing/2014/main" id="{5BCF601E-8D71-FE1A-E1FF-36CEA57C59BA}"/>
+                </a:ext>
+              </a:extLst>
+            </p:cNvPr>
+            <p:cNvPicPr>
+              <a:picLocks noChangeAspect="1"/>
+            </p:cNvPicPr>
+            <p:nvPr/>
+          </p:nvPicPr>
+          <p:blipFill rotWithShape="1">
+            <a:blip r:embed="rId5"/>
+            <a:srcRect t="73704" r="82834"/>
+            <a:stretch/>
+          </p:blipFill>
+          <p:spPr>
+            <a:xfrm>
+              <a:off x="1850279" y="1407038"/>
+              <a:ext cx="706283" cy="688482"/>
+            </a:xfrm>
+            <a:prstGeom prst="rect">
+              <a:avLst/>
+            </a:prstGeom>
+          </p:spPr>
+        </p:pic>
+        <p:pic>
+          <p:nvPicPr>
+            <p:cNvPr id="14" name="Picture 13" descr="A screenshot of a video game&#10;&#10;Description automatically generated">
+              <a:extLst>
+                <a:ext uri="{FF2B5EF4-FFF2-40B4-BE49-F238E27FC236}">
+                  <a16:creationId xmlns:a16="http://schemas.microsoft.com/office/drawing/2014/main" id="{14049F9F-624E-51E0-7896-717AE3987620}"/>
+                </a:ext>
+              </a:extLst>
+            </p:cNvPr>
+            <p:cNvPicPr>
+              <a:picLocks noChangeAspect="1"/>
+            </p:cNvPicPr>
+            <p:nvPr/>
+          </p:nvPicPr>
+          <p:blipFill rotWithShape="1">
+            <a:blip r:embed="rId5"/>
+            <a:srcRect t="73704" r="82834"/>
+            <a:stretch/>
+          </p:blipFill>
+          <p:spPr>
+            <a:xfrm>
+              <a:off x="2550366" y="1407038"/>
+              <a:ext cx="706283" cy="688482"/>
+            </a:xfrm>
+            <a:prstGeom prst="rect">
+              <a:avLst/>
+            </a:prstGeom>
+          </p:spPr>
+        </p:pic>
+        <p:pic>
+          <p:nvPicPr>
+            <p:cNvPr id="15" name="Picture 14" descr="A screenshot of a video game&#10;&#10;Description automatically generated">
+              <a:extLst>
+                <a:ext uri="{FF2B5EF4-FFF2-40B4-BE49-F238E27FC236}">
+                  <a16:creationId xmlns:a16="http://schemas.microsoft.com/office/drawing/2014/main" id="{66609412-F2CA-5410-08E2-D4FE25D6AC07}"/>
+                </a:ext>
+              </a:extLst>
+            </p:cNvPr>
+            <p:cNvPicPr>
+              <a:picLocks noChangeAspect="1"/>
+            </p:cNvPicPr>
+            <p:nvPr/>
+          </p:nvPicPr>
+          <p:blipFill rotWithShape="1">
+            <a:blip r:embed="rId5"/>
+            <a:srcRect t="73704" r="82834"/>
+            <a:stretch/>
+          </p:blipFill>
+          <p:spPr>
+            <a:xfrm>
+              <a:off x="3247355" y="1407038"/>
+              <a:ext cx="706283" cy="688482"/>
+            </a:xfrm>
+            <a:prstGeom prst="rect">
+              <a:avLst/>
+            </a:prstGeom>
+          </p:spPr>
+        </p:pic>
+        <p:pic>
+          <p:nvPicPr>
+            <p:cNvPr id="16" name="Picture 15" descr="A screenshot of a video game&#10;&#10;Description automatically generated">
+              <a:extLst>
+                <a:ext uri="{FF2B5EF4-FFF2-40B4-BE49-F238E27FC236}">
+                  <a16:creationId xmlns:a16="http://schemas.microsoft.com/office/drawing/2014/main" id="{8FC2F6AD-532F-04B0-B700-5DC578AF6AC7}"/>
+                </a:ext>
+              </a:extLst>
+            </p:cNvPr>
+            <p:cNvPicPr>
+              <a:picLocks noChangeAspect="1"/>
+            </p:cNvPicPr>
+            <p:nvPr/>
+          </p:nvPicPr>
+          <p:blipFill rotWithShape="1">
+            <a:blip r:embed="rId5"/>
+            <a:srcRect t="73704" r="82834"/>
+            <a:stretch/>
+          </p:blipFill>
+          <p:spPr>
+            <a:xfrm>
+              <a:off x="3878292" y="1407038"/>
+              <a:ext cx="706283" cy="688482"/>
+            </a:xfrm>
+            <a:prstGeom prst="rect">
+              <a:avLst/>
+            </a:prstGeom>
+          </p:spPr>
+        </p:pic>
+        <p:pic>
+          <p:nvPicPr>
+            <p:cNvPr id="17" name="Picture 16" descr="A screenshot of a video game&#10;&#10;Description automatically generated">
+              <a:extLst>
+                <a:ext uri="{FF2B5EF4-FFF2-40B4-BE49-F238E27FC236}">
+                  <a16:creationId xmlns:a16="http://schemas.microsoft.com/office/drawing/2014/main" id="{2EDF0EB4-2551-ECA4-589A-D8359F4C61B9}"/>
+                </a:ext>
+              </a:extLst>
+            </p:cNvPr>
+            <p:cNvPicPr>
+              <a:picLocks noChangeAspect="1"/>
+            </p:cNvPicPr>
+            <p:nvPr/>
+          </p:nvPicPr>
+          <p:blipFill rotWithShape="1">
+            <a:blip r:embed="rId5"/>
+            <a:srcRect t="73704" r="82834"/>
+            <a:stretch/>
+          </p:blipFill>
+          <p:spPr>
+            <a:xfrm>
+              <a:off x="1147094" y="2092838"/>
+              <a:ext cx="706283" cy="688482"/>
+            </a:xfrm>
+            <a:prstGeom prst="rect">
+              <a:avLst/>
+            </a:prstGeom>
+          </p:spPr>
+        </p:pic>
+        <p:pic>
+          <p:nvPicPr>
+            <p:cNvPr id="18" name="Picture 17" descr="A screenshot of a video game&#10;&#10;Description automatically generated">
+              <a:extLst>
+                <a:ext uri="{FF2B5EF4-FFF2-40B4-BE49-F238E27FC236}">
+                  <a16:creationId xmlns:a16="http://schemas.microsoft.com/office/drawing/2014/main" id="{7A43A500-8EE3-5D1E-0DC8-80F0E13971D6}"/>
+                </a:ext>
+              </a:extLst>
+            </p:cNvPr>
+            <p:cNvPicPr>
+              <a:picLocks noChangeAspect="1"/>
+            </p:cNvPicPr>
+            <p:nvPr/>
+          </p:nvPicPr>
+          <p:blipFill rotWithShape="1">
+            <a:blip r:embed="rId5"/>
+            <a:srcRect t="73704" r="82834"/>
+            <a:stretch/>
+          </p:blipFill>
+          <p:spPr>
+            <a:xfrm>
+              <a:off x="1850279" y="2092838"/>
+              <a:ext cx="706283" cy="688482"/>
+            </a:xfrm>
+            <a:prstGeom prst="rect">
+              <a:avLst/>
+            </a:prstGeom>
+          </p:spPr>
+        </p:pic>
+        <p:pic>
+          <p:nvPicPr>
+            <p:cNvPr id="19" name="Picture 18" descr="A screenshot of a video game&#10;&#10;Description automatically generated">
+              <a:extLst>
+                <a:ext uri="{FF2B5EF4-FFF2-40B4-BE49-F238E27FC236}">
+                  <a16:creationId xmlns:a16="http://schemas.microsoft.com/office/drawing/2014/main" id="{021209C8-7526-E33C-3C17-C0CB5DC26526}"/>
+                </a:ext>
+              </a:extLst>
+            </p:cNvPr>
+            <p:cNvPicPr>
+              <a:picLocks noChangeAspect="1"/>
+            </p:cNvPicPr>
+            <p:nvPr/>
+          </p:nvPicPr>
+          <p:blipFill rotWithShape="1">
+            <a:blip r:embed="rId5"/>
+            <a:srcRect t="73704" r="82834"/>
+            <a:stretch/>
+          </p:blipFill>
+          <p:spPr>
+            <a:xfrm>
+              <a:off x="2550366" y="2092838"/>
+              <a:ext cx="706283" cy="688482"/>
+            </a:xfrm>
+            <a:prstGeom prst="rect">
+              <a:avLst/>
+            </a:prstGeom>
+          </p:spPr>
+        </p:pic>
+        <p:pic>
+          <p:nvPicPr>
+            <p:cNvPr id="20" name="Picture 19" descr="A screenshot of a video game&#10;&#10;Description automatically generated">
+              <a:extLst>
+                <a:ext uri="{FF2B5EF4-FFF2-40B4-BE49-F238E27FC236}">
+                  <a16:creationId xmlns:a16="http://schemas.microsoft.com/office/drawing/2014/main" id="{341BE75F-90D5-AF8A-0F7F-2732DB1D8905}"/>
+                </a:ext>
+              </a:extLst>
+            </p:cNvPr>
+            <p:cNvPicPr>
+              <a:picLocks noChangeAspect="1"/>
+            </p:cNvPicPr>
+            <p:nvPr/>
+          </p:nvPicPr>
+          <p:blipFill rotWithShape="1">
+            <a:blip r:embed="rId5"/>
+            <a:srcRect t="73704" r="82834"/>
+            <a:stretch/>
+          </p:blipFill>
+          <p:spPr>
+            <a:xfrm>
+              <a:off x="3247355" y="2092838"/>
+              <a:ext cx="706283" cy="688482"/>
+            </a:xfrm>
+            <a:prstGeom prst="rect">
+              <a:avLst/>
+            </a:prstGeom>
+          </p:spPr>
+        </p:pic>
+        <p:pic>
+          <p:nvPicPr>
+            <p:cNvPr id="21" name="Picture 20" descr="A screenshot of a video game&#10;&#10;Description automatically generated">
+              <a:extLst>
+                <a:ext uri="{FF2B5EF4-FFF2-40B4-BE49-F238E27FC236}">
+                  <a16:creationId xmlns:a16="http://schemas.microsoft.com/office/drawing/2014/main" id="{BDFCD7C3-E9F6-8E4E-FB4B-5197B6634971}"/>
+                </a:ext>
+              </a:extLst>
+            </p:cNvPr>
+            <p:cNvPicPr>
+              <a:picLocks noChangeAspect="1"/>
+            </p:cNvPicPr>
+            <p:nvPr/>
+          </p:nvPicPr>
+          <p:blipFill rotWithShape="1">
+            <a:blip r:embed="rId5"/>
+            <a:srcRect t="73704" r="82834"/>
+            <a:stretch/>
+          </p:blipFill>
+          <p:spPr>
+            <a:xfrm>
+              <a:off x="3878292" y="2092838"/>
+              <a:ext cx="706283" cy="688482"/>
+            </a:xfrm>
+            <a:prstGeom prst="rect">
+              <a:avLst/>
+            </a:prstGeom>
+          </p:spPr>
+        </p:pic>
+        <p:pic>
+          <p:nvPicPr>
+            <p:cNvPr id="22" name="Picture 21" descr="A screenshot of a video game&#10;&#10;Description automatically generated">
+              <a:extLst>
+                <a:ext uri="{FF2B5EF4-FFF2-40B4-BE49-F238E27FC236}">
+                  <a16:creationId xmlns:a16="http://schemas.microsoft.com/office/drawing/2014/main" id="{B2687265-9510-44C7-6504-B9524039AD61}"/>
+                </a:ext>
+              </a:extLst>
+            </p:cNvPr>
+            <p:cNvPicPr>
+              <a:picLocks noChangeAspect="1"/>
+            </p:cNvPicPr>
+            <p:nvPr/>
+          </p:nvPicPr>
+          <p:blipFill rotWithShape="1">
+            <a:blip r:embed="rId5"/>
+            <a:srcRect t="73704" r="82834"/>
+            <a:stretch/>
+          </p:blipFill>
+          <p:spPr>
+            <a:xfrm>
+              <a:off x="1147094" y="2778638"/>
+              <a:ext cx="706283" cy="688482"/>
+            </a:xfrm>
+            <a:prstGeom prst="rect">
+              <a:avLst/>
+            </a:prstGeom>
+          </p:spPr>
+        </p:pic>
+        <p:pic>
+          <p:nvPicPr>
+            <p:cNvPr id="23" name="Picture 22" descr="A screenshot of a video game&#10;&#10;Description automatically generated">
+              <a:extLst>
+                <a:ext uri="{FF2B5EF4-FFF2-40B4-BE49-F238E27FC236}">
+                  <a16:creationId xmlns:a16="http://schemas.microsoft.com/office/drawing/2014/main" id="{9649B066-213C-C17B-7A66-3A1A788272B6}"/>
+                </a:ext>
+              </a:extLst>
+            </p:cNvPr>
+            <p:cNvPicPr>
+              <a:picLocks noChangeAspect="1"/>
+            </p:cNvPicPr>
+            <p:nvPr/>
+          </p:nvPicPr>
+          <p:blipFill rotWithShape="1">
+            <a:blip r:embed="rId5"/>
+            <a:srcRect t="73704" r="82834"/>
+            <a:stretch/>
+          </p:blipFill>
+          <p:spPr>
+            <a:xfrm>
+              <a:off x="1850279" y="2778638"/>
+              <a:ext cx="706283" cy="688482"/>
+            </a:xfrm>
+            <a:prstGeom prst="rect">
+              <a:avLst/>
+            </a:prstGeom>
+          </p:spPr>
+        </p:pic>
+        <p:pic>
+          <p:nvPicPr>
+            <p:cNvPr id="24" name="Picture 23" descr="A screenshot of a video game&#10;&#10;Description automatically generated">
+              <a:extLst>
+                <a:ext uri="{FF2B5EF4-FFF2-40B4-BE49-F238E27FC236}">
+                  <a16:creationId xmlns:a16="http://schemas.microsoft.com/office/drawing/2014/main" id="{94910F25-15F5-0FD9-4CAD-1245E71CD0CA}"/>
+                </a:ext>
+              </a:extLst>
+            </p:cNvPr>
+            <p:cNvPicPr>
+              <a:picLocks noChangeAspect="1"/>
+            </p:cNvPicPr>
+            <p:nvPr/>
+          </p:nvPicPr>
+          <p:blipFill rotWithShape="1">
+            <a:blip r:embed="rId5"/>
+            <a:srcRect t="73704" r="82834"/>
+            <a:stretch/>
+          </p:blipFill>
+          <p:spPr>
+            <a:xfrm>
+              <a:off x="2550366" y="2778638"/>
+              <a:ext cx="706283" cy="688482"/>
+            </a:xfrm>
+            <a:prstGeom prst="rect">
+              <a:avLst/>
+            </a:prstGeom>
+          </p:spPr>
+        </p:pic>
+        <p:pic>
+          <p:nvPicPr>
+            <p:cNvPr id="25" name="Picture 24" descr="A screenshot of a video game&#10;&#10;Description automatically generated">
+              <a:extLst>
+                <a:ext uri="{FF2B5EF4-FFF2-40B4-BE49-F238E27FC236}">
+                  <a16:creationId xmlns:a16="http://schemas.microsoft.com/office/drawing/2014/main" id="{10860DA8-09F0-B8BA-D11B-1D98FBEA45C7}"/>
+                </a:ext>
+              </a:extLst>
+            </p:cNvPr>
+            <p:cNvPicPr>
+              <a:picLocks noChangeAspect="1"/>
+            </p:cNvPicPr>
+            <p:nvPr/>
+          </p:nvPicPr>
+          <p:blipFill rotWithShape="1">
+            <a:blip r:embed="rId5"/>
+            <a:srcRect t="73704" r="82834"/>
+            <a:stretch/>
+          </p:blipFill>
+          <p:spPr>
+            <a:xfrm>
+              <a:off x="3247355" y="2778638"/>
+              <a:ext cx="706283" cy="688482"/>
+            </a:xfrm>
+            <a:prstGeom prst="rect">
+              <a:avLst/>
+            </a:prstGeom>
+          </p:spPr>
+        </p:pic>
+        <p:pic>
+          <p:nvPicPr>
+            <p:cNvPr id="26" name="Picture 25" descr="A screenshot of a video game&#10;&#10;Description automatically generated">
+              <a:extLst>
+                <a:ext uri="{FF2B5EF4-FFF2-40B4-BE49-F238E27FC236}">
+                  <a16:creationId xmlns:a16="http://schemas.microsoft.com/office/drawing/2014/main" id="{E58E3834-0078-622B-A6F0-E3FB3F8061EB}"/>
+                </a:ext>
+              </a:extLst>
+            </p:cNvPr>
+            <p:cNvPicPr>
+              <a:picLocks noChangeAspect="1"/>
+            </p:cNvPicPr>
+            <p:nvPr/>
+          </p:nvPicPr>
+          <p:blipFill rotWithShape="1">
+            <a:blip r:embed="rId5"/>
+            <a:srcRect t="73704" r="82834"/>
+            <a:stretch/>
+          </p:blipFill>
+          <p:spPr>
+            <a:xfrm>
+              <a:off x="3878292" y="2778638"/>
+              <a:ext cx="706283" cy="688482"/>
+            </a:xfrm>
+            <a:prstGeom prst="rect">
+              <a:avLst/>
+            </a:prstGeom>
+          </p:spPr>
+        </p:pic>
+        <p:pic>
+          <p:nvPicPr>
+            <p:cNvPr id="27" name="Picture 26" descr="A screenshot of a video game&#10;&#10;Description automatically generated">
+              <a:extLst>
+                <a:ext uri="{FF2B5EF4-FFF2-40B4-BE49-F238E27FC236}">
+                  <a16:creationId xmlns:a16="http://schemas.microsoft.com/office/drawing/2014/main" id="{AFB5B8BB-46AC-938C-14B7-85A26B954725}"/>
+                </a:ext>
+              </a:extLst>
+            </p:cNvPr>
+            <p:cNvPicPr>
+              <a:picLocks noChangeAspect="1"/>
+            </p:cNvPicPr>
+            <p:nvPr/>
+          </p:nvPicPr>
+          <p:blipFill rotWithShape="1">
+            <a:blip r:embed="rId5"/>
+            <a:srcRect t="73704" r="82834"/>
+            <a:stretch/>
+          </p:blipFill>
+          <p:spPr>
+            <a:xfrm>
+              <a:off x="1147094" y="3464438"/>
+              <a:ext cx="706283" cy="688482"/>
+            </a:xfrm>
+            <a:prstGeom prst="rect">
+              <a:avLst/>
+            </a:prstGeom>
+          </p:spPr>
+        </p:pic>
+        <p:pic>
+          <p:nvPicPr>
+            <p:cNvPr id="28" name="Picture 27" descr="A screenshot of a video game&#10;&#10;Description automatically generated">
+              <a:extLst>
+                <a:ext uri="{FF2B5EF4-FFF2-40B4-BE49-F238E27FC236}">
+                  <a16:creationId xmlns:a16="http://schemas.microsoft.com/office/drawing/2014/main" id="{38D8001D-ADC4-A686-B908-5DDB3DACA635}"/>
+                </a:ext>
+              </a:extLst>
+            </p:cNvPr>
+            <p:cNvPicPr>
+              <a:picLocks noChangeAspect="1"/>
+            </p:cNvPicPr>
+            <p:nvPr/>
+          </p:nvPicPr>
+          <p:blipFill rotWithShape="1">
+            <a:blip r:embed="rId5"/>
+            <a:srcRect t="73704" r="82834"/>
+            <a:stretch/>
+          </p:blipFill>
+          <p:spPr>
+            <a:xfrm>
+              <a:off x="1850279" y="3464438"/>
+              <a:ext cx="706283" cy="688482"/>
+            </a:xfrm>
+            <a:prstGeom prst="rect">
+              <a:avLst/>
+            </a:prstGeom>
+          </p:spPr>
+        </p:pic>
+        <p:pic>
+          <p:nvPicPr>
+            <p:cNvPr id="29" name="Picture 28" descr="A screenshot of a video game&#10;&#10;Description automatically generated">
+              <a:extLst>
+                <a:ext uri="{FF2B5EF4-FFF2-40B4-BE49-F238E27FC236}">
+                  <a16:creationId xmlns:a16="http://schemas.microsoft.com/office/drawing/2014/main" id="{78684480-3CAF-DC84-78A2-9DD3C236A8FF}"/>
+                </a:ext>
+              </a:extLst>
+            </p:cNvPr>
+            <p:cNvPicPr>
+              <a:picLocks noChangeAspect="1"/>
+            </p:cNvPicPr>
+            <p:nvPr/>
+          </p:nvPicPr>
+          <p:blipFill rotWithShape="1">
+            <a:blip r:embed="rId5"/>
+            <a:srcRect t="73704" r="82834"/>
+            <a:stretch/>
+          </p:blipFill>
+          <p:spPr>
+            <a:xfrm>
+              <a:off x="2550366" y="3464438"/>
+              <a:ext cx="706283" cy="688482"/>
+            </a:xfrm>
+            <a:prstGeom prst="rect">
+              <a:avLst/>
+            </a:prstGeom>
+          </p:spPr>
+        </p:pic>
+        <p:pic>
+          <p:nvPicPr>
+            <p:cNvPr id="30" name="Picture 29" descr="A screenshot of a video game&#10;&#10;Description automatically generated">
+              <a:extLst>
+                <a:ext uri="{FF2B5EF4-FFF2-40B4-BE49-F238E27FC236}">
+                  <a16:creationId xmlns:a16="http://schemas.microsoft.com/office/drawing/2014/main" id="{6E2E748F-529D-85F6-BCBA-B18C869CDB56}"/>
+                </a:ext>
+              </a:extLst>
+            </p:cNvPr>
+            <p:cNvPicPr>
+              <a:picLocks noChangeAspect="1"/>
+            </p:cNvPicPr>
+            <p:nvPr/>
+          </p:nvPicPr>
+          <p:blipFill rotWithShape="1">
+            <a:blip r:embed="rId5"/>
+            <a:srcRect t="73704" r="82834"/>
+            <a:stretch/>
+          </p:blipFill>
+          <p:spPr>
+            <a:xfrm>
+              <a:off x="3247355" y="3464438"/>
+              <a:ext cx="706283" cy="688482"/>
+            </a:xfrm>
+            <a:prstGeom prst="rect">
+              <a:avLst/>
+            </a:prstGeom>
+          </p:spPr>
+        </p:pic>
+        <p:pic>
+          <p:nvPicPr>
+            <p:cNvPr id="31" name="Picture 30" descr="A screenshot of a video game&#10;&#10;Description automatically generated">
+              <a:extLst>
+                <a:ext uri="{FF2B5EF4-FFF2-40B4-BE49-F238E27FC236}">
+                  <a16:creationId xmlns:a16="http://schemas.microsoft.com/office/drawing/2014/main" id="{9B70BD9C-6BEC-1D7A-C3B2-F16B61635E68}"/>
+                </a:ext>
+              </a:extLst>
+            </p:cNvPr>
+            <p:cNvPicPr>
+              <a:picLocks noChangeAspect="1"/>
+            </p:cNvPicPr>
+            <p:nvPr/>
+          </p:nvPicPr>
+          <p:blipFill rotWithShape="1">
+            <a:blip r:embed="rId5"/>
+            <a:srcRect t="73704" r="82834"/>
+            <a:stretch/>
+          </p:blipFill>
+          <p:spPr>
+            <a:xfrm>
+              <a:off x="3878292" y="3464438"/>
+              <a:ext cx="706283" cy="688482"/>
+            </a:xfrm>
+            <a:prstGeom prst="rect">
+              <a:avLst/>
+            </a:prstGeom>
+          </p:spPr>
+        </p:pic>
+        <p:pic>
+          <p:nvPicPr>
+            <p:cNvPr id="32" name="Picture 31" descr="A screenshot of a video game&#10;&#10;Description automatically generated">
+              <a:extLst>
+                <a:ext uri="{FF2B5EF4-FFF2-40B4-BE49-F238E27FC236}">
+                  <a16:creationId xmlns:a16="http://schemas.microsoft.com/office/drawing/2014/main" id="{06338339-663E-5C06-0972-C80290632301}"/>
+                </a:ext>
+              </a:extLst>
+            </p:cNvPr>
+            <p:cNvPicPr>
+              <a:picLocks noChangeAspect="1"/>
+            </p:cNvPicPr>
+            <p:nvPr/>
+          </p:nvPicPr>
+          <p:blipFill rotWithShape="1">
+            <a:blip r:embed="rId5"/>
+            <a:srcRect t="73704" r="82834"/>
+            <a:stretch/>
+          </p:blipFill>
+          <p:spPr>
+            <a:xfrm>
+              <a:off x="1147094" y="4150238"/>
+              <a:ext cx="706283" cy="688482"/>
+            </a:xfrm>
+            <a:prstGeom prst="rect">
+              <a:avLst/>
+            </a:prstGeom>
+          </p:spPr>
+        </p:pic>
+        <p:pic>
+          <p:nvPicPr>
+            <p:cNvPr id="33" name="Picture 32" descr="A screenshot of a video game&#10;&#10;Description automatically generated">
+              <a:extLst>
+                <a:ext uri="{FF2B5EF4-FFF2-40B4-BE49-F238E27FC236}">
+                  <a16:creationId xmlns:a16="http://schemas.microsoft.com/office/drawing/2014/main" id="{EA546F56-3615-DCE6-62B1-C246A7EC9B8A}"/>
+                </a:ext>
+              </a:extLst>
+            </p:cNvPr>
+            <p:cNvPicPr>
+              <a:picLocks noChangeAspect="1"/>
+            </p:cNvPicPr>
+            <p:nvPr/>
+          </p:nvPicPr>
+          <p:blipFill rotWithShape="1">
+            <a:blip r:embed="rId5"/>
+            <a:srcRect t="73704" r="82834"/>
+            <a:stretch/>
+          </p:blipFill>
+          <p:spPr>
+            <a:xfrm>
+              <a:off x="1850279" y="4150238"/>
+              <a:ext cx="706283" cy="688482"/>
+            </a:xfrm>
+            <a:prstGeom prst="rect">
+              <a:avLst/>
+            </a:prstGeom>
+          </p:spPr>
+        </p:pic>
+        <p:pic>
+          <p:nvPicPr>
+            <p:cNvPr id="34" name="Picture 33" descr="A screenshot of a video game&#10;&#10;Description automatically generated">
+              <a:extLst>
+                <a:ext uri="{FF2B5EF4-FFF2-40B4-BE49-F238E27FC236}">
+                  <a16:creationId xmlns:a16="http://schemas.microsoft.com/office/drawing/2014/main" id="{E2CA6910-4308-B01F-7A54-7E4AD01F5F9D}"/>
+                </a:ext>
+              </a:extLst>
+            </p:cNvPr>
+            <p:cNvPicPr>
+              <a:picLocks noChangeAspect="1"/>
+            </p:cNvPicPr>
+            <p:nvPr/>
+          </p:nvPicPr>
+          <p:blipFill rotWithShape="1">
+            <a:blip r:embed="rId5"/>
+            <a:srcRect t="73704" r="82834"/>
+            <a:stretch/>
+          </p:blipFill>
+          <p:spPr>
+            <a:xfrm>
+              <a:off x="2550366" y="4150238"/>
+              <a:ext cx="706283" cy="688482"/>
+            </a:xfrm>
+            <a:prstGeom prst="rect">
+              <a:avLst/>
+            </a:prstGeom>
+          </p:spPr>
+        </p:pic>
+        <p:pic>
+          <p:nvPicPr>
+            <p:cNvPr id="35" name="Picture 34" descr="A screenshot of a video game&#10;&#10;Description automatically generated">
+              <a:extLst>
+                <a:ext uri="{FF2B5EF4-FFF2-40B4-BE49-F238E27FC236}">
+                  <a16:creationId xmlns:a16="http://schemas.microsoft.com/office/drawing/2014/main" id="{3B63888F-4B18-2B3B-C204-9E8695C34F4F}"/>
+                </a:ext>
+              </a:extLst>
+            </p:cNvPr>
+            <p:cNvPicPr>
+              <a:picLocks noChangeAspect="1"/>
+            </p:cNvPicPr>
+            <p:nvPr/>
+          </p:nvPicPr>
+          <p:blipFill rotWithShape="1">
+            <a:blip r:embed="rId5"/>
+            <a:srcRect t="73704" r="82834"/>
+            <a:stretch/>
+          </p:blipFill>
+          <p:spPr>
+            <a:xfrm>
+              <a:off x="3247355" y="4150238"/>
+              <a:ext cx="706283" cy="688482"/>
+            </a:xfrm>
+            <a:prstGeom prst="rect">
+              <a:avLst/>
+            </a:prstGeom>
+          </p:spPr>
+        </p:pic>
+        <p:pic>
+          <p:nvPicPr>
+            <p:cNvPr id="36" name="Picture 35" descr="A screenshot of a video game&#10;&#10;Description automatically generated">
+              <a:extLst>
+                <a:ext uri="{FF2B5EF4-FFF2-40B4-BE49-F238E27FC236}">
+                  <a16:creationId xmlns:a16="http://schemas.microsoft.com/office/drawing/2014/main" id="{73EB299A-F4DC-E3C3-92A3-A58E01FDC738}"/>
+                </a:ext>
+              </a:extLst>
+            </p:cNvPr>
+            <p:cNvPicPr>
+              <a:picLocks noChangeAspect="1"/>
+            </p:cNvPicPr>
+            <p:nvPr/>
+          </p:nvPicPr>
+          <p:blipFill rotWithShape="1">
+            <a:blip r:embed="rId5"/>
+            <a:srcRect t="73704" r="82834"/>
+            <a:stretch/>
+          </p:blipFill>
+          <p:spPr>
+            <a:xfrm>
+              <a:off x="3878292" y="4150238"/>
+              <a:ext cx="706283" cy="688482"/>
+            </a:xfrm>
+            <a:prstGeom prst="rect">
+              <a:avLst/>
+            </a:prstGeom>
+          </p:spPr>
+        </p:pic>
+        <p:pic>
+          <p:nvPicPr>
+            <p:cNvPr id="37" name="Picture 36" descr="A screenshot of a video game&#10;&#10;Description automatically generated">
+              <a:extLst>
+                <a:ext uri="{FF2B5EF4-FFF2-40B4-BE49-F238E27FC236}">
+                  <a16:creationId xmlns:a16="http://schemas.microsoft.com/office/drawing/2014/main" id="{C0801597-6EB2-7CBD-EAD5-28302ED8E7BF}"/>
+                </a:ext>
+              </a:extLst>
+            </p:cNvPr>
+            <p:cNvPicPr>
+              <a:picLocks noChangeAspect="1"/>
+            </p:cNvPicPr>
+            <p:nvPr/>
+          </p:nvPicPr>
+          <p:blipFill rotWithShape="1">
+            <a:blip r:embed="rId5"/>
+            <a:srcRect t="73704" r="82834"/>
+            <a:stretch/>
+          </p:blipFill>
+          <p:spPr>
+            <a:xfrm>
+              <a:off x="1147094" y="4836038"/>
+              <a:ext cx="706283" cy="688482"/>
+            </a:xfrm>
+            <a:prstGeom prst="rect">
+              <a:avLst/>
+            </a:prstGeom>
+          </p:spPr>
+        </p:pic>
+        <p:pic>
+          <p:nvPicPr>
+            <p:cNvPr id="38" name="Picture 37" descr="A screenshot of a video game&#10;&#10;Description automatically generated">
+              <a:extLst>
+                <a:ext uri="{FF2B5EF4-FFF2-40B4-BE49-F238E27FC236}">
+                  <a16:creationId xmlns:a16="http://schemas.microsoft.com/office/drawing/2014/main" id="{3229D123-3F99-1074-D296-0A17764E13CB}"/>
+                </a:ext>
+              </a:extLst>
+            </p:cNvPr>
+            <p:cNvPicPr>
+              <a:picLocks noChangeAspect="1"/>
+            </p:cNvPicPr>
+            <p:nvPr/>
+          </p:nvPicPr>
+          <p:blipFill rotWithShape="1">
+            <a:blip r:embed="rId5"/>
+            <a:srcRect t="73704" r="82834"/>
+            <a:stretch/>
+          </p:blipFill>
+          <p:spPr>
+            <a:xfrm>
+              <a:off x="1850279" y="4836038"/>
+              <a:ext cx="706283" cy="688482"/>
+            </a:xfrm>
+            <a:prstGeom prst="rect">
+              <a:avLst/>
+            </a:prstGeom>
+          </p:spPr>
+        </p:pic>
+        <p:pic>
+          <p:nvPicPr>
+            <p:cNvPr id="39" name="Picture 38" descr="A screenshot of a video game&#10;&#10;Description automatically generated">
+              <a:extLst>
+                <a:ext uri="{FF2B5EF4-FFF2-40B4-BE49-F238E27FC236}">
+                  <a16:creationId xmlns:a16="http://schemas.microsoft.com/office/drawing/2014/main" id="{8EC69E25-D0EA-9629-0A6B-BDA63C5C624D}"/>
+                </a:ext>
+              </a:extLst>
+            </p:cNvPr>
+            <p:cNvPicPr>
+              <a:picLocks noChangeAspect="1"/>
+            </p:cNvPicPr>
+            <p:nvPr/>
+          </p:nvPicPr>
+          <p:blipFill rotWithShape="1">
+            <a:blip r:embed="rId5"/>
+            <a:srcRect t="73704" r="82834"/>
+            <a:stretch/>
+          </p:blipFill>
+          <p:spPr>
+            <a:xfrm>
+              <a:off x="2550366" y="4836038"/>
+              <a:ext cx="706283" cy="688482"/>
+            </a:xfrm>
+            <a:prstGeom prst="rect">
+              <a:avLst/>
+            </a:prstGeom>
+          </p:spPr>
+        </p:pic>
+        <p:pic>
+          <p:nvPicPr>
+            <p:cNvPr id="40" name="Picture 39" descr="A screenshot of a video game&#10;&#10;Description automatically generated">
+              <a:extLst>
+                <a:ext uri="{FF2B5EF4-FFF2-40B4-BE49-F238E27FC236}">
+                  <a16:creationId xmlns:a16="http://schemas.microsoft.com/office/drawing/2014/main" id="{C09D4C6D-9319-E4D2-54B8-7DBB16DF3857}"/>
+                </a:ext>
+              </a:extLst>
+            </p:cNvPr>
+            <p:cNvPicPr>
+              <a:picLocks noChangeAspect="1"/>
+            </p:cNvPicPr>
+            <p:nvPr/>
+          </p:nvPicPr>
+          <p:blipFill rotWithShape="1">
+            <a:blip r:embed="rId5"/>
+            <a:srcRect t="73704" r="82834"/>
+            <a:stretch/>
+          </p:blipFill>
+          <p:spPr>
+            <a:xfrm>
+              <a:off x="3247355" y="4836038"/>
+              <a:ext cx="706283" cy="688482"/>
+            </a:xfrm>
+            <a:prstGeom prst="rect">
+              <a:avLst/>
+            </a:prstGeom>
+          </p:spPr>
+        </p:pic>
+        <p:pic>
+          <p:nvPicPr>
+            <p:cNvPr id="41" name="Picture 40" descr="A screenshot of a video game&#10;&#10;Description automatically generated">
+              <a:extLst>
+                <a:ext uri="{FF2B5EF4-FFF2-40B4-BE49-F238E27FC236}">
+                  <a16:creationId xmlns:a16="http://schemas.microsoft.com/office/drawing/2014/main" id="{C9B3B855-0B3B-B0CA-4CEF-951D78B5DE97}"/>
+                </a:ext>
+              </a:extLst>
+            </p:cNvPr>
+            <p:cNvPicPr>
+              <a:picLocks noChangeAspect="1"/>
+            </p:cNvPicPr>
+            <p:nvPr/>
+          </p:nvPicPr>
+          <p:blipFill rotWithShape="1">
+            <a:blip r:embed="rId5"/>
+            <a:srcRect t="73704" r="82834"/>
+            <a:stretch/>
+          </p:blipFill>
+          <p:spPr>
+            <a:xfrm>
+              <a:off x="3878292" y="4836038"/>
+              <a:ext cx="706283" cy="688482"/>
+            </a:xfrm>
+            <a:prstGeom prst="rect">
+              <a:avLst/>
+            </a:prstGeom>
+          </p:spPr>
+        </p:pic>
+        <p:pic>
+          <p:nvPicPr>
+            <p:cNvPr id="42" name="Picture 41" descr="A screenshot of a video game&#10;&#10;Description automatically generated">
+              <a:extLst>
+                <a:ext uri="{FF2B5EF4-FFF2-40B4-BE49-F238E27FC236}">
+                  <a16:creationId xmlns:a16="http://schemas.microsoft.com/office/drawing/2014/main" id="{87673B21-0B01-0D37-FE28-F17C1C727CDE}"/>
+                </a:ext>
+              </a:extLst>
+            </p:cNvPr>
+            <p:cNvPicPr>
+              <a:picLocks noChangeAspect="1"/>
+            </p:cNvPicPr>
+            <p:nvPr/>
+          </p:nvPicPr>
+          <p:blipFill rotWithShape="1">
+            <a:blip r:embed="rId5"/>
+            <a:srcRect t="73704" r="82834"/>
+            <a:stretch/>
+          </p:blipFill>
+          <p:spPr>
+            <a:xfrm>
+              <a:off x="1147094" y="5521838"/>
+              <a:ext cx="706283" cy="688482"/>
+            </a:xfrm>
+            <a:prstGeom prst="rect">
+              <a:avLst/>
+            </a:prstGeom>
+          </p:spPr>
+        </p:pic>
+        <p:pic>
+          <p:nvPicPr>
+            <p:cNvPr id="43" name="Picture 42" descr="A screenshot of a video game&#10;&#10;Description automatically generated">
+              <a:extLst>
+                <a:ext uri="{FF2B5EF4-FFF2-40B4-BE49-F238E27FC236}">
+                  <a16:creationId xmlns:a16="http://schemas.microsoft.com/office/drawing/2014/main" id="{E5A64ADA-267B-C196-4BDC-624CAA52B505}"/>
+                </a:ext>
+              </a:extLst>
+            </p:cNvPr>
+            <p:cNvPicPr>
+              <a:picLocks noChangeAspect="1"/>
+            </p:cNvPicPr>
+            <p:nvPr/>
+          </p:nvPicPr>
+          <p:blipFill rotWithShape="1">
+            <a:blip r:embed="rId5"/>
+            <a:srcRect t="73704" r="82834"/>
+            <a:stretch/>
+          </p:blipFill>
+          <p:spPr>
+            <a:xfrm>
+              <a:off x="1850279" y="5521838"/>
+              <a:ext cx="706283" cy="688482"/>
+            </a:xfrm>
+            <a:prstGeom prst="rect">
+              <a:avLst/>
+            </a:prstGeom>
+          </p:spPr>
+        </p:pic>
+        <p:pic>
+          <p:nvPicPr>
+            <p:cNvPr id="44" name="Picture 43" descr="A screenshot of a video game&#10;&#10;Description automatically generated">
+              <a:extLst>
+                <a:ext uri="{FF2B5EF4-FFF2-40B4-BE49-F238E27FC236}">
+                  <a16:creationId xmlns:a16="http://schemas.microsoft.com/office/drawing/2014/main" id="{6E0D0E62-4C08-13D6-E585-B54E86F2B4A0}"/>
+                </a:ext>
+              </a:extLst>
+            </p:cNvPr>
+            <p:cNvPicPr>
+              <a:picLocks noChangeAspect="1"/>
+            </p:cNvPicPr>
+            <p:nvPr/>
+          </p:nvPicPr>
+          <p:blipFill rotWithShape="1">
+            <a:blip r:embed="rId5"/>
+            <a:srcRect t="73704" r="82834"/>
+            <a:stretch/>
+          </p:blipFill>
+          <p:spPr>
+            <a:xfrm>
+              <a:off x="2550366" y="5521838"/>
+              <a:ext cx="706283" cy="688482"/>
+            </a:xfrm>
+            <a:prstGeom prst="rect">
+              <a:avLst/>
+            </a:prstGeom>
+          </p:spPr>
+        </p:pic>
+        <p:pic>
+          <p:nvPicPr>
+            <p:cNvPr id="45" name="Picture 44" descr="A screenshot of a video game&#10;&#10;Description automatically generated">
+              <a:extLst>
+                <a:ext uri="{FF2B5EF4-FFF2-40B4-BE49-F238E27FC236}">
+                  <a16:creationId xmlns:a16="http://schemas.microsoft.com/office/drawing/2014/main" id="{32C67925-FB93-D169-6F3E-7477E161344B}"/>
+                </a:ext>
+              </a:extLst>
+            </p:cNvPr>
+            <p:cNvPicPr>
+              <a:picLocks noChangeAspect="1"/>
+            </p:cNvPicPr>
+            <p:nvPr/>
+          </p:nvPicPr>
+          <p:blipFill rotWithShape="1">
+            <a:blip r:embed="rId5"/>
+            <a:srcRect t="73704" r="82834"/>
+            <a:stretch/>
+          </p:blipFill>
+          <p:spPr>
+            <a:xfrm>
+              <a:off x="3247355" y="5521838"/>
+              <a:ext cx="706283" cy="688482"/>
+            </a:xfrm>
+            <a:prstGeom prst="rect">
+              <a:avLst/>
+            </a:prstGeom>
+          </p:spPr>
+        </p:pic>
+        <p:pic>
+          <p:nvPicPr>
+            <p:cNvPr id="46" name="Picture 45" descr="A screenshot of a video game&#10;&#10;Description automatically generated">
+              <a:extLst>
+                <a:ext uri="{FF2B5EF4-FFF2-40B4-BE49-F238E27FC236}">
+                  <a16:creationId xmlns:a16="http://schemas.microsoft.com/office/drawing/2014/main" id="{3A35EE73-3BA0-776E-609D-34D67F400DC1}"/>
+                </a:ext>
+              </a:extLst>
+            </p:cNvPr>
+            <p:cNvPicPr>
+              <a:picLocks noChangeAspect="1"/>
+            </p:cNvPicPr>
+            <p:nvPr/>
+          </p:nvPicPr>
+          <p:blipFill rotWithShape="1">
+            <a:blip r:embed="rId5"/>
+            <a:srcRect t="73704" r="82834"/>
+            <a:stretch/>
+          </p:blipFill>
+          <p:spPr>
+            <a:xfrm>
+              <a:off x="3878292" y="5521838"/>
+              <a:ext cx="706283" cy="688482"/>
+            </a:xfrm>
+            <a:prstGeom prst="rect">
+              <a:avLst/>
+            </a:prstGeom>
+          </p:spPr>
+        </p:pic>
+      </p:grpSp>
+      <p:pic>
+        <p:nvPicPr>
+          <p:cNvPr id="61" name="Picture 60" descr="A screenshot of a video game&#10;&#10;Description automatically generated">
+            <a:extLst>
+              <a:ext uri="{FF2B5EF4-FFF2-40B4-BE49-F238E27FC236}">
+                <a16:creationId xmlns:a16="http://schemas.microsoft.com/office/drawing/2014/main" id="{95C6FC65-EDD0-F849-DCAE-CD6375088C31}"/>
+              </a:ext>
+            </a:extLst>
+          </p:cNvPr>
+          <p:cNvPicPr>
+            <a:picLocks noChangeAspect="1"/>
+          </p:cNvPicPr>
+          <p:nvPr/>
+        </p:nvPicPr>
+        <p:blipFill rotWithShape="1">
+          <a:blip r:embed="rId4"/>
+          <a:srcRect l="1" t="17816" r="67208" b="74721"/>
+          <a:stretch/>
+        </p:blipFill>
+        <p:spPr>
+          <a:xfrm>
+            <a:off x="7838261" y="5981283"/>
+            <a:ext cx="816431" cy="245130"/>
+          </a:xfrm>
+          <a:prstGeom prst="rect">
+            <a:avLst/>
+          </a:prstGeom>
+        </p:spPr>
+      </p:pic>
+      <p:pic>
+        <p:nvPicPr>
+          <p:cNvPr id="62" name="Picture 61" descr="A screenshot of a video game&#10;&#10;Description automatically generated">
+            <a:extLst>
+              <a:ext uri="{FF2B5EF4-FFF2-40B4-BE49-F238E27FC236}">
+                <a16:creationId xmlns:a16="http://schemas.microsoft.com/office/drawing/2014/main" id="{EFE4370C-8916-C502-D36C-D87381BD7D62}"/>
+              </a:ext>
+            </a:extLst>
+          </p:cNvPr>
+          <p:cNvPicPr>
+            <a:picLocks noChangeAspect="1"/>
+          </p:cNvPicPr>
+          <p:nvPr/>
+        </p:nvPicPr>
+        <p:blipFill rotWithShape="1">
+          <a:blip r:embed="rId4"/>
+          <a:srcRect l="26855" t="6960" r="67208" b="74722"/>
+          <a:stretch/>
+        </p:blipFill>
+        <p:spPr>
+          <a:xfrm>
+            <a:off x="8506875" y="5624741"/>
+            <a:ext cx="147817" cy="601672"/>
+          </a:xfrm>
+          <a:prstGeom prst="rect">
+            <a:avLst/>
+          </a:prstGeom>
+        </p:spPr>
+      </p:pic>
+      <p:pic>
+        <p:nvPicPr>
+          <p:cNvPr id="63" name="Picture 62" descr="A screenshot of a video game&#10;&#10;Description automatically generated">
+            <a:extLst>
+              <a:ext uri="{FF2B5EF4-FFF2-40B4-BE49-F238E27FC236}">
+                <a16:creationId xmlns:a16="http://schemas.microsoft.com/office/drawing/2014/main" id="{8EB0992B-C4BB-4F3F-4038-546D025B049B}"/>
+              </a:ext>
+            </a:extLst>
+          </p:cNvPr>
+          <p:cNvPicPr>
+            <a:picLocks noChangeAspect="1"/>
+          </p:cNvPicPr>
+          <p:nvPr/>
+        </p:nvPicPr>
+        <p:blipFill rotWithShape="1">
+          <a:blip r:embed="rId4"/>
+          <a:srcRect l="26855" t="6960" r="67208" b="74722"/>
+          <a:stretch/>
+        </p:blipFill>
+        <p:spPr>
+          <a:xfrm>
+            <a:off x="5143223" y="1978126"/>
+            <a:ext cx="147817" cy="601672"/>
+          </a:xfrm>
+          <a:prstGeom prst="rect">
+            <a:avLst/>
+          </a:prstGeom>
+        </p:spPr>
+      </p:pic>
+      <p:pic>
+        <p:nvPicPr>
+          <p:cNvPr id="64" name="Picture 63" descr="A screenshot of a video game&#10;&#10;Description automatically generated">
+            <a:extLst>
+              <a:ext uri="{FF2B5EF4-FFF2-40B4-BE49-F238E27FC236}">
+                <a16:creationId xmlns:a16="http://schemas.microsoft.com/office/drawing/2014/main" id="{10837B95-70AD-6F0E-09D9-6152A5F17661}"/>
+              </a:ext>
+            </a:extLst>
+          </p:cNvPr>
+          <p:cNvPicPr>
+            <a:picLocks noChangeAspect="1"/>
+          </p:cNvPicPr>
+          <p:nvPr/>
+        </p:nvPicPr>
+        <p:blipFill rotWithShape="1">
+          <a:blip r:embed="rId4"/>
+          <a:srcRect l="-205" t="-344" r="88228" b="91610"/>
+          <a:stretch/>
+        </p:blipFill>
+        <p:spPr>
+          <a:xfrm>
+            <a:off x="5164353" y="1705548"/>
+            <a:ext cx="298208" cy="286866"/>
+          </a:xfrm>
+          <a:prstGeom prst="rect">
+            <a:avLst/>
+          </a:prstGeom>
+        </p:spPr>
+      </p:pic>
+      <p:pic>
+        <p:nvPicPr>
+          <p:cNvPr id="65" name="Picture 64" descr="A screenshot of a video game&#10;&#10;Description automatically generated">
+            <a:extLst>
+              <a:ext uri="{FF2B5EF4-FFF2-40B4-BE49-F238E27FC236}">
+                <a16:creationId xmlns:a16="http://schemas.microsoft.com/office/drawing/2014/main" id="{963D9C2F-4150-8B5D-F184-C9B9A247550B}"/>
+              </a:ext>
+            </a:extLst>
+          </p:cNvPr>
+          <p:cNvPicPr>
+            <a:picLocks noChangeAspect="1"/>
+          </p:cNvPicPr>
+          <p:nvPr/>
+        </p:nvPicPr>
+        <p:blipFill rotWithShape="1">
+          <a:blip r:embed="rId4"/>
+          <a:srcRect l="26855" t="6960" r="67208" b="74722"/>
+          <a:stretch/>
+        </p:blipFill>
+        <p:spPr>
+          <a:xfrm>
+            <a:off x="8506875" y="5179935"/>
+            <a:ext cx="147817" cy="601672"/>
+          </a:xfrm>
+          <a:prstGeom prst="rect">
+            <a:avLst/>
+          </a:prstGeom>
+        </p:spPr>
+      </p:pic>
+      <p:pic>
+        <p:nvPicPr>
+          <p:cNvPr id="66" name="Picture 65" descr="A screenshot of a video game&#10;&#10;Description automatically generated">
+            <a:extLst>
+              <a:ext uri="{FF2B5EF4-FFF2-40B4-BE49-F238E27FC236}">
+                <a16:creationId xmlns:a16="http://schemas.microsoft.com/office/drawing/2014/main" id="{D22BFEEE-D026-D659-DC6D-F239DC1CCDDA}"/>
+              </a:ext>
+            </a:extLst>
+          </p:cNvPr>
+          <p:cNvPicPr>
+            <a:picLocks noChangeAspect="1"/>
+          </p:cNvPicPr>
+          <p:nvPr/>
+        </p:nvPicPr>
+        <p:blipFill rotWithShape="1">
+          <a:blip r:embed="rId4"/>
+          <a:srcRect l="26855" t="6960" r="67208" b="74722"/>
+          <a:stretch/>
+        </p:blipFill>
+        <p:spPr>
+          <a:xfrm>
+            <a:off x="8506875" y="4908473"/>
+            <a:ext cx="147817" cy="601672"/>
+          </a:xfrm>
+          <a:prstGeom prst="rect">
+            <a:avLst/>
+          </a:prstGeom>
+        </p:spPr>
+      </p:pic>
+      <p:pic>
+        <p:nvPicPr>
+          <p:cNvPr id="67" name="Picture 66" descr="A screenshot of a video game&#10;&#10;Description automatically generated">
+            <a:extLst>
+              <a:ext uri="{FF2B5EF4-FFF2-40B4-BE49-F238E27FC236}">
+                <a16:creationId xmlns:a16="http://schemas.microsoft.com/office/drawing/2014/main" id="{B8546E18-27DA-7F4C-3C99-2AB7CBD9D0DC}"/>
+              </a:ext>
+            </a:extLst>
+          </p:cNvPr>
+          <p:cNvPicPr>
+            <a:picLocks noChangeAspect="1"/>
+          </p:cNvPicPr>
+          <p:nvPr/>
+        </p:nvPicPr>
+        <p:blipFill rotWithShape="1">
+          <a:blip r:embed="rId4"/>
+          <a:srcRect l="67964" r="2197" b="67109"/>
+          <a:stretch/>
+        </p:blipFill>
+        <p:spPr>
+          <a:xfrm>
+            <a:off x="7876400" y="564465"/>
+            <a:ext cx="742950" cy="1080515"/>
+          </a:xfrm>
+          <a:prstGeom prst="rect">
+            <a:avLst/>
+          </a:prstGeom>
+        </p:spPr>
+      </p:pic>
+      <p:pic>
+        <p:nvPicPr>
+          <p:cNvPr id="68" name="Picture 67" descr="A screenshot of a video game&#10;&#10;Description automatically generated">
+            <a:extLst>
+              <a:ext uri="{FF2B5EF4-FFF2-40B4-BE49-F238E27FC236}">
+                <a16:creationId xmlns:a16="http://schemas.microsoft.com/office/drawing/2014/main" id="{F8781E05-5D78-F57B-59FA-86AE6853ED6B}"/>
+              </a:ext>
+            </a:extLst>
+          </p:cNvPr>
+          <p:cNvPicPr>
+            <a:picLocks noChangeAspect="1"/>
+          </p:cNvPicPr>
+          <p:nvPr/>
+        </p:nvPicPr>
+        <p:blipFill>
+          <a:blip r:embed="rId6"/>
+          <a:stretch>
+            <a:fillRect/>
+          </a:stretch>
+        </p:blipFill>
+        <p:spPr>
+          <a:xfrm>
+            <a:off x="9739583" y="947158"/>
+            <a:ext cx="1873879" cy="4164174"/>
+          </a:xfrm>
+          <a:prstGeom prst="rect">
+            <a:avLst/>
+          </a:prstGeom>
+        </p:spPr>
+      </p:pic>
+      <p:pic>
+        <p:nvPicPr>
+          <p:cNvPr id="69" name="Picture 68" descr="A screenshot of a video game&#10;&#10;Description automatically generated">
+            <a:extLst>
+              <a:ext uri="{FF2B5EF4-FFF2-40B4-BE49-F238E27FC236}">
+                <a16:creationId xmlns:a16="http://schemas.microsoft.com/office/drawing/2014/main" id="{DE52405D-87EA-F83E-7C7C-EED05006521F}"/>
+              </a:ext>
+            </a:extLst>
+          </p:cNvPr>
+          <p:cNvPicPr>
+            <a:picLocks noChangeAspect="1"/>
+          </p:cNvPicPr>
+          <p:nvPr/>
+        </p:nvPicPr>
+        <p:blipFill rotWithShape="1">
+          <a:blip r:embed="rId4"/>
+          <a:srcRect t="50679" r="36435"/>
+          <a:stretch/>
+        </p:blipFill>
+        <p:spPr>
+          <a:xfrm>
+            <a:off x="536887" y="280355"/>
+            <a:ext cx="1419255" cy="1453010"/>
+          </a:xfrm>
+          <a:prstGeom prst="rect">
+            <a:avLst/>
+          </a:prstGeom>
+        </p:spPr>
+      </p:pic>
+      <p:pic>
+        <p:nvPicPr>
+          <p:cNvPr id="70" name="Picture 69" descr="A screenshot of a video game&#10;&#10;Description automatically generated">
+            <a:extLst>
+              <a:ext uri="{FF2B5EF4-FFF2-40B4-BE49-F238E27FC236}">
+                <a16:creationId xmlns:a16="http://schemas.microsoft.com/office/drawing/2014/main" id="{FFB34181-F6C3-9773-CDE5-0591357A7503}"/>
+              </a:ext>
+            </a:extLst>
+          </p:cNvPr>
+          <p:cNvPicPr>
+            <a:picLocks noChangeAspect="1"/>
+          </p:cNvPicPr>
+          <p:nvPr/>
+        </p:nvPicPr>
+        <p:blipFill rotWithShape="1">
+          <a:blip r:embed="rId4"/>
+          <a:srcRect t="50679" r="36435"/>
+          <a:stretch/>
+        </p:blipFill>
+        <p:spPr>
+          <a:xfrm>
+            <a:off x="4937437" y="280355"/>
+            <a:ext cx="1419255" cy="1453010"/>
+          </a:xfrm>
+          <a:prstGeom prst="rect">
+            <a:avLst/>
+          </a:prstGeom>
+        </p:spPr>
+      </p:pic>
+      <p:pic>
+        <p:nvPicPr>
+          <p:cNvPr id="71" name="Picture 70" descr="A screenshot of a video game&#10;&#10;Description automatically generated">
+            <a:extLst>
+              <a:ext uri="{FF2B5EF4-FFF2-40B4-BE49-F238E27FC236}">
+                <a16:creationId xmlns:a16="http://schemas.microsoft.com/office/drawing/2014/main" id="{8FEE7023-3251-25E1-4645-A13EC1BA66A3}"/>
+              </a:ext>
+            </a:extLst>
+          </p:cNvPr>
+          <p:cNvPicPr>
+            <a:picLocks noChangeAspect="1"/>
+          </p:cNvPicPr>
+          <p:nvPr/>
+        </p:nvPicPr>
+        <p:blipFill rotWithShape="1">
+          <a:blip r:embed="rId4"/>
+          <a:srcRect l="70300" t="31808" r="6173" b="59058"/>
+          <a:stretch/>
+        </p:blipFill>
+        <p:spPr>
+          <a:xfrm>
+            <a:off x="5191077" y="5869304"/>
+            <a:ext cx="585787" cy="300038"/>
+          </a:xfrm>
+          <a:prstGeom prst="rect">
+            <a:avLst/>
+          </a:prstGeom>
+        </p:spPr>
+      </p:pic>
+    </p:spTree>
+    <p:extLst>
+      <p:ext uri="{BB962C8B-B14F-4D97-AF65-F5344CB8AC3E}">
+        <p14:creationId xmlns:p14="http://schemas.microsoft.com/office/powerpoint/2010/main" val="3026047295"/>
       </p:ext>
     </p:extLst>
   </p:cSld>

</xml_diff>

<commit_message>
submit app store v1.0.3
</commit_message>
<xml_diff>
--- a/assets/sprites/farm_land_design.pptx
+++ b/assets/sprites/farm_land_design.pptx
@@ -261,7 +261,7 @@
           <a:p>
             <a:fld id="{D55169DB-DC37-0147-99EF-2AFC2A26E125}" type="datetimeFigureOut">
               <a:rPr lang="en-US" smtClean="0"/>
-              <a:t>6/15/24</a:t>
+              <a:t>6/18/24</a:t>
             </a:fld>
             <a:endParaRPr lang="en-US"/>
           </a:p>
@@ -459,7 +459,7 @@
           <a:p>
             <a:fld id="{D55169DB-DC37-0147-99EF-2AFC2A26E125}" type="datetimeFigureOut">
               <a:rPr lang="en-US" smtClean="0"/>
-              <a:t>6/15/24</a:t>
+              <a:t>6/18/24</a:t>
             </a:fld>
             <a:endParaRPr lang="en-US"/>
           </a:p>
@@ -667,7 +667,7 @@
           <a:p>
             <a:fld id="{D55169DB-DC37-0147-99EF-2AFC2A26E125}" type="datetimeFigureOut">
               <a:rPr lang="en-US" smtClean="0"/>
-              <a:t>6/15/24</a:t>
+              <a:t>6/18/24</a:t>
             </a:fld>
             <a:endParaRPr lang="en-US"/>
           </a:p>
@@ -865,7 +865,7 @@
           <a:p>
             <a:fld id="{D55169DB-DC37-0147-99EF-2AFC2A26E125}" type="datetimeFigureOut">
               <a:rPr lang="en-US" smtClean="0"/>
-              <a:t>6/15/24</a:t>
+              <a:t>6/18/24</a:t>
             </a:fld>
             <a:endParaRPr lang="en-US"/>
           </a:p>
@@ -1140,7 +1140,7 @@
           <a:p>
             <a:fld id="{D55169DB-DC37-0147-99EF-2AFC2A26E125}" type="datetimeFigureOut">
               <a:rPr lang="en-US" smtClean="0"/>
-              <a:t>6/15/24</a:t>
+              <a:t>6/18/24</a:t>
             </a:fld>
             <a:endParaRPr lang="en-US"/>
           </a:p>
@@ -1405,7 +1405,7 @@
           <a:p>
             <a:fld id="{D55169DB-DC37-0147-99EF-2AFC2A26E125}" type="datetimeFigureOut">
               <a:rPr lang="en-US" smtClean="0"/>
-              <a:t>6/15/24</a:t>
+              <a:t>6/18/24</a:t>
             </a:fld>
             <a:endParaRPr lang="en-US"/>
           </a:p>
@@ -1817,7 +1817,7 @@
           <a:p>
             <a:fld id="{D55169DB-DC37-0147-99EF-2AFC2A26E125}" type="datetimeFigureOut">
               <a:rPr lang="en-US" smtClean="0"/>
-              <a:t>6/15/24</a:t>
+              <a:t>6/18/24</a:t>
             </a:fld>
             <a:endParaRPr lang="en-US"/>
           </a:p>
@@ -1958,7 +1958,7 @@
           <a:p>
             <a:fld id="{D55169DB-DC37-0147-99EF-2AFC2A26E125}" type="datetimeFigureOut">
               <a:rPr lang="en-US" smtClean="0"/>
-              <a:t>6/15/24</a:t>
+              <a:t>6/18/24</a:t>
             </a:fld>
             <a:endParaRPr lang="en-US"/>
           </a:p>
@@ -2071,7 +2071,7 @@
           <a:p>
             <a:fld id="{D55169DB-DC37-0147-99EF-2AFC2A26E125}" type="datetimeFigureOut">
               <a:rPr lang="en-US" smtClean="0"/>
-              <a:t>6/15/24</a:t>
+              <a:t>6/18/24</a:t>
             </a:fld>
             <a:endParaRPr lang="en-US"/>
           </a:p>
@@ -2382,7 +2382,7 @@
           <a:p>
             <a:fld id="{D55169DB-DC37-0147-99EF-2AFC2A26E125}" type="datetimeFigureOut">
               <a:rPr lang="en-US" smtClean="0"/>
-              <a:t>6/15/24</a:t>
+              <a:t>6/18/24</a:t>
             </a:fld>
             <a:endParaRPr lang="en-US"/>
           </a:p>
@@ -2670,7 +2670,7 @@
           <a:p>
             <a:fld id="{D55169DB-DC37-0147-99EF-2AFC2A26E125}" type="datetimeFigureOut">
               <a:rPr lang="en-US" smtClean="0"/>
-              <a:t>6/15/24</a:t>
+              <a:t>6/18/24</a:t>
             </a:fld>
             <a:endParaRPr lang="en-US"/>
           </a:p>
@@ -2911,7 +2911,7 @@
           <a:p>
             <a:fld id="{D55169DB-DC37-0147-99EF-2AFC2A26E125}" type="datetimeFigureOut">
               <a:rPr lang="en-US" smtClean="0"/>
-              <a:t>6/15/24</a:t>
+              <a:t>6/18/24</a:t>
             </a:fld>
             <a:endParaRPr lang="en-US"/>
           </a:p>
@@ -4713,7 +4713,7 @@
         </p:nvGrpSpPr>
         <p:grpSpPr>
           <a:xfrm>
-            <a:off x="8312004" y="472549"/>
+            <a:off x="7723367" y="604336"/>
             <a:ext cx="1667213" cy="816430"/>
             <a:chOff x="8312004" y="472549"/>
             <a:chExt cx="1667213" cy="816430"/>
@@ -5194,7 +5194,7 @@
         </p:blipFill>
         <p:spPr>
           <a:xfrm>
-            <a:off x="6298874" y="304551"/>
+            <a:off x="6096000" y="397733"/>
             <a:ext cx="1219315" cy="1248315"/>
           </a:xfrm>
           <a:prstGeom prst="rect">
@@ -5281,7 +5281,7 @@
         </p:blipFill>
         <p:spPr>
           <a:xfrm>
-            <a:off x="6927668" y="2550332"/>
+            <a:off x="6724794" y="2643514"/>
             <a:ext cx="415177" cy="408587"/>
           </a:xfrm>
           <a:prstGeom prst="rect">
@@ -5310,7 +5310,7 @@
         </p:blipFill>
         <p:spPr>
           <a:xfrm>
-            <a:off x="7584498" y="3217250"/>
+            <a:off x="7381624" y="3310432"/>
             <a:ext cx="746067" cy="708293"/>
           </a:xfrm>
           <a:prstGeom prst="rect">
@@ -5347,7 +5347,7 @@
         </p:blipFill>
         <p:spPr>
           <a:xfrm>
-            <a:off x="8287342" y="3209500"/>
+            <a:off x="8084468" y="3302682"/>
             <a:ext cx="746067" cy="708293"/>
           </a:xfrm>
           <a:prstGeom prst="rect">
@@ -5395,7 +5395,7 @@
         </p:blipFill>
         <p:spPr>
           <a:xfrm>
-            <a:off x="6854765" y="3227770"/>
+            <a:off x="6651891" y="3320952"/>
             <a:ext cx="750003" cy="712030"/>
           </a:xfrm>
           <a:prstGeom prst="rect">
@@ -6125,7 +6125,7 @@
         </p:nvGrpSpPr>
         <p:grpSpPr>
           <a:xfrm>
-            <a:off x="6573254" y="1651723"/>
+            <a:off x="6370380" y="1744905"/>
             <a:ext cx="307370" cy="637241"/>
             <a:chOff x="6573254" y="1651723"/>
             <a:chExt cx="307370" cy="637241"/>
@@ -6273,7 +6273,7 @@
         </p:nvGrpSpPr>
         <p:grpSpPr>
           <a:xfrm>
-            <a:off x="8406787" y="5265853"/>
+            <a:off x="8556685" y="5396145"/>
             <a:ext cx="833895" cy="601672"/>
             <a:chOff x="8406787" y="5265853"/>
             <a:chExt cx="833895" cy="601672"/>
@@ -6338,36 +6338,6 @@
           </p:spPr>
         </p:pic>
       </p:grpSp>
-      <p:pic>
-        <p:nvPicPr>
-          <p:cNvPr id="12" name="Picture 11" descr="A screenshot of a video game&#10;&#10;Description automatically generated">
-            <a:extLst>
-              <a:ext uri="{FF2B5EF4-FFF2-40B4-BE49-F238E27FC236}">
-                <a16:creationId xmlns:a16="http://schemas.microsoft.com/office/drawing/2014/main" id="{4B35A253-3875-3419-AD0A-256469220859}"/>
-              </a:ext>
-            </a:extLst>
-          </p:cNvPr>
-          <p:cNvPicPr>
-            <a:picLocks noChangeAspect="1"/>
-          </p:cNvPicPr>
-          <p:nvPr/>
-        </p:nvPicPr>
-        <p:blipFill>
-          <a:blip r:embed="rId11"/>
-          <a:stretch>
-            <a:fillRect/>
-          </a:stretch>
-        </p:blipFill>
-        <p:spPr>
-          <a:xfrm>
-            <a:off x="8285177" y="312594"/>
-            <a:ext cx="3606800" cy="6045200"/>
-          </a:xfrm>
-          <a:prstGeom prst="rect">
-            <a:avLst/>
-          </a:prstGeom>
-        </p:spPr>
-      </p:pic>
     </p:spTree>
     <p:extLst>
       <p:ext uri="{BB962C8B-B14F-4D97-AF65-F5344CB8AC3E}">
@@ -6419,7 +6389,7 @@
         </p:blipFill>
         <p:spPr>
           <a:xfrm>
-            <a:off x="5178324" y="841638"/>
+            <a:off x="1356930" y="727338"/>
             <a:ext cx="1417320" cy="1472378"/>
           </a:xfrm>
           <a:prstGeom prst="rect">
@@ -6443,13 +6413,13 @@
         </p:nvPicPr>
         <p:blipFill rotWithShape="1">
           <a:blip r:embed="rId3"/>
-          <a:srcRect l="40935" r="39058" b="64143"/>
+          <a:srcRect l="40935" r="40652" b="64143"/>
           <a:stretch/>
         </p:blipFill>
         <p:spPr>
           <a:xfrm>
-            <a:off x="5473470" y="721238"/>
-            <a:ext cx="1219315" cy="1311227"/>
+            <a:off x="1652077" y="606939"/>
+            <a:ext cx="1122173" cy="1311226"/>
           </a:xfrm>
           <a:prstGeom prst="rect">
             <a:avLst/>
@@ -6478,7 +6448,7 @@
         </p:blipFill>
         <p:spPr>
           <a:xfrm>
-            <a:off x="5425307" y="2412392"/>
+            <a:off x="5257737" y="727338"/>
             <a:ext cx="1873879" cy="4164174"/>
           </a:xfrm>
           <a:prstGeom prst="rect">
@@ -6508,283 +6478,8 @@
         </p:blipFill>
         <p:spPr>
           <a:xfrm>
-            <a:off x="9165299" y="2941242"/>
+            <a:off x="7750836" y="1018128"/>
             <a:ext cx="2489814" cy="3285171"/>
-          </a:xfrm>
-          <a:prstGeom prst="rect">
-            <a:avLst/>
-          </a:prstGeom>
-        </p:spPr>
-      </p:pic>
-      <p:pic>
-        <p:nvPicPr>
-          <p:cNvPr id="2" name="Picture 1" descr="A yellow and orange background&#10;&#10;Description automatically generated">
-            <a:extLst>
-              <a:ext uri="{FF2B5EF4-FFF2-40B4-BE49-F238E27FC236}">
-                <a16:creationId xmlns:a16="http://schemas.microsoft.com/office/drawing/2014/main" id="{E0DAC836-1EE6-73C5-EE2B-D1EB5EAA75CC}"/>
-              </a:ext>
-            </a:extLst>
-          </p:cNvPr>
-          <p:cNvPicPr>
-            <a:picLocks noChangeAspect="1"/>
-          </p:cNvPicPr>
-          <p:nvPr/>
-        </p:nvPicPr>
-        <p:blipFill>
-          <a:blip r:embed="rId5">
-            <a:extLst>
-              <a:ext uri="{BEBA8EAE-BF5A-486C-A8C5-ECC9F3942E4B}">
-                <a14:imgProps xmlns:a14="http://schemas.microsoft.com/office/drawing/2010/main">
-                  <a14:imgLayer r:embed="rId6">
-                    <a14:imgEffect>
-                      <a14:saturation sat="86000"/>
-                    </a14:imgEffect>
-                  </a14:imgLayer>
-                </a14:imgProps>
-              </a:ext>
-            </a:extLst>
-          </a:blip>
-          <a:stretch>
-            <a:fillRect/>
-          </a:stretch>
-        </p:blipFill>
-        <p:spPr>
-          <a:xfrm>
-            <a:off x="536887" y="171450"/>
-            <a:ext cx="4088716" cy="6686550"/>
-          </a:xfrm>
-          <a:prstGeom prst="rect">
-            <a:avLst/>
-          </a:prstGeom>
-        </p:spPr>
-      </p:pic>
-      <p:pic>
-        <p:nvPicPr>
-          <p:cNvPr id="49" name="Picture 48" descr="A screenshot of a video game&#10;&#10;Description automatically generated">
-            <a:extLst>
-              <a:ext uri="{FF2B5EF4-FFF2-40B4-BE49-F238E27FC236}">
-                <a16:creationId xmlns:a16="http://schemas.microsoft.com/office/drawing/2014/main" id="{0D7E0268-17B0-9BFF-F7E9-637473E601BA}"/>
-              </a:ext>
-            </a:extLst>
-          </p:cNvPr>
-          <p:cNvPicPr>
-            <a:picLocks noChangeAspect="1"/>
-          </p:cNvPicPr>
-          <p:nvPr/>
-        </p:nvPicPr>
-        <p:blipFill rotWithShape="1">
-          <a:blip r:embed="rId4"/>
-          <a:srcRect t="50679" r="36435"/>
-          <a:stretch/>
-        </p:blipFill>
-        <p:spPr>
-          <a:xfrm>
-            <a:off x="536887" y="240570"/>
-            <a:ext cx="1419255" cy="1453010"/>
-          </a:xfrm>
-          <a:prstGeom prst="rect">
-            <a:avLst/>
-          </a:prstGeom>
-        </p:spPr>
-      </p:pic>
-      <p:pic>
-        <p:nvPicPr>
-          <p:cNvPr id="50" name="Picture 49" descr="A screenshot of a video game&#10;&#10;Description automatically generated">
-            <a:extLst>
-              <a:ext uri="{FF2B5EF4-FFF2-40B4-BE49-F238E27FC236}">
-                <a16:creationId xmlns:a16="http://schemas.microsoft.com/office/drawing/2014/main" id="{5121B4A4-965E-EF0B-B026-FBA1846EF1EE}"/>
-              </a:ext>
-            </a:extLst>
-          </p:cNvPr>
-          <p:cNvPicPr>
-            <a:picLocks noChangeAspect="1"/>
-          </p:cNvPicPr>
-          <p:nvPr/>
-        </p:nvPicPr>
-        <p:blipFill rotWithShape="1">
-          <a:blip r:embed="rId4"/>
-          <a:srcRect l="1" t="17816" r="67208" b="74721"/>
-          <a:stretch/>
-        </p:blipFill>
-        <p:spPr>
-          <a:xfrm>
-            <a:off x="3490735" y="5981283"/>
-            <a:ext cx="816431" cy="245130"/>
-          </a:xfrm>
-          <a:prstGeom prst="rect">
-            <a:avLst/>
-          </a:prstGeom>
-        </p:spPr>
-      </p:pic>
-      <p:pic>
-        <p:nvPicPr>
-          <p:cNvPr id="51" name="Picture 50" descr="A screenshot of a video game&#10;&#10;Description automatically generated">
-            <a:extLst>
-              <a:ext uri="{FF2B5EF4-FFF2-40B4-BE49-F238E27FC236}">
-                <a16:creationId xmlns:a16="http://schemas.microsoft.com/office/drawing/2014/main" id="{428BB0DC-E268-995A-B108-A729428902FC}"/>
-              </a:ext>
-            </a:extLst>
-          </p:cNvPr>
-          <p:cNvPicPr>
-            <a:picLocks noChangeAspect="1"/>
-          </p:cNvPicPr>
-          <p:nvPr/>
-        </p:nvPicPr>
-        <p:blipFill rotWithShape="1">
-          <a:blip r:embed="rId4"/>
-          <a:srcRect l="26855" t="6960" r="67208" b="74722"/>
-          <a:stretch/>
-        </p:blipFill>
-        <p:spPr>
-          <a:xfrm>
-            <a:off x="4159349" y="5624741"/>
-            <a:ext cx="147817" cy="601672"/>
-          </a:xfrm>
-          <a:prstGeom prst="rect">
-            <a:avLst/>
-          </a:prstGeom>
-        </p:spPr>
-      </p:pic>
-      <p:pic>
-        <p:nvPicPr>
-          <p:cNvPr id="52" name="Picture 51" descr="A screenshot of a video game&#10;&#10;Description automatically generated">
-            <a:extLst>
-              <a:ext uri="{FF2B5EF4-FFF2-40B4-BE49-F238E27FC236}">
-                <a16:creationId xmlns:a16="http://schemas.microsoft.com/office/drawing/2014/main" id="{C4C31D3E-8271-6889-CC12-A9BC2F40609E}"/>
-              </a:ext>
-            </a:extLst>
-          </p:cNvPr>
-          <p:cNvPicPr>
-            <a:picLocks noChangeAspect="1"/>
-          </p:cNvPicPr>
-          <p:nvPr/>
-        </p:nvPicPr>
-        <p:blipFill rotWithShape="1">
-          <a:blip r:embed="rId4"/>
-          <a:srcRect l="26855" t="6960" r="67208" b="74722"/>
-          <a:stretch/>
-        </p:blipFill>
-        <p:spPr>
-          <a:xfrm>
-            <a:off x="795697" y="2049566"/>
-            <a:ext cx="147817" cy="601672"/>
-          </a:xfrm>
-          <a:prstGeom prst="rect">
-            <a:avLst/>
-          </a:prstGeom>
-        </p:spPr>
-      </p:pic>
-      <p:pic>
-        <p:nvPicPr>
-          <p:cNvPr id="53" name="Picture 52" descr="A screenshot of a video game&#10;&#10;Description automatically generated">
-            <a:extLst>
-              <a:ext uri="{FF2B5EF4-FFF2-40B4-BE49-F238E27FC236}">
-                <a16:creationId xmlns:a16="http://schemas.microsoft.com/office/drawing/2014/main" id="{2550F10A-3C46-18BC-EACB-62B15B431CFB}"/>
-              </a:ext>
-            </a:extLst>
-          </p:cNvPr>
-          <p:cNvPicPr>
-            <a:picLocks noChangeAspect="1"/>
-          </p:cNvPicPr>
-          <p:nvPr/>
-        </p:nvPicPr>
-        <p:blipFill rotWithShape="1">
-          <a:blip r:embed="rId4"/>
-          <a:srcRect l="-205" t="-344" r="88228" b="91610"/>
-          <a:stretch/>
-        </p:blipFill>
-        <p:spPr>
-          <a:xfrm>
-            <a:off x="816827" y="1762700"/>
-            <a:ext cx="298208" cy="286866"/>
-          </a:xfrm>
-          <a:prstGeom prst="rect">
-            <a:avLst/>
-          </a:prstGeom>
-        </p:spPr>
-      </p:pic>
-      <p:pic>
-        <p:nvPicPr>
-          <p:cNvPr id="54" name="Picture 53" descr="A screenshot of a video game&#10;&#10;Description automatically generated">
-            <a:extLst>
-              <a:ext uri="{FF2B5EF4-FFF2-40B4-BE49-F238E27FC236}">
-                <a16:creationId xmlns:a16="http://schemas.microsoft.com/office/drawing/2014/main" id="{F50CB122-8E8D-5B0E-08AD-A1A1EBA8A8E0}"/>
-              </a:ext>
-            </a:extLst>
-          </p:cNvPr>
-          <p:cNvPicPr>
-            <a:picLocks noChangeAspect="1"/>
-          </p:cNvPicPr>
-          <p:nvPr/>
-        </p:nvPicPr>
-        <p:blipFill rotWithShape="1">
-          <a:blip r:embed="rId4"/>
-          <a:srcRect l="26855" t="6960" r="67208" b="74722"/>
-          <a:stretch/>
-        </p:blipFill>
-        <p:spPr>
-          <a:xfrm>
-            <a:off x="4159349" y="5179935"/>
-            <a:ext cx="147817" cy="601672"/>
-          </a:xfrm>
-          <a:prstGeom prst="rect">
-            <a:avLst/>
-          </a:prstGeom>
-        </p:spPr>
-      </p:pic>
-      <p:pic>
-        <p:nvPicPr>
-          <p:cNvPr id="55" name="Picture 54" descr="A screenshot of a video game&#10;&#10;Description automatically generated">
-            <a:extLst>
-              <a:ext uri="{FF2B5EF4-FFF2-40B4-BE49-F238E27FC236}">
-                <a16:creationId xmlns:a16="http://schemas.microsoft.com/office/drawing/2014/main" id="{35382508-1010-2FD1-09C8-F016A01F4B30}"/>
-              </a:ext>
-            </a:extLst>
-          </p:cNvPr>
-          <p:cNvPicPr>
-            <a:picLocks noChangeAspect="1"/>
-          </p:cNvPicPr>
-          <p:nvPr/>
-        </p:nvPicPr>
-        <p:blipFill rotWithShape="1">
-          <a:blip r:embed="rId4"/>
-          <a:srcRect l="26855" t="6960" r="67208" b="74722"/>
-          <a:stretch/>
-        </p:blipFill>
-        <p:spPr>
-          <a:xfrm>
-            <a:off x="4159349" y="4908473"/>
-            <a:ext cx="147817" cy="601672"/>
-          </a:xfrm>
-          <a:prstGeom prst="rect">
-            <a:avLst/>
-          </a:prstGeom>
-        </p:spPr>
-      </p:pic>
-      <p:pic>
-        <p:nvPicPr>
-          <p:cNvPr id="4" name="Picture 3" descr="A screenshot of a video game&#10;&#10;Description automatically generated">
-            <a:extLst>
-              <a:ext uri="{FF2B5EF4-FFF2-40B4-BE49-F238E27FC236}">
-                <a16:creationId xmlns:a16="http://schemas.microsoft.com/office/drawing/2014/main" id="{7818D1E0-2D55-B9CF-D834-CF47073AE2DE}"/>
-              </a:ext>
-            </a:extLst>
-          </p:cNvPr>
-          <p:cNvPicPr>
-            <a:picLocks noChangeAspect="1"/>
-          </p:cNvPicPr>
-          <p:nvPr/>
-        </p:nvPicPr>
-        <p:blipFill>
-          <a:blip r:embed="rId2"/>
-          <a:stretch>
-            <a:fillRect/>
-          </a:stretch>
-        </p:blipFill>
-        <p:spPr>
-          <a:xfrm>
-            <a:off x="8025632" y="883630"/>
-            <a:ext cx="1873879" cy="4164174"/>
           </a:xfrm>
           <a:prstGeom prst="rect">
             <a:avLst/>
@@ -7051,7 +6746,7 @@
         </p:nvGrpSpPr>
         <p:grpSpPr>
           <a:xfrm>
-            <a:off x="4905543" y="171450"/>
+            <a:off x="4889268" y="177616"/>
             <a:ext cx="4093720" cy="6686550"/>
             <a:chOff x="1147094" y="721238"/>
             <a:chExt cx="3437481" cy="5489082"/>
@@ -8413,7 +8108,7 @@
         </p:blipFill>
         <p:spPr>
           <a:xfrm>
-            <a:off x="7876400" y="564465"/>
+            <a:off x="7658618" y="566786"/>
             <a:ext cx="742950" cy="1080515"/>
           </a:xfrm>
           <a:prstGeom prst="rect">
@@ -8435,74 +8130,15 @@
           </p:cNvPicPr>
           <p:nvPr/>
         </p:nvPicPr>
-        <p:blipFill>
+        <p:blipFill rotWithShape="1">
           <a:blip r:embed="rId6"/>
-          <a:stretch>
-            <a:fillRect/>
-          </a:stretch>
-        </p:blipFill>
-        <p:spPr>
-          <a:xfrm>
-            <a:off x="9739583" y="947158"/>
-            <a:ext cx="1873879" cy="4164174"/>
-          </a:xfrm>
-          <a:prstGeom prst="rect">
-            <a:avLst/>
-          </a:prstGeom>
-        </p:spPr>
-      </p:pic>
-      <p:pic>
-        <p:nvPicPr>
-          <p:cNvPr id="69" name="Picture 68" descr="A screenshot of a video game&#10;&#10;Description automatically generated">
-            <a:extLst>
-              <a:ext uri="{FF2B5EF4-FFF2-40B4-BE49-F238E27FC236}">
-                <a16:creationId xmlns:a16="http://schemas.microsoft.com/office/drawing/2014/main" id="{DE52405D-87EA-F83E-7C7C-EED05006521F}"/>
-              </a:ext>
-            </a:extLst>
-          </p:cNvPr>
-          <p:cNvPicPr>
-            <a:picLocks noChangeAspect="1"/>
-          </p:cNvPicPr>
-          <p:nvPr/>
-        </p:nvPicPr>
-        <p:blipFill rotWithShape="1">
-          <a:blip r:embed="rId4"/>
-          <a:srcRect t="50679" r="36435"/>
+          <a:srcRect l="-1" r="76126" b="95326"/>
           <a:stretch/>
         </p:blipFill>
         <p:spPr>
           <a:xfrm>
-            <a:off x="536887" y="280355"/>
-            <a:ext cx="1419255" cy="1453010"/>
-          </a:xfrm>
-          <a:prstGeom prst="rect">
-            <a:avLst/>
-          </a:prstGeom>
-        </p:spPr>
-      </p:pic>
-      <p:pic>
-        <p:nvPicPr>
-          <p:cNvPr id="70" name="Picture 69" descr="A screenshot of a video game&#10;&#10;Description automatically generated">
-            <a:extLst>
-              <a:ext uri="{FF2B5EF4-FFF2-40B4-BE49-F238E27FC236}">
-                <a16:creationId xmlns:a16="http://schemas.microsoft.com/office/drawing/2014/main" id="{FFB34181-F6C3-9773-CDE5-0591357A7503}"/>
-              </a:ext>
-            </a:extLst>
-          </p:cNvPr>
-          <p:cNvPicPr>
-            <a:picLocks noChangeAspect="1"/>
-          </p:cNvPicPr>
-          <p:nvPr/>
-        </p:nvPicPr>
-        <p:blipFill rotWithShape="1">
-          <a:blip r:embed="rId4"/>
-          <a:srcRect t="50679" r="36435"/>
-          <a:stretch/>
-        </p:blipFill>
-        <p:spPr>
-          <a:xfrm>
-            <a:off x="4937437" y="280355"/>
-            <a:ext cx="1419255" cy="1453010"/>
+            <a:off x="5608718" y="1857469"/>
+            <a:ext cx="447405" cy="194645"/>
           </a:xfrm>
           <a:prstGeom prst="rect">
             <a:avLst/>
@@ -8532,6 +8168,1079 @@
           <a:xfrm>
             <a:off x="5191077" y="5869304"/>
             <a:ext cx="585787" cy="300038"/>
+          </a:xfrm>
+          <a:prstGeom prst="rect">
+            <a:avLst/>
+          </a:prstGeom>
+        </p:spPr>
+      </p:pic>
+      <p:pic>
+        <p:nvPicPr>
+          <p:cNvPr id="72" name="Picture 71" descr="A screenshot of a video game&#10;&#10;Description automatically generated">
+            <a:extLst>
+              <a:ext uri="{FF2B5EF4-FFF2-40B4-BE49-F238E27FC236}">
+                <a16:creationId xmlns:a16="http://schemas.microsoft.com/office/drawing/2014/main" id="{9AE175AD-9418-C670-9E0C-61DA9BA6EB60}"/>
+              </a:ext>
+            </a:extLst>
+          </p:cNvPr>
+          <p:cNvPicPr>
+            <a:picLocks noChangeAspect="1"/>
+          </p:cNvPicPr>
+          <p:nvPr/>
+        </p:nvPicPr>
+        <p:blipFill rotWithShape="1">
+          <a:blip r:embed="rId6"/>
+          <a:srcRect l="-1" r="76126" b="95326"/>
+          <a:stretch/>
+        </p:blipFill>
+        <p:spPr>
+          <a:xfrm>
+            <a:off x="5391589" y="5579572"/>
+            <a:ext cx="447405" cy="194645"/>
+          </a:xfrm>
+          <a:prstGeom prst="rect">
+            <a:avLst/>
+          </a:prstGeom>
+        </p:spPr>
+      </p:pic>
+      <p:pic>
+        <p:nvPicPr>
+          <p:cNvPr id="73" name="Picture 72" descr="A screenshot of a video game&#10;&#10;Description automatically generated">
+            <a:extLst>
+              <a:ext uri="{FF2B5EF4-FFF2-40B4-BE49-F238E27FC236}">
+                <a16:creationId xmlns:a16="http://schemas.microsoft.com/office/drawing/2014/main" id="{631C4B09-4F53-DBF7-D85D-7D0F9797E10D}"/>
+              </a:ext>
+            </a:extLst>
+          </p:cNvPr>
+          <p:cNvPicPr>
+            <a:picLocks noChangeAspect="1"/>
+          </p:cNvPicPr>
+          <p:nvPr/>
+        </p:nvPicPr>
+        <p:blipFill rotWithShape="1">
+          <a:blip r:embed="rId4"/>
+          <a:srcRect l="21657" t="41921" r="67280" b="49233"/>
+          <a:stretch/>
+        </p:blipFill>
+        <p:spPr>
+          <a:xfrm>
+            <a:off x="8215032" y="1665354"/>
+            <a:ext cx="252525" cy="266435"/>
+          </a:xfrm>
+          <a:prstGeom prst="rect">
+            <a:avLst/>
+          </a:prstGeom>
+        </p:spPr>
+      </p:pic>
+      <p:pic>
+        <p:nvPicPr>
+          <p:cNvPr id="74" name="Picture 73" descr="A screenshot of a video game&#10;&#10;Description automatically generated">
+            <a:extLst>
+              <a:ext uri="{FF2B5EF4-FFF2-40B4-BE49-F238E27FC236}">
+                <a16:creationId xmlns:a16="http://schemas.microsoft.com/office/drawing/2014/main" id="{9E26A7E8-AA8B-4AB4-414E-9BD8613FAFF9}"/>
+              </a:ext>
+            </a:extLst>
+          </p:cNvPr>
+          <p:cNvPicPr>
+            <a:picLocks noChangeAspect="1"/>
+          </p:cNvPicPr>
+          <p:nvPr/>
+        </p:nvPicPr>
+        <p:blipFill rotWithShape="1">
+          <a:blip r:embed="rId6"/>
+          <a:srcRect l="-1" r="76126" b="95326"/>
+          <a:stretch/>
+        </p:blipFill>
+        <p:spPr>
+          <a:xfrm>
+            <a:off x="5721199" y="5802856"/>
+            <a:ext cx="447405" cy="194645"/>
+          </a:xfrm>
+          <a:prstGeom prst="rect">
+            <a:avLst/>
+          </a:prstGeom>
+        </p:spPr>
+      </p:pic>
+      <p:pic>
+        <p:nvPicPr>
+          <p:cNvPr id="75" name="Picture 74" descr="A screenshot of a video game&#10;&#10;Description automatically generated">
+            <a:extLst>
+              <a:ext uri="{FF2B5EF4-FFF2-40B4-BE49-F238E27FC236}">
+                <a16:creationId xmlns:a16="http://schemas.microsoft.com/office/drawing/2014/main" id="{65CE40E5-1E73-720D-3282-094A741A7DB2}"/>
+              </a:ext>
+            </a:extLst>
+          </p:cNvPr>
+          <p:cNvPicPr>
+            <a:picLocks noChangeAspect="1"/>
+          </p:cNvPicPr>
+          <p:nvPr/>
+        </p:nvPicPr>
+        <p:blipFill rotWithShape="1">
+          <a:blip r:embed="rId6"/>
+          <a:srcRect l="-1" r="76126" b="95326"/>
+          <a:stretch/>
+        </p:blipFill>
+        <p:spPr>
+          <a:xfrm>
+            <a:off x="6157134" y="5941079"/>
+            <a:ext cx="447405" cy="194645"/>
+          </a:xfrm>
+          <a:prstGeom prst="rect">
+            <a:avLst/>
+          </a:prstGeom>
+        </p:spPr>
+      </p:pic>
+      <p:pic>
+        <p:nvPicPr>
+          <p:cNvPr id="76" name="Picture 75" descr="A screenshot of a video game&#10;&#10;Description automatically generated">
+            <a:extLst>
+              <a:ext uri="{FF2B5EF4-FFF2-40B4-BE49-F238E27FC236}">
+                <a16:creationId xmlns:a16="http://schemas.microsoft.com/office/drawing/2014/main" id="{585F04BC-5135-957B-E720-A988980619DC}"/>
+              </a:ext>
+            </a:extLst>
+          </p:cNvPr>
+          <p:cNvPicPr>
+            <a:picLocks noChangeAspect="1"/>
+          </p:cNvPicPr>
+          <p:nvPr/>
+        </p:nvPicPr>
+        <p:blipFill rotWithShape="1">
+          <a:blip r:embed="rId6"/>
+          <a:srcRect l="-1" r="76126" b="95326"/>
+          <a:stretch/>
+        </p:blipFill>
+        <p:spPr>
+          <a:xfrm>
+            <a:off x="5273794" y="5250728"/>
+            <a:ext cx="447405" cy="194645"/>
+          </a:xfrm>
+          <a:prstGeom prst="rect">
+            <a:avLst/>
+          </a:prstGeom>
+        </p:spPr>
+      </p:pic>
+      <p:pic>
+        <p:nvPicPr>
+          <p:cNvPr id="77" name="Picture 76" descr="A screenshot of a video game&#10;&#10;Description automatically generated">
+            <a:extLst>
+              <a:ext uri="{FF2B5EF4-FFF2-40B4-BE49-F238E27FC236}">
+                <a16:creationId xmlns:a16="http://schemas.microsoft.com/office/drawing/2014/main" id="{B1AFAD12-CE29-568B-9F07-C11A3EC804E0}"/>
+              </a:ext>
+            </a:extLst>
+          </p:cNvPr>
+          <p:cNvPicPr>
+            <a:picLocks noChangeAspect="1"/>
+          </p:cNvPicPr>
+          <p:nvPr/>
+        </p:nvPicPr>
+        <p:blipFill rotWithShape="1">
+          <a:blip r:embed="rId6"/>
+          <a:srcRect l="-1" r="76126" b="95326"/>
+          <a:stretch/>
+        </p:blipFill>
+        <p:spPr>
+          <a:xfrm>
+            <a:off x="5136082" y="4943087"/>
+            <a:ext cx="447405" cy="194645"/>
+          </a:xfrm>
+          <a:prstGeom prst="rect">
+            <a:avLst/>
+          </a:prstGeom>
+        </p:spPr>
+      </p:pic>
+      <p:pic>
+        <p:nvPicPr>
+          <p:cNvPr id="78" name="Picture 77" descr="A screenshot of a video game&#10;&#10;Description automatically generated">
+            <a:extLst>
+              <a:ext uri="{FF2B5EF4-FFF2-40B4-BE49-F238E27FC236}">
+                <a16:creationId xmlns:a16="http://schemas.microsoft.com/office/drawing/2014/main" id="{E19FB879-90BA-C346-AE4A-E8349517868F}"/>
+              </a:ext>
+            </a:extLst>
+          </p:cNvPr>
+          <p:cNvPicPr>
+            <a:picLocks noChangeAspect="1"/>
+          </p:cNvPicPr>
+          <p:nvPr/>
+        </p:nvPicPr>
+        <p:blipFill rotWithShape="1">
+          <a:blip r:embed="rId4"/>
+          <a:srcRect l="33308" t="42837" r="55589" b="49713"/>
+          <a:stretch/>
+        </p:blipFill>
+        <p:spPr>
+          <a:xfrm>
+            <a:off x="6306986" y="5959868"/>
+            <a:ext cx="276446" cy="244763"/>
+          </a:xfrm>
+          <a:prstGeom prst="rect">
+            <a:avLst/>
+          </a:prstGeom>
+        </p:spPr>
+      </p:pic>
+      <p:pic>
+        <p:nvPicPr>
+          <p:cNvPr id="79" name="Picture 78" descr="A screenshot of a video game&#10;&#10;Description automatically generated">
+            <a:extLst>
+              <a:ext uri="{FF2B5EF4-FFF2-40B4-BE49-F238E27FC236}">
+                <a16:creationId xmlns:a16="http://schemas.microsoft.com/office/drawing/2014/main" id="{89AF94C3-2ADF-9F17-2C60-934F48F2C61F}"/>
+              </a:ext>
+            </a:extLst>
+          </p:cNvPr>
+          <p:cNvPicPr>
+            <a:picLocks noChangeAspect="1"/>
+          </p:cNvPicPr>
+          <p:nvPr/>
+        </p:nvPicPr>
+        <p:blipFill rotWithShape="1">
+          <a:blip r:embed="rId4"/>
+          <a:srcRect l="33308" t="42837" r="55589" b="49713"/>
+          <a:stretch/>
+        </p:blipFill>
+        <p:spPr>
+          <a:xfrm>
+            <a:off x="5784589" y="5851140"/>
+            <a:ext cx="276446" cy="244763"/>
+          </a:xfrm>
+          <a:prstGeom prst="rect">
+            <a:avLst/>
+          </a:prstGeom>
+        </p:spPr>
+      </p:pic>
+      <p:pic>
+        <p:nvPicPr>
+          <p:cNvPr id="80" name="Picture 79" descr="A screenshot of a video game&#10;&#10;Description automatically generated">
+            <a:extLst>
+              <a:ext uri="{FF2B5EF4-FFF2-40B4-BE49-F238E27FC236}">
+                <a16:creationId xmlns:a16="http://schemas.microsoft.com/office/drawing/2014/main" id="{81E73FEB-2A1B-E084-3E60-018178EAFE22}"/>
+              </a:ext>
+            </a:extLst>
+          </p:cNvPr>
+          <p:cNvPicPr>
+            <a:picLocks noChangeAspect="1"/>
+          </p:cNvPicPr>
+          <p:nvPr/>
+        </p:nvPicPr>
+        <p:blipFill rotWithShape="1">
+          <a:blip r:embed="rId4"/>
+          <a:srcRect l="33308" t="42837" r="55589" b="49713"/>
+          <a:stretch/>
+        </p:blipFill>
+        <p:spPr>
+          <a:xfrm>
+            <a:off x="5325495" y="5445373"/>
+            <a:ext cx="276446" cy="244763"/>
+          </a:xfrm>
+          <a:prstGeom prst="rect">
+            <a:avLst/>
+          </a:prstGeom>
+        </p:spPr>
+      </p:pic>
+      <p:pic>
+        <p:nvPicPr>
+          <p:cNvPr id="81" name="Picture 80" descr="A screenshot of a video game&#10;&#10;Description automatically generated">
+            <a:extLst>
+              <a:ext uri="{FF2B5EF4-FFF2-40B4-BE49-F238E27FC236}">
+                <a16:creationId xmlns:a16="http://schemas.microsoft.com/office/drawing/2014/main" id="{5D605FCB-838E-FEB8-8E82-66C7CAF86899}"/>
+              </a:ext>
+            </a:extLst>
+          </p:cNvPr>
+          <p:cNvPicPr>
+            <a:picLocks noChangeAspect="1"/>
+          </p:cNvPicPr>
+          <p:nvPr/>
+        </p:nvPicPr>
+        <p:blipFill rotWithShape="1">
+          <a:blip r:embed="rId4"/>
+          <a:srcRect l="33308" t="42837" r="55589" b="49713"/>
+          <a:stretch/>
+        </p:blipFill>
+        <p:spPr>
+          <a:xfrm>
+            <a:off x="7341388" y="1311363"/>
+            <a:ext cx="276446" cy="244763"/>
+          </a:xfrm>
+          <a:prstGeom prst="rect">
+            <a:avLst/>
+          </a:prstGeom>
+        </p:spPr>
+      </p:pic>
+      <p:pic>
+        <p:nvPicPr>
+          <p:cNvPr id="82" name="Picture 81" descr="A screenshot of a video game&#10;&#10;Description automatically generated">
+            <a:extLst>
+              <a:ext uri="{FF2B5EF4-FFF2-40B4-BE49-F238E27FC236}">
+                <a16:creationId xmlns:a16="http://schemas.microsoft.com/office/drawing/2014/main" id="{50B24620-B00B-29BE-A17B-767A8EC7949E}"/>
+              </a:ext>
+            </a:extLst>
+          </p:cNvPr>
+          <p:cNvPicPr>
+            <a:picLocks noChangeAspect="1"/>
+          </p:cNvPicPr>
+          <p:nvPr/>
+        </p:nvPicPr>
+        <p:blipFill rotWithShape="1">
+          <a:blip r:embed="rId4"/>
+          <a:srcRect l="23066" t="35400" r="66780" b="59255"/>
+          <a:stretch/>
+        </p:blipFill>
+        <p:spPr>
+          <a:xfrm>
+            <a:off x="5666413" y="5595392"/>
+            <a:ext cx="252829" cy="175601"/>
+          </a:xfrm>
+          <a:prstGeom prst="rect">
+            <a:avLst/>
+          </a:prstGeom>
+        </p:spPr>
+      </p:pic>
+      <p:pic>
+        <p:nvPicPr>
+          <p:cNvPr id="83" name="Picture 82" descr="A screenshot of a video game&#10;&#10;Description automatically generated">
+            <a:extLst>
+              <a:ext uri="{FF2B5EF4-FFF2-40B4-BE49-F238E27FC236}">
+                <a16:creationId xmlns:a16="http://schemas.microsoft.com/office/drawing/2014/main" id="{6C478E64-7688-1B01-5997-1827765146D1}"/>
+              </a:ext>
+            </a:extLst>
+          </p:cNvPr>
+          <p:cNvPicPr>
+            <a:picLocks noChangeAspect="1"/>
+          </p:cNvPicPr>
+          <p:nvPr/>
+        </p:nvPicPr>
+        <p:blipFill rotWithShape="1">
+          <a:blip r:embed="rId4"/>
+          <a:srcRect l="33308" t="42837" r="55589" b="49713"/>
+          <a:stretch/>
+        </p:blipFill>
+        <p:spPr>
+          <a:xfrm>
+            <a:off x="8236934" y="1311363"/>
+            <a:ext cx="276446" cy="244763"/>
+          </a:xfrm>
+          <a:prstGeom prst="rect">
+            <a:avLst/>
+          </a:prstGeom>
+        </p:spPr>
+      </p:pic>
+      <p:pic>
+        <p:nvPicPr>
+          <p:cNvPr id="84" name="Picture 83" descr="A screenshot of a video game&#10;&#10;Description automatically generated">
+            <a:extLst>
+              <a:ext uri="{FF2B5EF4-FFF2-40B4-BE49-F238E27FC236}">
+                <a16:creationId xmlns:a16="http://schemas.microsoft.com/office/drawing/2014/main" id="{85C57E2F-1E48-B509-F982-0D19E038A2B3}"/>
+              </a:ext>
+            </a:extLst>
+          </p:cNvPr>
+          <p:cNvPicPr>
+            <a:picLocks noChangeAspect="1"/>
+          </p:cNvPicPr>
+          <p:nvPr/>
+        </p:nvPicPr>
+        <p:blipFill rotWithShape="1">
+          <a:blip r:embed="rId6"/>
+          <a:srcRect l="22580" t="25249" r="53776" b="66442"/>
+          <a:stretch/>
+        </p:blipFill>
+        <p:spPr>
+          <a:xfrm>
+            <a:off x="8057865" y="5560339"/>
+            <a:ext cx="443060" cy="346001"/>
+          </a:xfrm>
+          <a:prstGeom prst="rect">
+            <a:avLst/>
+          </a:prstGeom>
+        </p:spPr>
+      </p:pic>
+      <p:pic>
+        <p:nvPicPr>
+          <p:cNvPr id="85" name="Picture 84" descr="A screenshot of a video game&#10;&#10;Description automatically generated">
+            <a:extLst>
+              <a:ext uri="{FF2B5EF4-FFF2-40B4-BE49-F238E27FC236}">
+                <a16:creationId xmlns:a16="http://schemas.microsoft.com/office/drawing/2014/main" id="{A6DDFF3A-A35F-63B4-7680-57CE631E635B}"/>
+              </a:ext>
+            </a:extLst>
+          </p:cNvPr>
+          <p:cNvPicPr>
+            <a:picLocks noChangeAspect="1"/>
+          </p:cNvPicPr>
+          <p:nvPr/>
+        </p:nvPicPr>
+        <p:blipFill rotWithShape="1">
+          <a:blip r:embed="rId6"/>
+          <a:srcRect l="22580" t="25249" r="53776" b="66442"/>
+          <a:stretch/>
+        </p:blipFill>
+        <p:spPr>
+          <a:xfrm>
+            <a:off x="5040910" y="4729514"/>
+            <a:ext cx="443060" cy="346001"/>
+          </a:xfrm>
+          <a:prstGeom prst="rect">
+            <a:avLst/>
+          </a:prstGeom>
+        </p:spPr>
+      </p:pic>
+      <p:pic>
+        <p:nvPicPr>
+          <p:cNvPr id="86" name="Picture 85" descr="A screenshot of a video game&#10;&#10;Description automatically generated">
+            <a:extLst>
+              <a:ext uri="{FF2B5EF4-FFF2-40B4-BE49-F238E27FC236}">
+                <a16:creationId xmlns:a16="http://schemas.microsoft.com/office/drawing/2014/main" id="{90762981-D1A5-9C82-58C6-BC24CAFE4620}"/>
+              </a:ext>
+            </a:extLst>
+          </p:cNvPr>
+          <p:cNvPicPr>
+            <a:picLocks noChangeAspect="1"/>
+          </p:cNvPicPr>
+          <p:nvPr/>
+        </p:nvPicPr>
+        <p:blipFill rotWithShape="1">
+          <a:blip r:embed="rId6"/>
+          <a:srcRect l="22580" t="25249" r="53776" b="66442"/>
+          <a:stretch/>
+        </p:blipFill>
+        <p:spPr>
+          <a:xfrm>
+            <a:off x="5217131" y="5111531"/>
+            <a:ext cx="443060" cy="346001"/>
+          </a:xfrm>
+          <a:prstGeom prst="rect">
+            <a:avLst/>
+          </a:prstGeom>
+        </p:spPr>
+      </p:pic>
+      <p:pic>
+        <p:nvPicPr>
+          <p:cNvPr id="91" name="Picture 90" descr="A screenshot of a video game&#10;&#10;Description automatically generated">
+            <a:extLst>
+              <a:ext uri="{FF2B5EF4-FFF2-40B4-BE49-F238E27FC236}">
+                <a16:creationId xmlns:a16="http://schemas.microsoft.com/office/drawing/2014/main" id="{2D3EAF06-0638-D07D-3713-E2528E38F086}"/>
+              </a:ext>
+            </a:extLst>
+          </p:cNvPr>
+          <p:cNvPicPr>
+            <a:picLocks noChangeAspect="1"/>
+          </p:cNvPicPr>
+          <p:nvPr/>
+        </p:nvPicPr>
+        <p:blipFill rotWithShape="1">
+          <a:blip r:embed="rId6"/>
+          <a:srcRect l="22580" t="25249" r="53776" b="66442"/>
+          <a:stretch/>
+        </p:blipFill>
+        <p:spPr>
+          <a:xfrm>
+            <a:off x="6858907" y="1266151"/>
+            <a:ext cx="443060" cy="346001"/>
+          </a:xfrm>
+          <a:prstGeom prst="rect">
+            <a:avLst/>
+          </a:prstGeom>
+        </p:spPr>
+      </p:pic>
+      <p:pic>
+        <p:nvPicPr>
+          <p:cNvPr id="92" name="Picture 91" descr="A screenshot of a video game&#10;&#10;Description automatically generated">
+            <a:extLst>
+              <a:ext uri="{FF2B5EF4-FFF2-40B4-BE49-F238E27FC236}">
+                <a16:creationId xmlns:a16="http://schemas.microsoft.com/office/drawing/2014/main" id="{DBCAAD80-E5D8-6145-70AB-3D94CD8688BE}"/>
+              </a:ext>
+            </a:extLst>
+          </p:cNvPr>
+          <p:cNvPicPr>
+            <a:picLocks noChangeAspect="1"/>
+          </p:cNvPicPr>
+          <p:nvPr/>
+        </p:nvPicPr>
+        <p:blipFill rotWithShape="1">
+          <a:blip r:embed="rId6"/>
+          <a:srcRect l="22580" t="25249" r="53776" b="66442"/>
+          <a:stretch/>
+        </p:blipFill>
+        <p:spPr>
+          <a:xfrm>
+            <a:off x="8231600" y="3278887"/>
+            <a:ext cx="443060" cy="346001"/>
+          </a:xfrm>
+          <a:prstGeom prst="rect">
+            <a:avLst/>
+          </a:prstGeom>
+        </p:spPr>
+      </p:pic>
+      <p:pic>
+        <p:nvPicPr>
+          <p:cNvPr id="93" name="Picture 92" descr="A screenshot of a video game&#10;&#10;Description automatically generated">
+            <a:extLst>
+              <a:ext uri="{FF2B5EF4-FFF2-40B4-BE49-F238E27FC236}">
+                <a16:creationId xmlns:a16="http://schemas.microsoft.com/office/drawing/2014/main" id="{4F0184CE-28BB-8F70-3243-D637BC8A91CB}"/>
+              </a:ext>
+            </a:extLst>
+          </p:cNvPr>
+          <p:cNvPicPr>
+            <a:picLocks noChangeAspect="1"/>
+          </p:cNvPicPr>
+          <p:nvPr/>
+        </p:nvPicPr>
+        <p:blipFill rotWithShape="1">
+          <a:blip r:embed="rId6"/>
+          <a:srcRect l="22580" t="25249" r="53776" b="66442"/>
+          <a:stretch/>
+        </p:blipFill>
+        <p:spPr>
+          <a:xfrm>
+            <a:off x="8385764" y="1899671"/>
+            <a:ext cx="443060" cy="346001"/>
+          </a:xfrm>
+          <a:prstGeom prst="rect">
+            <a:avLst/>
+          </a:prstGeom>
+        </p:spPr>
+      </p:pic>
+      <p:pic>
+        <p:nvPicPr>
+          <p:cNvPr id="94" name="Picture 93" descr="A screenshot of a video game&#10;&#10;Description automatically generated">
+            <a:extLst>
+              <a:ext uri="{FF2B5EF4-FFF2-40B4-BE49-F238E27FC236}">
+                <a16:creationId xmlns:a16="http://schemas.microsoft.com/office/drawing/2014/main" id="{106A618F-CF2E-EE70-98C5-6683E2D4FBE5}"/>
+              </a:ext>
+            </a:extLst>
+          </p:cNvPr>
+          <p:cNvPicPr>
+            <a:picLocks noChangeAspect="1"/>
+          </p:cNvPicPr>
+          <p:nvPr/>
+        </p:nvPicPr>
+        <p:blipFill rotWithShape="1">
+          <a:blip r:embed="rId6"/>
+          <a:srcRect l="22580" t="25249" r="53776" b="66442"/>
+          <a:stretch/>
+        </p:blipFill>
+        <p:spPr>
+          <a:xfrm>
+            <a:off x="8340899" y="4018363"/>
+            <a:ext cx="443060" cy="346001"/>
+          </a:xfrm>
+          <a:prstGeom prst="rect">
+            <a:avLst/>
+          </a:prstGeom>
+        </p:spPr>
+      </p:pic>
+      <p:pic>
+        <p:nvPicPr>
+          <p:cNvPr id="95" name="Picture 94" descr="A screenshot of a video game&#10;&#10;Description automatically generated">
+            <a:extLst>
+              <a:ext uri="{FF2B5EF4-FFF2-40B4-BE49-F238E27FC236}">
+                <a16:creationId xmlns:a16="http://schemas.microsoft.com/office/drawing/2014/main" id="{AE9A59A3-8263-C1A8-2196-C04312A5E3B1}"/>
+              </a:ext>
+            </a:extLst>
+          </p:cNvPr>
+          <p:cNvPicPr>
+            <a:picLocks noChangeAspect="1"/>
+          </p:cNvPicPr>
+          <p:nvPr/>
+        </p:nvPicPr>
+        <p:blipFill rotWithShape="1">
+          <a:blip r:embed="rId6"/>
+          <a:srcRect l="-1" r="76126" b="95326"/>
+          <a:stretch/>
+        </p:blipFill>
+        <p:spPr>
+          <a:xfrm>
+            <a:off x="5008247" y="4113292"/>
+            <a:ext cx="447405" cy="194645"/>
+          </a:xfrm>
+          <a:prstGeom prst="rect">
+            <a:avLst/>
+          </a:prstGeom>
+        </p:spPr>
+      </p:pic>
+      <p:pic>
+        <p:nvPicPr>
+          <p:cNvPr id="96" name="Picture 95" descr="A screenshot of a video game&#10;&#10;Description automatically generated">
+            <a:extLst>
+              <a:ext uri="{FF2B5EF4-FFF2-40B4-BE49-F238E27FC236}">
+                <a16:creationId xmlns:a16="http://schemas.microsoft.com/office/drawing/2014/main" id="{3ED40EC0-7C97-F44A-158A-B46E06600F83}"/>
+              </a:ext>
+            </a:extLst>
+          </p:cNvPr>
+          <p:cNvPicPr>
+            <a:picLocks noChangeAspect="1"/>
+          </p:cNvPicPr>
+          <p:nvPr/>
+        </p:nvPicPr>
+        <p:blipFill rotWithShape="1">
+          <a:blip r:embed="rId6"/>
+          <a:srcRect l="-1" r="76126" b="95326"/>
+          <a:stretch/>
+        </p:blipFill>
+        <p:spPr>
+          <a:xfrm>
+            <a:off x="5226511" y="4607855"/>
+            <a:ext cx="447405" cy="194645"/>
+          </a:xfrm>
+          <a:prstGeom prst="rect">
+            <a:avLst/>
+          </a:prstGeom>
+        </p:spPr>
+      </p:pic>
+      <p:pic>
+        <p:nvPicPr>
+          <p:cNvPr id="97" name="Picture 96" descr="A screenshot of a video game&#10;&#10;Description automatically generated">
+            <a:extLst>
+              <a:ext uri="{FF2B5EF4-FFF2-40B4-BE49-F238E27FC236}">
+                <a16:creationId xmlns:a16="http://schemas.microsoft.com/office/drawing/2014/main" id="{D8CB4BE1-2868-82D7-081A-A92C85B08579}"/>
+              </a:ext>
+            </a:extLst>
+          </p:cNvPr>
+          <p:cNvPicPr>
+            <a:picLocks noChangeAspect="1"/>
+          </p:cNvPicPr>
+          <p:nvPr/>
+        </p:nvPicPr>
+        <p:blipFill rotWithShape="1">
+          <a:blip r:embed="rId6"/>
+          <a:srcRect l="-1" r="76126" b="95326"/>
+          <a:stretch/>
+        </p:blipFill>
+        <p:spPr>
+          <a:xfrm>
+            <a:off x="5514061" y="3341873"/>
+            <a:ext cx="447405" cy="194645"/>
+          </a:xfrm>
+          <a:prstGeom prst="rect">
+            <a:avLst/>
+          </a:prstGeom>
+        </p:spPr>
+      </p:pic>
+      <p:pic>
+        <p:nvPicPr>
+          <p:cNvPr id="98" name="Picture 97" descr="A screenshot of a video game&#10;&#10;Description automatically generated">
+            <a:extLst>
+              <a:ext uri="{FF2B5EF4-FFF2-40B4-BE49-F238E27FC236}">
+                <a16:creationId xmlns:a16="http://schemas.microsoft.com/office/drawing/2014/main" id="{438FD246-EA3D-CE3E-C221-A0DC49EBB033}"/>
+              </a:ext>
+            </a:extLst>
+          </p:cNvPr>
+          <p:cNvPicPr>
+            <a:picLocks noChangeAspect="1"/>
+          </p:cNvPicPr>
+          <p:nvPr/>
+        </p:nvPicPr>
+        <p:blipFill rotWithShape="1">
+          <a:blip r:embed="rId6"/>
+          <a:srcRect l="-1" r="76126" b="95326"/>
+          <a:stretch/>
+        </p:blipFill>
+        <p:spPr>
+          <a:xfrm>
+            <a:off x="5770754" y="2886761"/>
+            <a:ext cx="447405" cy="194645"/>
+          </a:xfrm>
+          <a:prstGeom prst="rect">
+            <a:avLst/>
+          </a:prstGeom>
+        </p:spPr>
+      </p:pic>
+      <p:pic>
+        <p:nvPicPr>
+          <p:cNvPr id="99" name="Picture 98" descr="A screenshot of a video game&#10;&#10;Description automatically generated">
+            <a:extLst>
+              <a:ext uri="{FF2B5EF4-FFF2-40B4-BE49-F238E27FC236}">
+                <a16:creationId xmlns:a16="http://schemas.microsoft.com/office/drawing/2014/main" id="{2377B54D-25EB-19D8-17A0-242B48DE2AA8}"/>
+              </a:ext>
+            </a:extLst>
+          </p:cNvPr>
+          <p:cNvPicPr>
+            <a:picLocks noChangeAspect="1"/>
+          </p:cNvPicPr>
+          <p:nvPr/>
+        </p:nvPicPr>
+        <p:blipFill rotWithShape="1">
+          <a:blip r:embed="rId6"/>
+          <a:srcRect l="-1" r="76126" b="95326"/>
+          <a:stretch/>
+        </p:blipFill>
+        <p:spPr>
+          <a:xfrm>
+            <a:off x="5044488" y="2829887"/>
+            <a:ext cx="447405" cy="194645"/>
+          </a:xfrm>
+          <a:prstGeom prst="rect">
+            <a:avLst/>
+          </a:prstGeom>
+        </p:spPr>
+      </p:pic>
+      <p:pic>
+        <p:nvPicPr>
+          <p:cNvPr id="100" name="Picture 99" descr="A screenshot of a video game&#10;&#10;Description automatically generated">
+            <a:extLst>
+              <a:ext uri="{FF2B5EF4-FFF2-40B4-BE49-F238E27FC236}">
+                <a16:creationId xmlns:a16="http://schemas.microsoft.com/office/drawing/2014/main" id="{F9F204C9-4730-0415-61D4-D9410AA1F229}"/>
+              </a:ext>
+            </a:extLst>
+          </p:cNvPr>
+          <p:cNvPicPr>
+            <a:picLocks noChangeAspect="1"/>
+          </p:cNvPicPr>
+          <p:nvPr/>
+        </p:nvPicPr>
+        <p:blipFill rotWithShape="1">
+          <a:blip r:embed="rId6"/>
+          <a:srcRect l="-1" r="76126" b="95326"/>
+          <a:stretch/>
+        </p:blipFill>
+        <p:spPr>
+          <a:xfrm>
+            <a:off x="5583264" y="2408098"/>
+            <a:ext cx="447405" cy="194645"/>
+          </a:xfrm>
+          <a:prstGeom prst="rect">
+            <a:avLst/>
+          </a:prstGeom>
+        </p:spPr>
+      </p:pic>
+      <p:pic>
+        <p:nvPicPr>
+          <p:cNvPr id="101" name="Picture 100" descr="A screenshot of a video game&#10;&#10;Description automatically generated">
+            <a:extLst>
+              <a:ext uri="{FF2B5EF4-FFF2-40B4-BE49-F238E27FC236}">
+                <a16:creationId xmlns:a16="http://schemas.microsoft.com/office/drawing/2014/main" id="{6F0225A9-5A4F-055C-345B-E96BED0F5492}"/>
+              </a:ext>
+            </a:extLst>
+          </p:cNvPr>
+          <p:cNvPicPr>
+            <a:picLocks noChangeAspect="1"/>
+          </p:cNvPicPr>
+          <p:nvPr/>
+        </p:nvPicPr>
+        <p:blipFill rotWithShape="1">
+          <a:blip r:embed="rId6"/>
+          <a:srcRect l="22580" t="25249" r="53776" b="66442"/>
+          <a:stretch/>
+        </p:blipFill>
+        <p:spPr>
+          <a:xfrm>
+            <a:off x="7521063" y="1565029"/>
+            <a:ext cx="443060" cy="346001"/>
+          </a:xfrm>
+          <a:prstGeom prst="rect">
+            <a:avLst/>
+          </a:prstGeom>
+        </p:spPr>
+      </p:pic>
+      <p:pic>
+        <p:nvPicPr>
+          <p:cNvPr id="104" name="Picture 103" descr="A screenshot of a video game&#10;&#10;Description automatically generated">
+            <a:extLst>
+              <a:ext uri="{FF2B5EF4-FFF2-40B4-BE49-F238E27FC236}">
+                <a16:creationId xmlns:a16="http://schemas.microsoft.com/office/drawing/2014/main" id="{7A3F3C50-0FB3-9317-B4A0-1F9CCB16B105}"/>
+              </a:ext>
+            </a:extLst>
+          </p:cNvPr>
+          <p:cNvPicPr>
+            <a:picLocks noChangeAspect="1"/>
+          </p:cNvPicPr>
+          <p:nvPr/>
+        </p:nvPicPr>
+        <p:blipFill rotWithShape="1">
+          <a:blip r:embed="rId6"/>
+          <a:srcRect l="-1" r="76126" b="95326"/>
+          <a:stretch/>
+        </p:blipFill>
+        <p:spPr>
+          <a:xfrm>
+            <a:off x="5149085" y="3187630"/>
+            <a:ext cx="447405" cy="194645"/>
+          </a:xfrm>
+          <a:prstGeom prst="rect">
+            <a:avLst/>
+          </a:prstGeom>
+        </p:spPr>
+      </p:pic>
+      <p:pic>
+        <p:nvPicPr>
+          <p:cNvPr id="105" name="Picture 104" descr="A screenshot of a video game&#10;&#10;Description automatically generated">
+            <a:extLst>
+              <a:ext uri="{FF2B5EF4-FFF2-40B4-BE49-F238E27FC236}">
+                <a16:creationId xmlns:a16="http://schemas.microsoft.com/office/drawing/2014/main" id="{EBB52E9C-2A68-80A3-2266-A3D8A6FF2BBB}"/>
+              </a:ext>
+            </a:extLst>
+          </p:cNvPr>
+          <p:cNvPicPr>
+            <a:picLocks noChangeAspect="1"/>
+          </p:cNvPicPr>
+          <p:nvPr/>
+        </p:nvPicPr>
+        <p:blipFill rotWithShape="1">
+          <a:blip r:embed="rId6"/>
+          <a:srcRect l="-1" r="76126" b="95326"/>
+          <a:stretch/>
+        </p:blipFill>
+        <p:spPr>
+          <a:xfrm>
+            <a:off x="6022201" y="4763977"/>
+            <a:ext cx="447405" cy="194645"/>
+          </a:xfrm>
+          <a:prstGeom prst="rect">
+            <a:avLst/>
+          </a:prstGeom>
+        </p:spPr>
+      </p:pic>
+      <p:pic>
+        <p:nvPicPr>
+          <p:cNvPr id="106" name="Picture 105" descr="A screenshot of a video game&#10;&#10;Description automatically generated">
+            <a:extLst>
+              <a:ext uri="{FF2B5EF4-FFF2-40B4-BE49-F238E27FC236}">
+                <a16:creationId xmlns:a16="http://schemas.microsoft.com/office/drawing/2014/main" id="{E97D6A61-F259-A571-73C5-BB9C1522F18A}"/>
+              </a:ext>
+            </a:extLst>
+          </p:cNvPr>
+          <p:cNvPicPr>
+            <a:picLocks noChangeAspect="1"/>
+          </p:cNvPicPr>
+          <p:nvPr/>
+        </p:nvPicPr>
+        <p:blipFill rotWithShape="1">
+          <a:blip r:embed="rId6"/>
+          <a:srcRect l="-1" r="76126" b="95326"/>
+          <a:stretch/>
+        </p:blipFill>
+        <p:spPr>
+          <a:xfrm>
+            <a:off x="5781482" y="5296374"/>
+            <a:ext cx="447405" cy="194645"/>
+          </a:xfrm>
+          <a:prstGeom prst="rect">
+            <a:avLst/>
+          </a:prstGeom>
+        </p:spPr>
+      </p:pic>
+      <p:pic>
+        <p:nvPicPr>
+          <p:cNvPr id="107" name="Picture 106" descr="A screenshot of a video game&#10;&#10;Description automatically generated">
+            <a:extLst>
+              <a:ext uri="{FF2B5EF4-FFF2-40B4-BE49-F238E27FC236}">
+                <a16:creationId xmlns:a16="http://schemas.microsoft.com/office/drawing/2014/main" id="{CD247A07-4BA6-16BA-B7AC-C1F731FFEAB2}"/>
+              </a:ext>
+            </a:extLst>
+          </p:cNvPr>
+          <p:cNvPicPr>
+            <a:picLocks noChangeAspect="1"/>
+          </p:cNvPicPr>
+          <p:nvPr/>
+        </p:nvPicPr>
+        <p:blipFill rotWithShape="1">
+          <a:blip r:embed="rId6"/>
+          <a:srcRect l="-1" r="76126" b="95326"/>
+          <a:stretch/>
+        </p:blipFill>
+        <p:spPr>
+          <a:xfrm>
+            <a:off x="7521063" y="4858246"/>
+            <a:ext cx="447405" cy="194645"/>
+          </a:xfrm>
+          <a:prstGeom prst="rect">
+            <a:avLst/>
+          </a:prstGeom>
+        </p:spPr>
+      </p:pic>
+      <p:pic>
+        <p:nvPicPr>
+          <p:cNvPr id="108" name="Picture 107" descr="A screenshot of a video game&#10;&#10;Description automatically generated">
+            <a:extLst>
+              <a:ext uri="{FF2B5EF4-FFF2-40B4-BE49-F238E27FC236}">
+                <a16:creationId xmlns:a16="http://schemas.microsoft.com/office/drawing/2014/main" id="{F248B516-518A-0576-3BD8-CC7AC1493BE8}"/>
+              </a:ext>
+            </a:extLst>
+          </p:cNvPr>
+          <p:cNvPicPr>
+            <a:picLocks noChangeAspect="1"/>
+          </p:cNvPicPr>
+          <p:nvPr/>
+        </p:nvPicPr>
+        <p:blipFill rotWithShape="1">
+          <a:blip r:embed="rId6"/>
+          <a:srcRect l="-1" r="76126" b="95326"/>
+          <a:stretch/>
+        </p:blipFill>
+        <p:spPr>
+          <a:xfrm>
+            <a:off x="8305765" y="2944754"/>
+            <a:ext cx="447405" cy="194645"/>
+          </a:xfrm>
+          <a:prstGeom prst="rect">
+            <a:avLst/>
+          </a:prstGeom>
+        </p:spPr>
+      </p:pic>
+      <p:pic>
+        <p:nvPicPr>
+          <p:cNvPr id="109" name="Picture 108" descr="A screenshot of a video game&#10;&#10;Description automatically generated">
+            <a:extLst>
+              <a:ext uri="{FF2B5EF4-FFF2-40B4-BE49-F238E27FC236}">
+                <a16:creationId xmlns:a16="http://schemas.microsoft.com/office/drawing/2014/main" id="{C1294835-295E-9CB5-1C25-EA7D9B4B7782}"/>
+              </a:ext>
+            </a:extLst>
+          </p:cNvPr>
+          <p:cNvPicPr>
+            <a:picLocks noChangeAspect="1"/>
+          </p:cNvPicPr>
+          <p:nvPr/>
+        </p:nvPicPr>
+        <p:blipFill rotWithShape="1">
+          <a:blip r:embed="rId6"/>
+          <a:srcRect l="-1" r="76126" b="95326"/>
+          <a:stretch/>
+        </p:blipFill>
+        <p:spPr>
+          <a:xfrm>
+            <a:off x="5151993" y="3561235"/>
+            <a:ext cx="447405" cy="194645"/>
+          </a:xfrm>
+          <a:prstGeom prst="rect">
+            <a:avLst/>
+          </a:prstGeom>
+        </p:spPr>
+      </p:pic>
+      <p:pic>
+        <p:nvPicPr>
+          <p:cNvPr id="110" name="Picture 109" descr="A screenshot of a video game&#10;&#10;Description automatically generated">
+            <a:extLst>
+              <a:ext uri="{FF2B5EF4-FFF2-40B4-BE49-F238E27FC236}">
+                <a16:creationId xmlns:a16="http://schemas.microsoft.com/office/drawing/2014/main" id="{CEBE861B-80D2-BCF8-F553-54EDA2F2F88F}"/>
+              </a:ext>
+            </a:extLst>
+          </p:cNvPr>
+          <p:cNvPicPr>
+            <a:picLocks noChangeAspect="1"/>
+          </p:cNvPicPr>
+          <p:nvPr/>
+        </p:nvPicPr>
+        <p:blipFill rotWithShape="1">
+          <a:blip r:embed="rId6"/>
+          <a:srcRect l="-1" r="76126" b="95326"/>
+          <a:stretch/>
+        </p:blipFill>
+        <p:spPr>
+          <a:xfrm>
+            <a:off x="7647389" y="2125394"/>
+            <a:ext cx="447405" cy="194645"/>
+          </a:xfrm>
+          <a:prstGeom prst="rect">
+            <a:avLst/>
+          </a:prstGeom>
+        </p:spPr>
+      </p:pic>
+      <p:pic>
+        <p:nvPicPr>
+          <p:cNvPr id="111" name="Picture 110" descr="A screenshot of a video game&#10;&#10;Description automatically generated">
+            <a:extLst>
+              <a:ext uri="{FF2B5EF4-FFF2-40B4-BE49-F238E27FC236}">
+                <a16:creationId xmlns:a16="http://schemas.microsoft.com/office/drawing/2014/main" id="{44399101-6322-7AEC-4FCB-EF7FB693308D}"/>
+              </a:ext>
+            </a:extLst>
+          </p:cNvPr>
+          <p:cNvPicPr>
+            <a:picLocks noChangeAspect="1"/>
+          </p:cNvPicPr>
+          <p:nvPr/>
+        </p:nvPicPr>
+        <p:blipFill rotWithShape="1">
+          <a:blip r:embed="rId6"/>
+          <a:srcRect l="-1" r="76126" b="95326"/>
+          <a:stretch/>
+        </p:blipFill>
+        <p:spPr>
+          <a:xfrm>
+            <a:off x="8177178" y="3773429"/>
+            <a:ext cx="447405" cy="194645"/>
+          </a:xfrm>
+          <a:prstGeom prst="rect">
+            <a:avLst/>
+          </a:prstGeom>
+        </p:spPr>
+      </p:pic>
+      <p:pic>
+        <p:nvPicPr>
+          <p:cNvPr id="112" name="Picture 111" descr="A screenshot of a video game&#10;&#10;Description automatically generated">
+            <a:extLst>
+              <a:ext uri="{FF2B5EF4-FFF2-40B4-BE49-F238E27FC236}">
+                <a16:creationId xmlns:a16="http://schemas.microsoft.com/office/drawing/2014/main" id="{55B25299-08D4-A184-02B4-DB0C801B2FF4}"/>
+              </a:ext>
+            </a:extLst>
+          </p:cNvPr>
+          <p:cNvPicPr>
+            <a:picLocks noChangeAspect="1"/>
+          </p:cNvPicPr>
+          <p:nvPr/>
+        </p:nvPicPr>
+        <p:blipFill rotWithShape="1">
+          <a:blip r:embed="rId6"/>
+          <a:srcRect l="-1" r="76126" b="95326"/>
+          <a:stretch/>
+        </p:blipFill>
+        <p:spPr>
+          <a:xfrm>
+            <a:off x="8291477" y="2630429"/>
+            <a:ext cx="447405" cy="194645"/>
+          </a:xfrm>
+          <a:prstGeom prst="rect">
+            <a:avLst/>
+          </a:prstGeom>
+        </p:spPr>
+      </p:pic>
+      <p:pic>
+        <p:nvPicPr>
+          <p:cNvPr id="113" name="Picture 112" descr="A screenshot of a video game&#10;&#10;Description automatically generated">
+            <a:extLst>
+              <a:ext uri="{FF2B5EF4-FFF2-40B4-BE49-F238E27FC236}">
+                <a16:creationId xmlns:a16="http://schemas.microsoft.com/office/drawing/2014/main" id="{B7C7A8D9-433E-B6C2-C9F4-0BC8C25466F4}"/>
+              </a:ext>
+            </a:extLst>
+          </p:cNvPr>
+          <p:cNvPicPr>
+            <a:picLocks noChangeAspect="1"/>
+          </p:cNvPicPr>
+          <p:nvPr/>
+        </p:nvPicPr>
+        <p:blipFill rotWithShape="1">
+          <a:blip r:embed="rId6"/>
+          <a:srcRect l="22580" t="25249" r="53776" b="66442"/>
+          <a:stretch/>
+        </p:blipFill>
+        <p:spPr>
+          <a:xfrm>
+            <a:off x="5169074" y="4889900"/>
+            <a:ext cx="443060" cy="346001"/>
+          </a:xfrm>
+          <a:prstGeom prst="rect">
+            <a:avLst/>
+          </a:prstGeom>
+        </p:spPr>
+      </p:pic>
+      <p:pic>
+        <p:nvPicPr>
+          <p:cNvPr id="114" name="Picture 113" descr="A screenshot of a video game&#10;&#10;Description automatically generated">
+            <a:extLst>
+              <a:ext uri="{FF2B5EF4-FFF2-40B4-BE49-F238E27FC236}">
+                <a16:creationId xmlns:a16="http://schemas.microsoft.com/office/drawing/2014/main" id="{B9937627-877E-DB7A-B6D0-80ED38DCA6BA}"/>
+              </a:ext>
+            </a:extLst>
+          </p:cNvPr>
+          <p:cNvPicPr>
+            <a:picLocks noChangeAspect="1"/>
+          </p:cNvPicPr>
+          <p:nvPr/>
+        </p:nvPicPr>
+        <p:blipFill rotWithShape="1">
+          <a:blip r:embed="rId6"/>
+          <a:srcRect l="22580" t="25249" r="53776" b="66442"/>
+          <a:stretch/>
+        </p:blipFill>
+        <p:spPr>
+          <a:xfrm>
+            <a:off x="5040487" y="4947050"/>
+            <a:ext cx="443060" cy="346001"/>
           </a:xfrm>
           <a:prstGeom prst="rect">
             <a:avLst/>

</xml_diff>